<commit_message>
I'M A WRITIN MAH PAPAR
</commit_message>
<xml_diff>
--- a/Docs/FPGA Neural Network.pptx
+++ b/Docs/FPGA Neural Network.pptx
@@ -368,6 +368,7 @@
           <a:p>
             <a:fld id="{A5B00B91-90A6-4B00-B790-8A3A89AE3D40}" type="datetimeFigureOut">
               <a:rPr lang="en-US" smtClean="0"/>
+              <a:pPr/>
               <a:t>11/8/2009</a:t>
             </a:fld>
             <a:endParaRPr lang="en-US" dirty="0"/>
@@ -410,6 +411,7 @@
           <a:p>
             <a:fld id="{B5297D6C-88C0-4F2E-A6D0-AAF6CD514E45}" type="slidenum">
               <a:rPr lang="en-US" smtClean="0"/>
+              <a:pPr/>
               <a:t>‹#›</a:t>
             </a:fld>
             <a:endParaRPr lang="en-US" dirty="0"/>
@@ -591,6 +593,7 @@
           <a:p>
             <a:fld id="{A5B00B91-90A6-4B00-B790-8A3A89AE3D40}" type="datetimeFigureOut">
               <a:rPr lang="en-US" smtClean="0"/>
+              <a:pPr/>
               <a:t>11/8/2009</a:t>
             </a:fld>
             <a:endParaRPr lang="en-US" dirty="0"/>
@@ -633,6 +636,7 @@
           <a:p>
             <a:fld id="{B5297D6C-88C0-4F2E-A6D0-AAF6CD514E45}" type="slidenum">
               <a:rPr lang="en-US" smtClean="0"/>
+              <a:pPr/>
               <a:t>‹#›</a:t>
             </a:fld>
             <a:endParaRPr lang="en-US" dirty="0"/>
@@ -871,6 +875,7 @@
           <a:p>
             <a:fld id="{A5B00B91-90A6-4B00-B790-8A3A89AE3D40}" type="datetimeFigureOut">
               <a:rPr lang="en-US" smtClean="0"/>
+              <a:pPr/>
               <a:t>11/8/2009</a:t>
             </a:fld>
             <a:endParaRPr lang="en-US" dirty="0"/>
@@ -918,6 +923,7 @@
           <a:p>
             <a:fld id="{B5297D6C-88C0-4F2E-A6D0-AAF6CD514E45}" type="slidenum">
               <a:rPr lang="en-US" smtClean="0"/>
+              <a:pPr/>
               <a:t>‹#›</a:t>
             </a:fld>
             <a:endParaRPr lang="en-US" dirty="0"/>
@@ -1050,6 +1056,7 @@
           <a:p>
             <a:fld id="{A5B00B91-90A6-4B00-B790-8A3A89AE3D40}" type="datetimeFigureOut">
               <a:rPr lang="en-US" smtClean="0"/>
+              <a:pPr/>
               <a:t>11/8/2009</a:t>
             </a:fld>
             <a:endParaRPr lang="en-US" dirty="0"/>
@@ -1092,6 +1099,7 @@
           <a:p>
             <a:fld id="{B5297D6C-88C0-4F2E-A6D0-AAF6CD514E45}" type="slidenum">
               <a:rPr lang="en-US" smtClean="0"/>
+              <a:pPr/>
               <a:t>‹#›</a:t>
             </a:fld>
             <a:endParaRPr lang="en-US" dirty="0"/>
@@ -1408,6 +1416,7 @@
           <a:p>
             <a:fld id="{A5B00B91-90A6-4B00-B790-8A3A89AE3D40}" type="datetimeFigureOut">
               <a:rPr lang="en-US" smtClean="0"/>
+              <a:pPr/>
               <a:t>11/8/2009</a:t>
             </a:fld>
             <a:endParaRPr lang="en-US" dirty="0"/>
@@ -1450,6 +1459,7 @@
           <a:p>
             <a:fld id="{B5297D6C-88C0-4F2E-A6D0-AAF6CD514E45}" type="slidenum">
               <a:rPr lang="en-US" smtClean="0"/>
+              <a:pPr/>
               <a:t>‹#›</a:t>
             </a:fld>
             <a:endParaRPr lang="en-US" dirty="0"/>
@@ -1695,6 +1705,7 @@
           <a:p>
             <a:fld id="{A5B00B91-90A6-4B00-B790-8A3A89AE3D40}" type="datetimeFigureOut">
               <a:rPr lang="en-US" smtClean="0"/>
+              <a:pPr/>
               <a:t>11/8/2009</a:t>
             </a:fld>
             <a:endParaRPr lang="en-US" dirty="0"/>
@@ -1737,6 +1748,7 @@
           <a:p>
             <a:fld id="{B5297D6C-88C0-4F2E-A6D0-AAF6CD514E45}" type="slidenum">
               <a:rPr lang="en-US" smtClean="0"/>
+              <a:pPr/>
               <a:t>‹#›</a:t>
             </a:fld>
             <a:endParaRPr lang="en-US" dirty="0"/>
@@ -2117,6 +2129,7 @@
           <a:p>
             <a:fld id="{A5B00B91-90A6-4B00-B790-8A3A89AE3D40}" type="datetimeFigureOut">
               <a:rPr lang="en-US" smtClean="0"/>
+              <a:pPr/>
               <a:t>11/8/2009</a:t>
             </a:fld>
             <a:endParaRPr lang="en-US" dirty="0"/>
@@ -2159,6 +2172,7 @@
           <a:p>
             <a:fld id="{B5297D6C-88C0-4F2E-A6D0-AAF6CD514E45}" type="slidenum">
               <a:rPr lang="en-US" smtClean="0"/>
+              <a:pPr/>
               <a:t>‹#›</a:t>
             </a:fld>
             <a:endParaRPr lang="en-US" dirty="0"/>
@@ -2232,6 +2246,7 @@
           <a:p>
             <a:fld id="{A5B00B91-90A6-4B00-B790-8A3A89AE3D40}" type="datetimeFigureOut">
               <a:rPr lang="en-US" smtClean="0"/>
+              <a:pPr/>
               <a:t>11/8/2009</a:t>
             </a:fld>
             <a:endParaRPr lang="en-US" dirty="0"/>
@@ -2274,6 +2289,7 @@
           <a:p>
             <a:fld id="{B5297D6C-88C0-4F2E-A6D0-AAF6CD514E45}" type="slidenum">
               <a:rPr lang="en-US" smtClean="0"/>
+              <a:pPr/>
               <a:t>‹#›</a:t>
             </a:fld>
             <a:endParaRPr lang="en-US" dirty="0"/>
@@ -2322,6 +2338,7 @@
           <a:p>
             <a:fld id="{A5B00B91-90A6-4B00-B790-8A3A89AE3D40}" type="datetimeFigureOut">
               <a:rPr lang="en-US" smtClean="0"/>
+              <a:pPr/>
               <a:t>11/8/2009</a:t>
             </a:fld>
             <a:endParaRPr lang="en-US" dirty="0"/>
@@ -2364,6 +2381,7 @@
           <a:p>
             <a:fld id="{B5297D6C-88C0-4F2E-A6D0-AAF6CD514E45}" type="slidenum">
               <a:rPr lang="en-US" smtClean="0"/>
+              <a:pPr/>
               <a:t>‹#›</a:t>
             </a:fld>
             <a:endParaRPr lang="en-US" dirty="0"/>
@@ -2600,6 +2618,7 @@
           <a:p>
             <a:fld id="{A5B00B91-90A6-4B00-B790-8A3A89AE3D40}" type="datetimeFigureOut">
               <a:rPr lang="en-US" smtClean="0"/>
+              <a:pPr/>
               <a:t>11/8/2009</a:t>
             </a:fld>
             <a:endParaRPr lang="en-US" dirty="0"/>
@@ -2642,6 +2661,7 @@
           <a:p>
             <a:fld id="{B5297D6C-88C0-4F2E-A6D0-AAF6CD514E45}" type="slidenum">
               <a:rPr lang="en-US" smtClean="0"/>
+              <a:pPr/>
               <a:t>‹#›</a:t>
             </a:fld>
             <a:endParaRPr lang="en-US" dirty="0"/>
@@ -2966,6 +2986,7 @@
           <a:p>
             <a:fld id="{A5B00B91-90A6-4B00-B790-8A3A89AE3D40}" type="datetimeFigureOut">
               <a:rPr lang="en-US" smtClean="0"/>
+              <a:pPr/>
               <a:t>11/8/2009</a:t>
             </a:fld>
             <a:endParaRPr lang="en-US" dirty="0"/>
@@ -3122,6 +3143,7 @@
           <a:p>
             <a:fld id="{B5297D6C-88C0-4F2E-A6D0-AAF6CD514E45}" type="slidenum">
               <a:rPr lang="en-US" smtClean="0"/>
+              <a:pPr/>
               <a:t>‹#›</a:t>
             </a:fld>
             <a:endParaRPr lang="en-US" dirty="0"/>
@@ -3403,6 +3425,7 @@
           <a:p>
             <a:fld id="{A5B00B91-90A6-4B00-B790-8A3A89AE3D40}" type="datetimeFigureOut">
               <a:rPr lang="en-US" smtClean="0"/>
+              <a:pPr/>
               <a:t>11/8/2009</a:t>
             </a:fld>
             <a:endParaRPr lang="en-US" dirty="0"/>
@@ -3483,6 +3506,7 @@
           <a:p>
             <a:fld id="{B5297D6C-88C0-4F2E-A6D0-AAF6CD514E45}" type="slidenum">
               <a:rPr lang="en-US" smtClean="0"/>
+              <a:pPr/>
               <a:t>‹#›</a:t>
             </a:fld>
             <a:endParaRPr lang="en-US" dirty="0"/>
@@ -4110,25 +4134,2467 @@
           </a:p>
         </p:txBody>
       </p:sp>
-      <p:sp>
-        <p:nvSpPr>
-          <p:cNvPr id="3" name="Content Placeholder 2"/>
-          <p:cNvSpPr>
-            <a:spLocks noGrp="1"/>
-          </p:cNvSpPr>
+      <p:graphicFrame>
+        <p:nvGraphicFramePr>
+          <p:cNvPr id="5" name="Table 4"/>
+          <p:cNvGraphicFramePr>
+            <a:graphicFrameLocks noGrp="1"/>
+          </p:cNvGraphicFramePr>
+          <p:nvPr/>
+        </p:nvGraphicFramePr>
+        <p:xfrm>
+          <a:off x="2743200" y="5334000"/>
+          <a:ext cx="3531008" cy="1147731"/>
+        </p:xfrm>
+        <a:graphic>
+          <a:graphicData uri="http://schemas.openxmlformats.org/drawingml/2006/table">
+            <a:tbl>
+              <a:tblPr/>
+              <a:tblGrid>
+                <a:gridCol w="1389517"/>
+                <a:gridCol w="1144308"/>
+                <a:gridCol w="997183"/>
+              </a:tblGrid>
+              <a:tr h="300789">
+                <a:tc>
+                  <a:txBody>
+                    <a:bodyPr/>
+                    <a:lstStyle/>
+                    <a:p>
+                      <a:pPr marL="0" marR="0" algn="ctr">
+                        <a:lnSpc>
+                          <a:spcPct val="115000"/>
+                        </a:lnSpc>
+                        <a:spcBef>
+                          <a:spcPts val="1000"/>
+                        </a:spcBef>
+                        <a:spcAft>
+                          <a:spcPts val="1000"/>
+                        </a:spcAft>
+                      </a:pPr>
+                      <a:r>
+                        <a:rPr lang="en-US" sz="1700" b="1" u="sng">
+                          <a:latin typeface="Calibri"/>
+                          <a:ea typeface="Times New Roman"/>
+                          <a:cs typeface="Times New Roman"/>
+                        </a:rPr>
+                        <a:t>Node</a:t>
+                      </a:r>
+                      <a:endParaRPr lang="en-US" sz="1700">
+                        <a:latin typeface="Calibri"/>
+                        <a:ea typeface="Times New Roman"/>
+                        <a:cs typeface="Times New Roman"/>
+                      </a:endParaRPr>
+                    </a:p>
+                  </a:txBody>
+                  <a:tcPr marL="0" marR="0" marT="0" marB="0">
+                    <a:lnL w="12700" cap="flat" cmpd="sng" algn="ctr">
+                      <a:solidFill>
+                        <a:srgbClr val="000000"/>
+                      </a:solidFill>
+                      <a:prstDash val="solid"/>
+                      <a:round/>
+                      <a:headEnd type="none" w="med" len="med"/>
+                      <a:tailEnd type="none" w="med" len="med"/>
+                    </a:lnL>
+                    <a:lnR>
+                      <a:noFill/>
+                    </a:lnR>
+                    <a:lnT w="12700" cap="flat" cmpd="sng" algn="ctr">
+                      <a:solidFill>
+                        <a:srgbClr val="000000"/>
+                      </a:solidFill>
+                      <a:prstDash val="solid"/>
+                      <a:round/>
+                      <a:headEnd type="none" w="med" len="med"/>
+                      <a:tailEnd type="none" w="med" len="med"/>
+                    </a:lnT>
+                    <a:lnB>
+                      <a:noFill/>
+                    </a:lnB>
+                  </a:tcPr>
+                </a:tc>
+                <a:tc>
+                  <a:txBody>
+                    <a:bodyPr/>
+                    <a:lstStyle/>
+                    <a:p>
+                      <a:pPr marL="0" marR="0" algn="ctr">
+                        <a:lnSpc>
+                          <a:spcPct val="115000"/>
+                        </a:lnSpc>
+                        <a:spcBef>
+                          <a:spcPts val="1000"/>
+                        </a:spcBef>
+                        <a:spcAft>
+                          <a:spcPts val="1000"/>
+                        </a:spcAft>
+                      </a:pPr>
+                      <a:r>
+                        <a:rPr lang="en-US" sz="1700" b="1" u="sng">
+                          <a:latin typeface="Calibri"/>
+                          <a:ea typeface="Times New Roman"/>
+                          <a:cs typeface="Times New Roman"/>
+                        </a:rPr>
+                        <a:t>Levels</a:t>
+                      </a:r>
+                      <a:endParaRPr lang="en-US" sz="1700">
+                        <a:latin typeface="Calibri"/>
+                        <a:ea typeface="Times New Roman"/>
+                        <a:cs typeface="Times New Roman"/>
+                      </a:endParaRPr>
+                    </a:p>
+                  </a:txBody>
+                  <a:tcPr marL="0" marR="0" marT="0" marB="0">
+                    <a:lnL>
+                      <a:noFill/>
+                    </a:lnL>
+                    <a:lnR>
+                      <a:noFill/>
+                    </a:lnR>
+                    <a:lnT w="12700" cap="flat" cmpd="sng" algn="ctr">
+                      <a:solidFill>
+                        <a:srgbClr val="000000"/>
+                      </a:solidFill>
+                      <a:prstDash val="solid"/>
+                      <a:round/>
+                      <a:headEnd type="none" w="med" len="med"/>
+                      <a:tailEnd type="none" w="med" len="med"/>
+                    </a:lnT>
+                    <a:lnB>
+                      <a:noFill/>
+                    </a:lnB>
+                  </a:tcPr>
+                </a:tc>
+                <a:tc>
+                  <a:txBody>
+                    <a:bodyPr/>
+                    <a:lstStyle/>
+                    <a:p>
+                      <a:pPr marL="0" marR="0" algn="ctr">
+                        <a:lnSpc>
+                          <a:spcPct val="115000"/>
+                        </a:lnSpc>
+                        <a:spcBef>
+                          <a:spcPts val="1000"/>
+                        </a:spcBef>
+                        <a:spcAft>
+                          <a:spcPts val="1000"/>
+                        </a:spcAft>
+                      </a:pPr>
+                      <a:r>
+                        <a:rPr lang="en-US" sz="1700" b="1" u="sng">
+                          <a:latin typeface="Calibri"/>
+                          <a:ea typeface="Times New Roman"/>
+                          <a:cs typeface="Times New Roman"/>
+                        </a:rPr>
+                        <a:t>Time</a:t>
+                      </a:r>
+                      <a:endParaRPr lang="en-US" sz="1700">
+                        <a:latin typeface="Calibri"/>
+                        <a:ea typeface="Times New Roman"/>
+                        <a:cs typeface="Times New Roman"/>
+                      </a:endParaRPr>
+                    </a:p>
+                  </a:txBody>
+                  <a:tcPr marL="0" marR="0" marT="0" marB="0">
+                    <a:lnL>
+                      <a:noFill/>
+                    </a:lnL>
+                    <a:lnR w="12700" cap="flat" cmpd="sng" algn="ctr">
+                      <a:solidFill>
+                        <a:srgbClr val="000000"/>
+                      </a:solidFill>
+                      <a:prstDash val="solid"/>
+                      <a:round/>
+                      <a:headEnd type="none" w="med" len="med"/>
+                      <a:tailEnd type="none" w="med" len="med"/>
+                    </a:lnR>
+                    <a:lnT w="12700" cap="flat" cmpd="sng" algn="ctr">
+                      <a:solidFill>
+                        <a:srgbClr val="000000"/>
+                      </a:solidFill>
+                      <a:prstDash val="solid"/>
+                      <a:round/>
+                      <a:headEnd type="none" w="med" len="med"/>
+                      <a:tailEnd type="none" w="med" len="med"/>
+                    </a:lnT>
+                    <a:lnB>
+                      <a:noFill/>
+                    </a:lnB>
+                  </a:tcPr>
+                </a:tc>
+              </a:tr>
+              <a:tr h="300789">
+                <a:tc>
+                  <a:txBody>
+                    <a:bodyPr/>
+                    <a:lstStyle/>
+                    <a:p>
+                      <a:pPr marL="0" marR="0" algn="ctr">
+                        <a:lnSpc>
+                          <a:spcPct val="115000"/>
+                        </a:lnSpc>
+                        <a:spcBef>
+                          <a:spcPts val="1000"/>
+                        </a:spcBef>
+                        <a:spcAft>
+                          <a:spcPts val="1000"/>
+                        </a:spcAft>
+                      </a:pPr>
+                      <a:r>
+                        <a:rPr lang="en-US" sz="1700" dirty="0">
+                          <a:latin typeface="Calibri"/>
+                          <a:ea typeface="Times New Roman"/>
+                          <a:cs typeface="Times New Roman"/>
+                        </a:rPr>
+                        <a:t>Data In</a:t>
+                      </a:r>
+                    </a:p>
+                  </a:txBody>
+                  <a:tcPr marL="0" marR="0" marT="0" marB="0">
+                    <a:lnL w="12700" cap="flat" cmpd="sng" algn="ctr">
+                      <a:solidFill>
+                        <a:srgbClr val="000000"/>
+                      </a:solidFill>
+                      <a:prstDash val="solid"/>
+                      <a:round/>
+                      <a:headEnd type="none" w="med" len="med"/>
+                      <a:tailEnd type="none" w="med" len="med"/>
+                    </a:lnL>
+                    <a:lnR>
+                      <a:noFill/>
+                    </a:lnR>
+                    <a:lnT>
+                      <a:noFill/>
+                    </a:lnT>
+                    <a:lnB>
+                      <a:noFill/>
+                    </a:lnB>
+                  </a:tcPr>
+                </a:tc>
+                <a:tc>
+                  <a:txBody>
+                    <a:bodyPr/>
+                    <a:lstStyle/>
+                    <a:p>
+                      <a:pPr marL="0" marR="0" algn="ctr">
+                        <a:lnSpc>
+                          <a:spcPct val="115000"/>
+                        </a:lnSpc>
+                        <a:spcBef>
+                          <a:spcPts val="1000"/>
+                        </a:spcBef>
+                        <a:spcAft>
+                          <a:spcPts val="1000"/>
+                        </a:spcAft>
+                      </a:pPr>
+                      <a:r>
+                        <a:rPr lang="en-US" sz="1700">
+                          <a:latin typeface="Calibri"/>
+                          <a:ea typeface="Times New Roman"/>
+                          <a:cs typeface="Times New Roman"/>
+                        </a:rPr>
+                        <a:t>29</a:t>
+                      </a:r>
+                    </a:p>
+                  </a:txBody>
+                  <a:tcPr marL="0" marR="0" marT="0" marB="0">
+                    <a:lnL>
+                      <a:noFill/>
+                    </a:lnL>
+                    <a:lnR>
+                      <a:noFill/>
+                    </a:lnR>
+                    <a:lnT>
+                      <a:noFill/>
+                    </a:lnT>
+                    <a:lnB>
+                      <a:noFill/>
+                    </a:lnB>
+                  </a:tcPr>
+                </a:tc>
+                <a:tc>
+                  <a:txBody>
+                    <a:bodyPr/>
+                    <a:lstStyle/>
+                    <a:p>
+                      <a:pPr marL="0" marR="0" algn="ctr">
+                        <a:lnSpc>
+                          <a:spcPct val="115000"/>
+                        </a:lnSpc>
+                        <a:spcBef>
+                          <a:spcPts val="1000"/>
+                        </a:spcBef>
+                        <a:spcAft>
+                          <a:spcPts val="1000"/>
+                        </a:spcAft>
+                      </a:pPr>
+                      <a:r>
+                        <a:rPr lang="en-US" sz="1700">
+                          <a:latin typeface="Calibri"/>
+                          <a:ea typeface="Times New Roman"/>
+                          <a:cs typeface="Times New Roman"/>
+                        </a:rPr>
+                        <a:t>13ns</a:t>
+                      </a:r>
+                    </a:p>
+                  </a:txBody>
+                  <a:tcPr marL="0" marR="0" marT="0" marB="0">
+                    <a:lnL>
+                      <a:noFill/>
+                    </a:lnL>
+                    <a:lnR w="12700" cap="flat" cmpd="sng" algn="ctr">
+                      <a:solidFill>
+                        <a:srgbClr val="000000"/>
+                      </a:solidFill>
+                      <a:prstDash val="solid"/>
+                      <a:round/>
+                      <a:headEnd type="none" w="med" len="med"/>
+                      <a:tailEnd type="none" w="med" len="med"/>
+                    </a:lnR>
+                    <a:lnT>
+                      <a:noFill/>
+                    </a:lnT>
+                    <a:lnB>
+                      <a:noFill/>
+                    </a:lnB>
+                  </a:tcPr>
+                </a:tc>
+              </a:tr>
+              <a:tr h="300789">
+                <a:tc>
+                  <a:txBody>
+                    <a:bodyPr/>
+                    <a:lstStyle/>
+                    <a:p>
+                      <a:pPr marL="0" marR="0" algn="ctr">
+                        <a:lnSpc>
+                          <a:spcPct val="115000"/>
+                        </a:lnSpc>
+                        <a:spcBef>
+                          <a:spcPts val="1000"/>
+                        </a:spcBef>
+                        <a:spcAft>
+                          <a:spcPts val="1000"/>
+                        </a:spcAft>
+                      </a:pPr>
+                      <a:r>
+                        <a:rPr lang="en-US" sz="1700">
+                          <a:latin typeface="Calibri"/>
+                          <a:ea typeface="Times New Roman"/>
+                          <a:cs typeface="Times New Roman"/>
+                        </a:rPr>
+                        <a:t>Data Out</a:t>
+                      </a:r>
+                    </a:p>
+                  </a:txBody>
+                  <a:tcPr marL="0" marR="0" marT="0" marB="0">
+                    <a:lnL w="12700" cap="flat" cmpd="sng" algn="ctr">
+                      <a:solidFill>
+                        <a:srgbClr val="000000"/>
+                      </a:solidFill>
+                      <a:prstDash val="solid"/>
+                      <a:round/>
+                      <a:headEnd type="none" w="med" len="med"/>
+                      <a:tailEnd type="none" w="med" len="med"/>
+                    </a:lnL>
+                    <a:lnR>
+                      <a:noFill/>
+                    </a:lnR>
+                    <a:lnT>
+                      <a:noFill/>
+                    </a:lnT>
+                    <a:lnB>
+                      <a:noFill/>
+                    </a:lnB>
+                  </a:tcPr>
+                </a:tc>
+                <a:tc>
+                  <a:txBody>
+                    <a:bodyPr/>
+                    <a:lstStyle/>
+                    <a:p>
+                      <a:pPr marL="0" marR="0" algn="ctr">
+                        <a:lnSpc>
+                          <a:spcPct val="115000"/>
+                        </a:lnSpc>
+                        <a:spcBef>
+                          <a:spcPts val="1000"/>
+                        </a:spcBef>
+                        <a:spcAft>
+                          <a:spcPts val="1000"/>
+                        </a:spcAft>
+                      </a:pPr>
+                      <a:r>
+                        <a:rPr lang="en-US" sz="1700">
+                          <a:latin typeface="Calibri"/>
+                          <a:ea typeface="Times New Roman"/>
+                          <a:cs typeface="Times New Roman"/>
+                        </a:rPr>
+                        <a:t>2</a:t>
+                      </a:r>
+                    </a:p>
+                  </a:txBody>
+                  <a:tcPr marL="0" marR="0" marT="0" marB="0">
+                    <a:lnL>
+                      <a:noFill/>
+                    </a:lnL>
+                    <a:lnR>
+                      <a:noFill/>
+                    </a:lnR>
+                    <a:lnT>
+                      <a:noFill/>
+                    </a:lnT>
+                    <a:lnB>
+                      <a:noFill/>
+                    </a:lnB>
+                  </a:tcPr>
+                </a:tc>
+                <a:tc>
+                  <a:txBody>
+                    <a:bodyPr/>
+                    <a:lstStyle/>
+                    <a:p>
+                      <a:pPr marL="0" marR="0" algn="ctr">
+                        <a:lnSpc>
+                          <a:spcPct val="115000"/>
+                        </a:lnSpc>
+                        <a:spcBef>
+                          <a:spcPts val="1000"/>
+                        </a:spcBef>
+                        <a:spcAft>
+                          <a:spcPts val="1000"/>
+                        </a:spcAft>
+                      </a:pPr>
+                      <a:r>
+                        <a:rPr lang="en-US" sz="1700">
+                          <a:latin typeface="Calibri"/>
+                          <a:ea typeface="Times New Roman"/>
+                          <a:cs typeface="Times New Roman"/>
+                        </a:rPr>
+                        <a:t>5ns</a:t>
+                      </a:r>
+                    </a:p>
+                  </a:txBody>
+                  <a:tcPr marL="0" marR="0" marT="0" marB="0">
+                    <a:lnL>
+                      <a:noFill/>
+                    </a:lnL>
+                    <a:lnR w="12700" cap="flat" cmpd="sng" algn="ctr">
+                      <a:solidFill>
+                        <a:srgbClr val="000000"/>
+                      </a:solidFill>
+                      <a:prstDash val="solid"/>
+                      <a:round/>
+                      <a:headEnd type="none" w="med" len="med"/>
+                      <a:tailEnd type="none" w="med" len="med"/>
+                    </a:lnR>
+                    <a:lnT>
+                      <a:noFill/>
+                    </a:lnT>
+                    <a:lnB>
+                      <a:noFill/>
+                    </a:lnB>
+                  </a:tcPr>
+                </a:tc>
+              </a:tr>
+              <a:tr h="240632">
+                <a:tc gridSpan="3">
+                  <a:txBody>
+                    <a:bodyPr/>
+                    <a:lstStyle/>
+                    <a:p>
+                      <a:pPr marL="0" marR="0" algn="ctr">
+                        <a:lnSpc>
+                          <a:spcPct val="115000"/>
+                        </a:lnSpc>
+                        <a:spcBef>
+                          <a:spcPts val="1000"/>
+                        </a:spcBef>
+                        <a:spcAft>
+                          <a:spcPts val="1000"/>
+                        </a:spcAft>
+                      </a:pPr>
+                      <a:r>
+                        <a:rPr lang="en-US" sz="1400" b="1" dirty="0">
+                          <a:solidFill>
+                            <a:srgbClr val="9D3511"/>
+                          </a:solidFill>
+                          <a:latin typeface="Calibri"/>
+                          <a:ea typeface="Times New Roman"/>
+                          <a:cs typeface="Times New Roman"/>
+                        </a:rPr>
+                        <a:t>Table 2: Data Speed</a:t>
+                      </a:r>
+                    </a:p>
+                  </a:txBody>
+                  <a:tcPr marL="0" marR="0" marT="0" marB="0">
+                    <a:lnL w="12700" cap="flat" cmpd="sng" algn="ctr">
+                      <a:solidFill>
+                        <a:srgbClr val="000000"/>
+                      </a:solidFill>
+                      <a:prstDash val="solid"/>
+                      <a:round/>
+                      <a:headEnd type="none" w="med" len="med"/>
+                      <a:tailEnd type="none" w="med" len="med"/>
+                    </a:lnL>
+                    <a:lnR w="12700" cap="flat" cmpd="sng" algn="ctr">
+                      <a:solidFill>
+                        <a:srgbClr val="000000"/>
+                      </a:solidFill>
+                      <a:prstDash val="solid"/>
+                      <a:round/>
+                      <a:headEnd type="none" w="med" len="med"/>
+                      <a:tailEnd type="none" w="med" len="med"/>
+                    </a:lnR>
+                    <a:lnT>
+                      <a:noFill/>
+                    </a:lnT>
+                    <a:lnB w="12700" cap="flat" cmpd="sng" algn="ctr">
+                      <a:solidFill>
+                        <a:srgbClr val="000000"/>
+                      </a:solidFill>
+                      <a:prstDash val="solid"/>
+                      <a:round/>
+                      <a:headEnd type="none" w="med" len="med"/>
+                      <a:tailEnd type="none" w="med" len="med"/>
+                    </a:lnB>
+                  </a:tcPr>
+                </a:tc>
+                <a:tc hMerge="1">
+                  <a:txBody>
+                    <a:bodyPr/>
+                    <a:lstStyle/>
+                    <a:p>
+                      <a:endParaRPr lang="en-US"/>
+                    </a:p>
+                  </a:txBody>
+                  <a:tcPr/>
+                </a:tc>
+                <a:tc hMerge="1">
+                  <a:txBody>
+                    <a:bodyPr/>
+                    <a:lstStyle/>
+                    <a:p>
+                      <a:endParaRPr lang="en-US"/>
+                    </a:p>
+                  </a:txBody>
+                  <a:tcPr/>
+                </a:tc>
+              </a:tr>
+            </a:tbl>
+          </a:graphicData>
+        </a:graphic>
+      </p:graphicFrame>
+      <p:graphicFrame>
+        <p:nvGraphicFramePr>
+          <p:cNvPr id="7" name="Content Placeholder 6"/>
+          <p:cNvGraphicFramePr>
+            <a:graphicFrameLocks noGrp="1"/>
+          </p:cNvGraphicFramePr>
           <p:nvPr>
             <p:ph idx="1"/>
           </p:nvPr>
-        </p:nvSpPr>
-        <p:spPr/>
-        <p:txBody>
-          <a:bodyPr/>
-          <a:lstStyle/>
-          <a:p>
-            <a:endParaRPr lang="en-US"/>
-          </a:p>
-        </p:txBody>
-      </p:sp>
+        </p:nvGraphicFramePr>
+        <p:xfrm>
+          <a:off x="1371600" y="1752600"/>
+          <a:ext cx="6172200" cy="3376241"/>
+        </p:xfrm>
+        <a:graphic>
+          <a:graphicData uri="http://schemas.openxmlformats.org/drawingml/2006/table">
+            <a:tbl>
+              <a:tblPr/>
+              <a:tblGrid>
+                <a:gridCol w="2782018"/>
+                <a:gridCol w="1021235"/>
+                <a:gridCol w="985402"/>
+                <a:gridCol w="1383545"/>
+              </a:tblGrid>
+              <a:tr h="617120">
+                <a:tc>
+                  <a:txBody>
+                    <a:bodyPr/>
+                    <a:lstStyle/>
+                    <a:p>
+                      <a:pPr marL="0" marR="0" algn="ctr">
+                        <a:lnSpc>
+                          <a:spcPct val="115000"/>
+                        </a:lnSpc>
+                        <a:spcBef>
+                          <a:spcPts val="1000"/>
+                        </a:spcBef>
+                        <a:spcAft>
+                          <a:spcPts val="1000"/>
+                        </a:spcAft>
+                      </a:pPr>
+                      <a:r>
+                        <a:rPr lang="en-US" sz="1600" dirty="0">
+                          <a:latin typeface="Calibri"/>
+                          <a:ea typeface="Times New Roman"/>
+                          <a:cs typeface="Times New Roman"/>
+                        </a:rPr>
+                        <a:t>Total resources used: 19%</a:t>
+                      </a:r>
+                    </a:p>
+                  </a:txBody>
+                  <a:tcPr marL="0" marR="0" marT="0" marB="0" anchor="ctr">
+                    <a:lnL w="12700" cap="flat" cmpd="sng" algn="ctr">
+                      <a:solidFill>
+                        <a:srgbClr val="000000"/>
+                      </a:solidFill>
+                      <a:prstDash val="solid"/>
+                      <a:round/>
+                      <a:headEnd type="none" w="med" len="med"/>
+                      <a:tailEnd type="none" w="med" len="med"/>
+                    </a:lnL>
+                    <a:lnR>
+                      <a:noFill/>
+                    </a:lnR>
+                    <a:lnT w="12700" cap="flat" cmpd="sng" algn="ctr">
+                      <a:solidFill>
+                        <a:srgbClr val="000000"/>
+                      </a:solidFill>
+                      <a:prstDash val="solid"/>
+                      <a:round/>
+                      <a:headEnd type="none" w="med" len="med"/>
+                      <a:tailEnd type="none" w="med" len="med"/>
+                    </a:lnT>
+                    <a:lnB>
+                      <a:noFill/>
+                    </a:lnB>
+                  </a:tcPr>
+                </a:tc>
+                <a:tc gridSpan="3">
+                  <a:txBody>
+                    <a:bodyPr/>
+                    <a:lstStyle/>
+                    <a:p>
+                      <a:pPr marL="0" marR="0" algn="ctr">
+                        <a:lnSpc>
+                          <a:spcPct val="115000"/>
+                        </a:lnSpc>
+                        <a:spcBef>
+                          <a:spcPts val="1000"/>
+                        </a:spcBef>
+                        <a:spcAft>
+                          <a:spcPts val="1000"/>
+                        </a:spcAft>
+                      </a:pPr>
+                      <a:r>
+                        <a:rPr lang="en-US" sz="1600" b="1" u="sng">
+                          <a:solidFill>
+                            <a:srgbClr val="000000"/>
+                          </a:solidFill>
+                          <a:latin typeface="Calibri"/>
+                          <a:ea typeface="Calibri"/>
+                          <a:cs typeface="Calibri"/>
+                        </a:rPr>
+                        <a:t>Device Utilization Summary</a:t>
+                      </a:r>
+                      <a:endParaRPr lang="en-US" sz="1600">
+                        <a:latin typeface="Calibri"/>
+                        <a:ea typeface="Times New Roman"/>
+                        <a:cs typeface="Times New Roman"/>
+                      </a:endParaRPr>
+                    </a:p>
+                  </a:txBody>
+                  <a:tcPr marL="0" marR="0" marT="0" marB="0" anchor="ctr">
+                    <a:lnL>
+                      <a:noFill/>
+                    </a:lnL>
+                    <a:lnR w="12700" cap="flat" cmpd="sng" algn="ctr">
+                      <a:solidFill>
+                        <a:srgbClr val="000000"/>
+                      </a:solidFill>
+                      <a:prstDash val="solid"/>
+                      <a:round/>
+                      <a:headEnd type="none" w="med" len="med"/>
+                      <a:tailEnd type="none" w="med" len="med"/>
+                    </a:lnR>
+                    <a:lnT w="12700" cap="flat" cmpd="sng" algn="ctr">
+                      <a:solidFill>
+                        <a:srgbClr val="000000"/>
+                      </a:solidFill>
+                      <a:prstDash val="solid"/>
+                      <a:round/>
+                      <a:headEnd type="none" w="med" len="med"/>
+                      <a:tailEnd type="none" w="med" len="med"/>
+                    </a:lnT>
+                    <a:lnB>
+                      <a:noFill/>
+                    </a:lnB>
+                  </a:tcPr>
+                </a:tc>
+                <a:tc hMerge="1">
+                  <a:txBody>
+                    <a:bodyPr/>
+                    <a:lstStyle/>
+                    <a:p>
+                      <a:endParaRPr lang="en-US"/>
+                    </a:p>
+                  </a:txBody>
+                  <a:tcPr/>
+                </a:tc>
+                <a:tc hMerge="1">
+                  <a:txBody>
+                    <a:bodyPr/>
+                    <a:lstStyle/>
+                    <a:p>
+                      <a:endParaRPr lang="en-US"/>
+                    </a:p>
+                  </a:txBody>
+                  <a:tcPr/>
+                </a:tc>
+              </a:tr>
+              <a:tr h="306569">
+                <a:tc>
+                  <a:txBody>
+                    <a:bodyPr/>
+                    <a:lstStyle/>
+                    <a:p>
+                      <a:pPr marL="0" marR="0" algn="ctr">
+                        <a:lnSpc>
+                          <a:spcPct val="115000"/>
+                        </a:lnSpc>
+                        <a:spcBef>
+                          <a:spcPts val="1000"/>
+                        </a:spcBef>
+                        <a:spcAft>
+                          <a:spcPts val="1000"/>
+                        </a:spcAft>
+                      </a:pPr>
+                      <a:r>
+                        <a:rPr lang="en-US" sz="1600">
+                          <a:solidFill>
+                            <a:srgbClr val="000000"/>
+                          </a:solidFill>
+                          <a:latin typeface="Calibri"/>
+                          <a:ea typeface="Calibri"/>
+                          <a:cs typeface="Calibri"/>
+                        </a:rPr>
+                        <a:t>Logic Utilization</a:t>
+                      </a:r>
+                      <a:endParaRPr lang="en-US" sz="1600">
+                        <a:latin typeface="Calibri"/>
+                        <a:ea typeface="Times New Roman"/>
+                        <a:cs typeface="Times New Roman"/>
+                      </a:endParaRPr>
+                    </a:p>
+                  </a:txBody>
+                  <a:tcPr marL="0" marR="0" marT="0" marB="0" anchor="ctr">
+                    <a:lnL w="12700" cap="flat" cmpd="sng" algn="ctr">
+                      <a:solidFill>
+                        <a:srgbClr val="000000"/>
+                      </a:solidFill>
+                      <a:prstDash val="solid"/>
+                      <a:round/>
+                      <a:headEnd type="none" w="med" len="med"/>
+                      <a:tailEnd type="none" w="med" len="med"/>
+                    </a:lnL>
+                    <a:lnR>
+                      <a:noFill/>
+                    </a:lnR>
+                    <a:lnT>
+                      <a:noFill/>
+                    </a:lnT>
+                    <a:lnB>
+                      <a:noFill/>
+                    </a:lnB>
+                  </a:tcPr>
+                </a:tc>
+                <a:tc>
+                  <a:txBody>
+                    <a:bodyPr/>
+                    <a:lstStyle/>
+                    <a:p>
+                      <a:pPr marL="0" marR="0" algn="ctr">
+                        <a:lnSpc>
+                          <a:spcPct val="115000"/>
+                        </a:lnSpc>
+                        <a:spcBef>
+                          <a:spcPts val="1000"/>
+                        </a:spcBef>
+                        <a:spcAft>
+                          <a:spcPts val="1000"/>
+                        </a:spcAft>
+                      </a:pPr>
+                      <a:r>
+                        <a:rPr lang="en-US" sz="1600">
+                          <a:solidFill>
+                            <a:srgbClr val="000000"/>
+                          </a:solidFill>
+                          <a:latin typeface="Calibri"/>
+                          <a:ea typeface="Calibri"/>
+                          <a:cs typeface="Calibri"/>
+                        </a:rPr>
+                        <a:t>Used</a:t>
+                      </a:r>
+                      <a:endParaRPr lang="en-US" sz="1600">
+                        <a:latin typeface="Calibri"/>
+                        <a:ea typeface="Times New Roman"/>
+                        <a:cs typeface="Times New Roman"/>
+                      </a:endParaRPr>
+                    </a:p>
+                  </a:txBody>
+                  <a:tcPr marL="0" marR="0" marT="0" marB="0" anchor="ctr">
+                    <a:lnL>
+                      <a:noFill/>
+                    </a:lnL>
+                    <a:lnR>
+                      <a:noFill/>
+                    </a:lnR>
+                    <a:lnT>
+                      <a:noFill/>
+                    </a:lnT>
+                    <a:lnB>
+                      <a:noFill/>
+                    </a:lnB>
+                  </a:tcPr>
+                </a:tc>
+                <a:tc>
+                  <a:txBody>
+                    <a:bodyPr/>
+                    <a:lstStyle/>
+                    <a:p>
+                      <a:pPr marL="0" marR="0" algn="ctr">
+                        <a:lnSpc>
+                          <a:spcPct val="115000"/>
+                        </a:lnSpc>
+                        <a:spcBef>
+                          <a:spcPts val="1000"/>
+                        </a:spcBef>
+                        <a:spcAft>
+                          <a:spcPts val="1000"/>
+                        </a:spcAft>
+                      </a:pPr>
+                      <a:r>
+                        <a:rPr lang="en-US" sz="1600">
+                          <a:solidFill>
+                            <a:srgbClr val="000000"/>
+                          </a:solidFill>
+                          <a:latin typeface="Calibri"/>
+                          <a:ea typeface="Calibri"/>
+                          <a:cs typeface="Calibri"/>
+                        </a:rPr>
+                        <a:t>Available</a:t>
+                      </a:r>
+                      <a:endParaRPr lang="en-US" sz="1600">
+                        <a:latin typeface="Calibri"/>
+                        <a:ea typeface="Times New Roman"/>
+                        <a:cs typeface="Times New Roman"/>
+                      </a:endParaRPr>
+                    </a:p>
+                  </a:txBody>
+                  <a:tcPr marL="0" marR="0" marT="0" marB="0" anchor="ctr">
+                    <a:lnL>
+                      <a:noFill/>
+                    </a:lnL>
+                    <a:lnR>
+                      <a:noFill/>
+                    </a:lnR>
+                    <a:lnT>
+                      <a:noFill/>
+                    </a:lnT>
+                    <a:lnB>
+                      <a:noFill/>
+                    </a:lnB>
+                  </a:tcPr>
+                </a:tc>
+                <a:tc>
+                  <a:txBody>
+                    <a:bodyPr/>
+                    <a:lstStyle/>
+                    <a:p>
+                      <a:pPr marL="0" marR="0" algn="ctr">
+                        <a:lnSpc>
+                          <a:spcPct val="115000"/>
+                        </a:lnSpc>
+                        <a:spcBef>
+                          <a:spcPts val="1000"/>
+                        </a:spcBef>
+                        <a:spcAft>
+                          <a:spcPts val="1000"/>
+                        </a:spcAft>
+                      </a:pPr>
+                      <a:r>
+                        <a:rPr lang="en-US" sz="1600">
+                          <a:solidFill>
+                            <a:srgbClr val="000000"/>
+                          </a:solidFill>
+                          <a:latin typeface="Calibri"/>
+                          <a:ea typeface="Calibri"/>
+                          <a:cs typeface="Calibri"/>
+                        </a:rPr>
+                        <a:t>Utilization</a:t>
+                      </a:r>
+                      <a:endParaRPr lang="en-US" sz="1600">
+                        <a:latin typeface="Calibri"/>
+                        <a:ea typeface="Times New Roman"/>
+                        <a:cs typeface="Times New Roman"/>
+                      </a:endParaRPr>
+                    </a:p>
+                  </a:txBody>
+                  <a:tcPr marL="0" marR="0" marT="0" marB="0" anchor="ctr">
+                    <a:lnL>
+                      <a:noFill/>
+                    </a:lnL>
+                    <a:lnR w="12700" cap="flat" cmpd="sng" algn="ctr">
+                      <a:solidFill>
+                        <a:srgbClr val="000000"/>
+                      </a:solidFill>
+                      <a:prstDash val="solid"/>
+                      <a:round/>
+                      <a:headEnd type="none" w="med" len="med"/>
+                      <a:tailEnd type="none" w="med" len="med"/>
+                    </a:lnR>
+                    <a:lnT>
+                      <a:noFill/>
+                    </a:lnT>
+                    <a:lnB>
+                      <a:noFill/>
+                    </a:lnB>
+                  </a:tcPr>
+                </a:tc>
+              </a:tr>
+              <a:tr h="306569">
+                <a:tc>
+                  <a:txBody>
+                    <a:bodyPr/>
+                    <a:lstStyle/>
+                    <a:p>
+                      <a:pPr marL="0" marR="0" algn="ctr">
+                        <a:lnSpc>
+                          <a:spcPct val="115000"/>
+                        </a:lnSpc>
+                        <a:spcBef>
+                          <a:spcPts val="1000"/>
+                        </a:spcBef>
+                        <a:spcAft>
+                          <a:spcPts val="1000"/>
+                        </a:spcAft>
+                      </a:pPr>
+                      <a:r>
+                        <a:rPr lang="en-US" sz="1600">
+                          <a:solidFill>
+                            <a:srgbClr val="000000"/>
+                          </a:solidFill>
+                          <a:latin typeface="Calibri"/>
+                          <a:ea typeface="Calibri"/>
+                          <a:cs typeface="Calibri"/>
+                        </a:rPr>
+                        <a:t>Number of Slice Latches</a:t>
+                      </a:r>
+                      <a:endParaRPr lang="en-US" sz="1600">
+                        <a:latin typeface="Calibri"/>
+                        <a:ea typeface="Times New Roman"/>
+                        <a:cs typeface="Times New Roman"/>
+                      </a:endParaRPr>
+                    </a:p>
+                  </a:txBody>
+                  <a:tcPr marL="0" marR="0" marT="0" marB="0" anchor="ctr">
+                    <a:lnL w="12700" cap="flat" cmpd="sng" algn="ctr">
+                      <a:solidFill>
+                        <a:srgbClr val="000000"/>
+                      </a:solidFill>
+                      <a:prstDash val="solid"/>
+                      <a:round/>
+                      <a:headEnd type="none" w="med" len="med"/>
+                      <a:tailEnd type="none" w="med" len="med"/>
+                    </a:lnL>
+                    <a:lnR>
+                      <a:noFill/>
+                    </a:lnR>
+                    <a:lnT>
+                      <a:noFill/>
+                    </a:lnT>
+                    <a:lnB>
+                      <a:noFill/>
+                    </a:lnB>
+                  </a:tcPr>
+                </a:tc>
+                <a:tc>
+                  <a:txBody>
+                    <a:bodyPr/>
+                    <a:lstStyle/>
+                    <a:p>
+                      <a:pPr marL="0" marR="0" algn="ctr">
+                        <a:lnSpc>
+                          <a:spcPct val="115000"/>
+                        </a:lnSpc>
+                        <a:spcBef>
+                          <a:spcPts val="1000"/>
+                        </a:spcBef>
+                        <a:spcAft>
+                          <a:spcPts val="1000"/>
+                        </a:spcAft>
+                      </a:pPr>
+                      <a:r>
+                        <a:rPr lang="en-US" sz="1600">
+                          <a:solidFill>
+                            <a:srgbClr val="000000"/>
+                          </a:solidFill>
+                          <a:latin typeface="Calibri"/>
+                          <a:ea typeface="Calibri"/>
+                          <a:cs typeface="Calibri"/>
+                        </a:rPr>
+                        <a:t>22</a:t>
+                      </a:r>
+                      <a:endParaRPr lang="en-US" sz="1600">
+                        <a:latin typeface="Calibri"/>
+                        <a:ea typeface="Times New Roman"/>
+                        <a:cs typeface="Times New Roman"/>
+                      </a:endParaRPr>
+                    </a:p>
+                  </a:txBody>
+                  <a:tcPr marL="0" marR="0" marT="0" marB="0" anchor="ctr">
+                    <a:lnL>
+                      <a:noFill/>
+                    </a:lnL>
+                    <a:lnR>
+                      <a:noFill/>
+                    </a:lnR>
+                    <a:lnT>
+                      <a:noFill/>
+                    </a:lnT>
+                    <a:lnB>
+                      <a:noFill/>
+                    </a:lnB>
+                  </a:tcPr>
+                </a:tc>
+                <a:tc>
+                  <a:txBody>
+                    <a:bodyPr/>
+                    <a:lstStyle/>
+                    <a:p>
+                      <a:pPr marL="0" marR="0" algn="ctr">
+                        <a:lnSpc>
+                          <a:spcPct val="115000"/>
+                        </a:lnSpc>
+                        <a:spcBef>
+                          <a:spcPts val="1000"/>
+                        </a:spcBef>
+                        <a:spcAft>
+                          <a:spcPts val="1000"/>
+                        </a:spcAft>
+                      </a:pPr>
+                      <a:r>
+                        <a:rPr lang="en-US" sz="1600">
+                          <a:solidFill>
+                            <a:srgbClr val="000000"/>
+                          </a:solidFill>
+                          <a:latin typeface="Calibri"/>
+                          <a:ea typeface="Calibri"/>
+                          <a:cs typeface="Calibri"/>
+                        </a:rPr>
+                        <a:t>1,920</a:t>
+                      </a:r>
+                      <a:endParaRPr lang="en-US" sz="1600">
+                        <a:latin typeface="Calibri"/>
+                        <a:ea typeface="Times New Roman"/>
+                        <a:cs typeface="Times New Roman"/>
+                      </a:endParaRPr>
+                    </a:p>
+                  </a:txBody>
+                  <a:tcPr marL="0" marR="0" marT="0" marB="0" anchor="ctr">
+                    <a:lnL>
+                      <a:noFill/>
+                    </a:lnL>
+                    <a:lnR>
+                      <a:noFill/>
+                    </a:lnR>
+                    <a:lnT>
+                      <a:noFill/>
+                    </a:lnT>
+                    <a:lnB>
+                      <a:noFill/>
+                    </a:lnB>
+                  </a:tcPr>
+                </a:tc>
+                <a:tc>
+                  <a:txBody>
+                    <a:bodyPr/>
+                    <a:lstStyle/>
+                    <a:p>
+                      <a:pPr marL="0" marR="0" algn="ctr">
+                        <a:lnSpc>
+                          <a:spcPct val="115000"/>
+                        </a:lnSpc>
+                        <a:spcBef>
+                          <a:spcPts val="1000"/>
+                        </a:spcBef>
+                        <a:spcAft>
+                          <a:spcPts val="1000"/>
+                        </a:spcAft>
+                      </a:pPr>
+                      <a:r>
+                        <a:rPr lang="en-US" sz="1600">
+                          <a:solidFill>
+                            <a:srgbClr val="000000"/>
+                          </a:solidFill>
+                          <a:latin typeface="Calibri"/>
+                          <a:ea typeface="Calibri"/>
+                          <a:cs typeface="Calibri"/>
+                        </a:rPr>
+                        <a:t>1%</a:t>
+                      </a:r>
+                      <a:endParaRPr lang="en-US" sz="1600">
+                        <a:latin typeface="Calibri"/>
+                        <a:ea typeface="Times New Roman"/>
+                        <a:cs typeface="Times New Roman"/>
+                      </a:endParaRPr>
+                    </a:p>
+                  </a:txBody>
+                  <a:tcPr marL="0" marR="0" marT="0" marB="0" anchor="ctr">
+                    <a:lnL>
+                      <a:noFill/>
+                    </a:lnL>
+                    <a:lnR w="12700" cap="flat" cmpd="sng" algn="ctr">
+                      <a:solidFill>
+                        <a:srgbClr val="000000"/>
+                      </a:solidFill>
+                      <a:prstDash val="solid"/>
+                      <a:round/>
+                      <a:headEnd type="none" w="med" len="med"/>
+                      <a:tailEnd type="none" w="med" len="med"/>
+                    </a:lnR>
+                    <a:lnT>
+                      <a:noFill/>
+                    </a:lnT>
+                    <a:lnB>
+                      <a:noFill/>
+                    </a:lnB>
+                  </a:tcPr>
+                </a:tc>
+              </a:tr>
+              <a:tr h="306569">
+                <a:tc>
+                  <a:txBody>
+                    <a:bodyPr/>
+                    <a:lstStyle/>
+                    <a:p>
+                      <a:pPr marL="0" marR="0" algn="ctr">
+                        <a:lnSpc>
+                          <a:spcPct val="115000"/>
+                        </a:lnSpc>
+                        <a:spcBef>
+                          <a:spcPts val="1000"/>
+                        </a:spcBef>
+                        <a:spcAft>
+                          <a:spcPts val="1000"/>
+                        </a:spcAft>
+                      </a:pPr>
+                      <a:r>
+                        <a:rPr lang="en-US" sz="1600">
+                          <a:solidFill>
+                            <a:srgbClr val="000000"/>
+                          </a:solidFill>
+                          <a:latin typeface="Calibri"/>
+                          <a:ea typeface="Calibri"/>
+                          <a:cs typeface="Calibri"/>
+                        </a:rPr>
+                        <a:t>Occupied Slices</a:t>
+                      </a:r>
+                      <a:endParaRPr lang="en-US" sz="1600">
+                        <a:latin typeface="Calibri"/>
+                        <a:ea typeface="Times New Roman"/>
+                        <a:cs typeface="Times New Roman"/>
+                      </a:endParaRPr>
+                    </a:p>
+                  </a:txBody>
+                  <a:tcPr marL="0" marR="0" marT="0" marB="0" anchor="ctr">
+                    <a:lnL w="12700" cap="flat" cmpd="sng" algn="ctr">
+                      <a:solidFill>
+                        <a:srgbClr val="000000"/>
+                      </a:solidFill>
+                      <a:prstDash val="solid"/>
+                      <a:round/>
+                      <a:headEnd type="none" w="med" len="med"/>
+                      <a:tailEnd type="none" w="med" len="med"/>
+                    </a:lnL>
+                    <a:lnR>
+                      <a:noFill/>
+                    </a:lnR>
+                    <a:lnT>
+                      <a:noFill/>
+                    </a:lnT>
+                    <a:lnB>
+                      <a:noFill/>
+                    </a:lnB>
+                  </a:tcPr>
+                </a:tc>
+                <a:tc>
+                  <a:txBody>
+                    <a:bodyPr/>
+                    <a:lstStyle/>
+                    <a:p>
+                      <a:pPr marL="0" marR="0" algn="ctr">
+                        <a:lnSpc>
+                          <a:spcPct val="115000"/>
+                        </a:lnSpc>
+                        <a:spcBef>
+                          <a:spcPts val="1000"/>
+                        </a:spcBef>
+                        <a:spcAft>
+                          <a:spcPts val="1000"/>
+                        </a:spcAft>
+                      </a:pPr>
+                      <a:r>
+                        <a:rPr lang="en-US" sz="1600">
+                          <a:solidFill>
+                            <a:srgbClr val="000000"/>
+                          </a:solidFill>
+                          <a:latin typeface="Calibri"/>
+                          <a:ea typeface="Calibri"/>
+                          <a:cs typeface="Calibri"/>
+                        </a:rPr>
+                        <a:t>197</a:t>
+                      </a:r>
+                      <a:endParaRPr lang="en-US" sz="1600">
+                        <a:latin typeface="Calibri"/>
+                        <a:ea typeface="Times New Roman"/>
+                        <a:cs typeface="Times New Roman"/>
+                      </a:endParaRPr>
+                    </a:p>
+                  </a:txBody>
+                  <a:tcPr marL="0" marR="0" marT="0" marB="0" anchor="ctr">
+                    <a:lnL>
+                      <a:noFill/>
+                    </a:lnL>
+                    <a:lnR>
+                      <a:noFill/>
+                    </a:lnR>
+                    <a:lnT>
+                      <a:noFill/>
+                    </a:lnT>
+                    <a:lnB>
+                      <a:noFill/>
+                    </a:lnB>
+                  </a:tcPr>
+                </a:tc>
+                <a:tc>
+                  <a:txBody>
+                    <a:bodyPr/>
+                    <a:lstStyle/>
+                    <a:p>
+                      <a:pPr marL="0" marR="0" algn="ctr">
+                        <a:lnSpc>
+                          <a:spcPct val="115000"/>
+                        </a:lnSpc>
+                        <a:spcBef>
+                          <a:spcPts val="1000"/>
+                        </a:spcBef>
+                        <a:spcAft>
+                          <a:spcPts val="1000"/>
+                        </a:spcAft>
+                      </a:pPr>
+                      <a:r>
+                        <a:rPr lang="en-US" sz="1600">
+                          <a:solidFill>
+                            <a:srgbClr val="000000"/>
+                          </a:solidFill>
+                          <a:latin typeface="Calibri"/>
+                          <a:ea typeface="Calibri"/>
+                          <a:cs typeface="Calibri"/>
+                        </a:rPr>
+                        <a:t>960</a:t>
+                      </a:r>
+                      <a:endParaRPr lang="en-US" sz="1600">
+                        <a:latin typeface="Calibri"/>
+                        <a:ea typeface="Times New Roman"/>
+                        <a:cs typeface="Times New Roman"/>
+                      </a:endParaRPr>
+                    </a:p>
+                  </a:txBody>
+                  <a:tcPr marL="0" marR="0" marT="0" marB="0" anchor="ctr">
+                    <a:lnL>
+                      <a:noFill/>
+                    </a:lnL>
+                    <a:lnR>
+                      <a:noFill/>
+                    </a:lnR>
+                    <a:lnT>
+                      <a:noFill/>
+                    </a:lnT>
+                    <a:lnB>
+                      <a:noFill/>
+                    </a:lnB>
+                  </a:tcPr>
+                </a:tc>
+                <a:tc>
+                  <a:txBody>
+                    <a:bodyPr/>
+                    <a:lstStyle/>
+                    <a:p>
+                      <a:pPr marL="0" marR="0" algn="ctr">
+                        <a:lnSpc>
+                          <a:spcPct val="115000"/>
+                        </a:lnSpc>
+                        <a:spcBef>
+                          <a:spcPts val="1000"/>
+                        </a:spcBef>
+                        <a:spcAft>
+                          <a:spcPts val="1000"/>
+                        </a:spcAft>
+                      </a:pPr>
+                      <a:r>
+                        <a:rPr lang="en-US" sz="1600">
+                          <a:solidFill>
+                            <a:srgbClr val="000000"/>
+                          </a:solidFill>
+                          <a:latin typeface="Calibri"/>
+                          <a:ea typeface="Calibri"/>
+                          <a:cs typeface="Calibri"/>
+                        </a:rPr>
+                        <a:t>20%</a:t>
+                      </a:r>
+                      <a:endParaRPr lang="en-US" sz="1600">
+                        <a:latin typeface="Calibri"/>
+                        <a:ea typeface="Times New Roman"/>
+                        <a:cs typeface="Times New Roman"/>
+                      </a:endParaRPr>
+                    </a:p>
+                  </a:txBody>
+                  <a:tcPr marL="0" marR="0" marT="0" marB="0" anchor="ctr">
+                    <a:lnL>
+                      <a:noFill/>
+                    </a:lnL>
+                    <a:lnR w="12700" cap="flat" cmpd="sng" algn="ctr">
+                      <a:solidFill>
+                        <a:srgbClr val="000000"/>
+                      </a:solidFill>
+                      <a:prstDash val="solid"/>
+                      <a:round/>
+                      <a:headEnd type="none" w="med" len="med"/>
+                      <a:tailEnd type="none" w="med" len="med"/>
+                    </a:lnR>
+                    <a:lnT>
+                      <a:noFill/>
+                    </a:lnT>
+                    <a:lnB>
+                      <a:noFill/>
+                    </a:lnB>
+                  </a:tcPr>
+                </a:tc>
+              </a:tr>
+              <a:tr h="306569">
+                <a:tc>
+                  <a:txBody>
+                    <a:bodyPr/>
+                    <a:lstStyle/>
+                    <a:p>
+                      <a:pPr marL="0" marR="0" algn="ctr">
+                        <a:lnSpc>
+                          <a:spcPct val="115000"/>
+                        </a:lnSpc>
+                        <a:spcBef>
+                          <a:spcPts val="1000"/>
+                        </a:spcBef>
+                        <a:spcAft>
+                          <a:spcPts val="1000"/>
+                        </a:spcAft>
+                      </a:pPr>
+                      <a:r>
+                        <a:rPr lang="en-US" sz="1600">
+                          <a:solidFill>
+                            <a:srgbClr val="000000"/>
+                          </a:solidFill>
+                          <a:latin typeface="Calibri"/>
+                          <a:ea typeface="Calibri"/>
+                          <a:cs typeface="Calibri"/>
+                        </a:rPr>
+                        <a:t>4 input LUTs</a:t>
+                      </a:r>
+                      <a:endParaRPr lang="en-US" sz="1600">
+                        <a:latin typeface="Calibri"/>
+                        <a:ea typeface="Times New Roman"/>
+                        <a:cs typeface="Times New Roman"/>
+                      </a:endParaRPr>
+                    </a:p>
+                  </a:txBody>
+                  <a:tcPr marL="0" marR="0" marT="0" marB="0" anchor="ctr">
+                    <a:lnL w="12700" cap="flat" cmpd="sng" algn="ctr">
+                      <a:solidFill>
+                        <a:srgbClr val="000000"/>
+                      </a:solidFill>
+                      <a:prstDash val="solid"/>
+                      <a:round/>
+                      <a:headEnd type="none" w="med" len="med"/>
+                      <a:tailEnd type="none" w="med" len="med"/>
+                    </a:lnL>
+                    <a:lnR>
+                      <a:noFill/>
+                    </a:lnR>
+                    <a:lnT>
+                      <a:noFill/>
+                    </a:lnT>
+                    <a:lnB>
+                      <a:noFill/>
+                    </a:lnB>
+                  </a:tcPr>
+                </a:tc>
+                <a:tc>
+                  <a:txBody>
+                    <a:bodyPr/>
+                    <a:lstStyle/>
+                    <a:p>
+                      <a:pPr marL="0" marR="0" algn="ctr">
+                        <a:lnSpc>
+                          <a:spcPct val="115000"/>
+                        </a:lnSpc>
+                        <a:spcBef>
+                          <a:spcPts val="1000"/>
+                        </a:spcBef>
+                        <a:spcAft>
+                          <a:spcPts val="1000"/>
+                        </a:spcAft>
+                      </a:pPr>
+                      <a:r>
+                        <a:rPr lang="en-US" sz="1600">
+                          <a:solidFill>
+                            <a:srgbClr val="000000"/>
+                          </a:solidFill>
+                          <a:latin typeface="Calibri"/>
+                          <a:ea typeface="Calibri"/>
+                          <a:cs typeface="Calibri"/>
+                        </a:rPr>
+                        <a:t>360</a:t>
+                      </a:r>
+                      <a:endParaRPr lang="en-US" sz="1600">
+                        <a:latin typeface="Calibri"/>
+                        <a:ea typeface="Times New Roman"/>
+                        <a:cs typeface="Times New Roman"/>
+                      </a:endParaRPr>
+                    </a:p>
+                  </a:txBody>
+                  <a:tcPr marL="0" marR="0" marT="0" marB="0" anchor="ctr">
+                    <a:lnL>
+                      <a:noFill/>
+                    </a:lnL>
+                    <a:lnR>
+                      <a:noFill/>
+                    </a:lnR>
+                    <a:lnT>
+                      <a:noFill/>
+                    </a:lnT>
+                    <a:lnB>
+                      <a:noFill/>
+                    </a:lnB>
+                  </a:tcPr>
+                </a:tc>
+                <a:tc>
+                  <a:txBody>
+                    <a:bodyPr/>
+                    <a:lstStyle/>
+                    <a:p>
+                      <a:pPr marL="0" marR="0" algn="ctr">
+                        <a:lnSpc>
+                          <a:spcPct val="115000"/>
+                        </a:lnSpc>
+                        <a:spcBef>
+                          <a:spcPts val="1000"/>
+                        </a:spcBef>
+                        <a:spcAft>
+                          <a:spcPts val="1000"/>
+                        </a:spcAft>
+                      </a:pPr>
+                      <a:r>
+                        <a:rPr lang="en-US" sz="1600">
+                          <a:solidFill>
+                            <a:srgbClr val="000000"/>
+                          </a:solidFill>
+                          <a:latin typeface="Calibri"/>
+                          <a:ea typeface="Calibri"/>
+                          <a:cs typeface="Calibri"/>
+                        </a:rPr>
+                        <a:t>1,920</a:t>
+                      </a:r>
+                      <a:endParaRPr lang="en-US" sz="1600">
+                        <a:latin typeface="Calibri"/>
+                        <a:ea typeface="Times New Roman"/>
+                        <a:cs typeface="Times New Roman"/>
+                      </a:endParaRPr>
+                    </a:p>
+                  </a:txBody>
+                  <a:tcPr marL="0" marR="0" marT="0" marB="0" anchor="ctr">
+                    <a:lnL>
+                      <a:noFill/>
+                    </a:lnL>
+                    <a:lnR>
+                      <a:noFill/>
+                    </a:lnR>
+                    <a:lnT>
+                      <a:noFill/>
+                    </a:lnT>
+                    <a:lnB>
+                      <a:noFill/>
+                    </a:lnB>
+                  </a:tcPr>
+                </a:tc>
+                <a:tc>
+                  <a:txBody>
+                    <a:bodyPr/>
+                    <a:lstStyle/>
+                    <a:p>
+                      <a:pPr marL="0" marR="0" algn="ctr">
+                        <a:lnSpc>
+                          <a:spcPct val="115000"/>
+                        </a:lnSpc>
+                        <a:spcBef>
+                          <a:spcPts val="1000"/>
+                        </a:spcBef>
+                        <a:spcAft>
+                          <a:spcPts val="1000"/>
+                        </a:spcAft>
+                      </a:pPr>
+                      <a:r>
+                        <a:rPr lang="en-US" sz="1600">
+                          <a:solidFill>
+                            <a:srgbClr val="000000"/>
+                          </a:solidFill>
+                          <a:latin typeface="Calibri"/>
+                          <a:ea typeface="Calibri"/>
+                          <a:cs typeface="Calibri"/>
+                        </a:rPr>
+                        <a:t>18%</a:t>
+                      </a:r>
+                      <a:endParaRPr lang="en-US" sz="1600">
+                        <a:latin typeface="Calibri"/>
+                        <a:ea typeface="Times New Roman"/>
+                        <a:cs typeface="Times New Roman"/>
+                      </a:endParaRPr>
+                    </a:p>
+                  </a:txBody>
+                  <a:tcPr marL="0" marR="0" marT="0" marB="0" anchor="ctr">
+                    <a:lnL>
+                      <a:noFill/>
+                    </a:lnL>
+                    <a:lnR w="12700" cap="flat" cmpd="sng" algn="ctr">
+                      <a:solidFill>
+                        <a:srgbClr val="000000"/>
+                      </a:solidFill>
+                      <a:prstDash val="solid"/>
+                      <a:round/>
+                      <a:headEnd type="none" w="med" len="med"/>
+                      <a:tailEnd type="none" w="med" len="med"/>
+                    </a:lnR>
+                    <a:lnT>
+                      <a:noFill/>
+                    </a:lnT>
+                    <a:lnB>
+                      <a:noFill/>
+                    </a:lnB>
+                  </a:tcPr>
+                </a:tc>
+              </a:tr>
+              <a:tr h="306569">
+                <a:tc>
+                  <a:txBody>
+                    <a:bodyPr/>
+                    <a:lstStyle/>
+                    <a:p>
+                      <a:pPr marL="0" marR="0" algn="ctr">
+                        <a:lnSpc>
+                          <a:spcPct val="115000"/>
+                        </a:lnSpc>
+                        <a:spcBef>
+                          <a:spcPts val="1000"/>
+                        </a:spcBef>
+                        <a:spcAft>
+                          <a:spcPts val="1000"/>
+                        </a:spcAft>
+                      </a:pPr>
+                      <a:endParaRPr lang="en-US" sz="1600">
+                        <a:latin typeface="Calibri"/>
+                        <a:ea typeface="Times New Roman"/>
+                        <a:cs typeface="Times New Roman"/>
+                      </a:endParaRPr>
+                    </a:p>
+                  </a:txBody>
+                  <a:tcPr marL="0" marR="0" marT="0" marB="0" anchor="ctr">
+                    <a:lnL w="12700" cap="flat" cmpd="sng" algn="ctr">
+                      <a:solidFill>
+                        <a:srgbClr val="000000"/>
+                      </a:solidFill>
+                      <a:prstDash val="solid"/>
+                      <a:round/>
+                      <a:headEnd type="none" w="med" len="med"/>
+                      <a:tailEnd type="none" w="med" len="med"/>
+                    </a:lnL>
+                    <a:lnR>
+                      <a:noFill/>
+                    </a:lnR>
+                    <a:lnT>
+                      <a:noFill/>
+                    </a:lnT>
+                    <a:lnB>
+                      <a:noFill/>
+                    </a:lnB>
+                  </a:tcPr>
+                </a:tc>
+                <a:tc>
+                  <a:txBody>
+                    <a:bodyPr/>
+                    <a:lstStyle/>
+                    <a:p>
+                      <a:pPr marL="0" marR="0" algn="ctr">
+                        <a:lnSpc>
+                          <a:spcPct val="115000"/>
+                        </a:lnSpc>
+                        <a:spcBef>
+                          <a:spcPts val="1000"/>
+                        </a:spcBef>
+                        <a:spcAft>
+                          <a:spcPts val="1000"/>
+                        </a:spcAft>
+                      </a:pPr>
+                      <a:r>
+                        <a:rPr lang="en-US" sz="1600">
+                          <a:solidFill>
+                            <a:srgbClr val="000000"/>
+                          </a:solidFill>
+                          <a:latin typeface="Calibri"/>
+                          <a:ea typeface="Calibri"/>
+                          <a:cs typeface="Calibri"/>
+                        </a:rPr>
+                        <a:t>Logic</a:t>
+                      </a:r>
+                      <a:endParaRPr lang="en-US" sz="1600">
+                        <a:latin typeface="Calibri"/>
+                        <a:ea typeface="Times New Roman"/>
+                        <a:cs typeface="Times New Roman"/>
+                      </a:endParaRPr>
+                    </a:p>
+                  </a:txBody>
+                  <a:tcPr marL="0" marR="0" marT="0" marB="0" anchor="ctr">
+                    <a:lnL>
+                      <a:noFill/>
+                    </a:lnL>
+                    <a:lnR>
+                      <a:noFill/>
+                    </a:lnR>
+                    <a:lnT>
+                      <a:noFill/>
+                    </a:lnT>
+                    <a:lnB>
+                      <a:noFill/>
+                    </a:lnB>
+                  </a:tcPr>
+                </a:tc>
+                <a:tc>
+                  <a:txBody>
+                    <a:bodyPr/>
+                    <a:lstStyle/>
+                    <a:p>
+                      <a:pPr marL="0" marR="0" algn="ctr">
+                        <a:lnSpc>
+                          <a:spcPct val="115000"/>
+                        </a:lnSpc>
+                        <a:spcBef>
+                          <a:spcPts val="1000"/>
+                        </a:spcBef>
+                        <a:spcAft>
+                          <a:spcPts val="1000"/>
+                        </a:spcAft>
+                      </a:pPr>
+                      <a:r>
+                        <a:rPr lang="en-US" sz="1600">
+                          <a:solidFill>
+                            <a:srgbClr val="000000"/>
+                          </a:solidFill>
+                          <a:latin typeface="Calibri"/>
+                          <a:ea typeface="Calibri"/>
+                          <a:cs typeface="Calibri"/>
+                        </a:rPr>
+                        <a:t>328</a:t>
+                      </a:r>
+                      <a:endParaRPr lang="en-US" sz="1600">
+                        <a:latin typeface="Calibri"/>
+                        <a:ea typeface="Times New Roman"/>
+                        <a:cs typeface="Times New Roman"/>
+                      </a:endParaRPr>
+                    </a:p>
+                  </a:txBody>
+                  <a:tcPr marL="0" marR="0" marT="0" marB="0" anchor="ctr">
+                    <a:lnL>
+                      <a:noFill/>
+                    </a:lnL>
+                    <a:lnR>
+                      <a:noFill/>
+                    </a:lnR>
+                    <a:lnT>
+                      <a:noFill/>
+                    </a:lnT>
+                    <a:lnB>
+                      <a:noFill/>
+                    </a:lnB>
+                  </a:tcPr>
+                </a:tc>
+                <a:tc>
+                  <a:txBody>
+                    <a:bodyPr/>
+                    <a:lstStyle/>
+                    <a:p>
+                      <a:pPr marL="0" marR="0" algn="ctr">
+                        <a:lnSpc>
+                          <a:spcPct val="115000"/>
+                        </a:lnSpc>
+                        <a:spcBef>
+                          <a:spcPts val="1000"/>
+                        </a:spcBef>
+                        <a:spcAft>
+                          <a:spcPts val="1000"/>
+                        </a:spcAft>
+                      </a:pPr>
+                      <a:r>
+                        <a:rPr lang="en-US" sz="1600">
+                          <a:solidFill>
+                            <a:srgbClr val="000000"/>
+                          </a:solidFill>
+                          <a:latin typeface="Calibri"/>
+                          <a:ea typeface="Calibri"/>
+                          <a:cs typeface="Calibri"/>
+                        </a:rPr>
+                        <a:t>17%</a:t>
+                      </a:r>
+                      <a:endParaRPr lang="en-US" sz="1600">
+                        <a:latin typeface="Calibri"/>
+                        <a:ea typeface="Times New Roman"/>
+                        <a:cs typeface="Times New Roman"/>
+                      </a:endParaRPr>
+                    </a:p>
+                  </a:txBody>
+                  <a:tcPr marL="0" marR="0" marT="0" marB="0" anchor="ctr">
+                    <a:lnL>
+                      <a:noFill/>
+                    </a:lnL>
+                    <a:lnR w="12700" cap="flat" cmpd="sng" algn="ctr">
+                      <a:solidFill>
+                        <a:srgbClr val="000000"/>
+                      </a:solidFill>
+                      <a:prstDash val="solid"/>
+                      <a:round/>
+                      <a:headEnd type="none" w="med" len="med"/>
+                      <a:tailEnd type="none" w="med" len="med"/>
+                    </a:lnR>
+                    <a:lnT>
+                      <a:noFill/>
+                    </a:lnT>
+                    <a:lnB>
+                      <a:noFill/>
+                    </a:lnB>
+                  </a:tcPr>
+                </a:tc>
+              </a:tr>
+              <a:tr h="306569">
+                <a:tc>
+                  <a:txBody>
+                    <a:bodyPr/>
+                    <a:lstStyle/>
+                    <a:p>
+                      <a:pPr marL="0" marR="0" algn="ctr">
+                        <a:lnSpc>
+                          <a:spcPct val="115000"/>
+                        </a:lnSpc>
+                        <a:spcBef>
+                          <a:spcPts val="1000"/>
+                        </a:spcBef>
+                        <a:spcAft>
+                          <a:spcPts val="1000"/>
+                        </a:spcAft>
+                      </a:pPr>
+                      <a:endParaRPr lang="en-US" sz="1600">
+                        <a:latin typeface="Calibri"/>
+                        <a:ea typeface="Times New Roman"/>
+                        <a:cs typeface="Times New Roman"/>
+                      </a:endParaRPr>
+                    </a:p>
+                  </a:txBody>
+                  <a:tcPr marL="0" marR="0" marT="0" marB="0" anchor="ctr">
+                    <a:lnL w="12700" cap="flat" cmpd="sng" algn="ctr">
+                      <a:solidFill>
+                        <a:srgbClr val="000000"/>
+                      </a:solidFill>
+                      <a:prstDash val="solid"/>
+                      <a:round/>
+                      <a:headEnd type="none" w="med" len="med"/>
+                      <a:tailEnd type="none" w="med" len="med"/>
+                    </a:lnL>
+                    <a:lnR>
+                      <a:noFill/>
+                    </a:lnR>
+                    <a:lnT>
+                      <a:noFill/>
+                    </a:lnT>
+                    <a:lnB>
+                      <a:noFill/>
+                    </a:lnB>
+                  </a:tcPr>
+                </a:tc>
+                <a:tc>
+                  <a:txBody>
+                    <a:bodyPr/>
+                    <a:lstStyle/>
+                    <a:p>
+                      <a:pPr marL="0" marR="0" algn="ctr">
+                        <a:lnSpc>
+                          <a:spcPct val="115000"/>
+                        </a:lnSpc>
+                        <a:spcBef>
+                          <a:spcPts val="1000"/>
+                        </a:spcBef>
+                        <a:spcAft>
+                          <a:spcPts val="1000"/>
+                        </a:spcAft>
+                      </a:pPr>
+                      <a:r>
+                        <a:rPr lang="en-US" sz="1600">
+                          <a:solidFill>
+                            <a:srgbClr val="000000"/>
+                          </a:solidFill>
+                          <a:latin typeface="Calibri"/>
+                          <a:ea typeface="Calibri"/>
+                          <a:cs typeface="Calibri"/>
+                        </a:rPr>
+                        <a:t>Route-thru</a:t>
+                      </a:r>
+                      <a:endParaRPr lang="en-US" sz="1600">
+                        <a:latin typeface="Calibri"/>
+                        <a:ea typeface="Times New Roman"/>
+                        <a:cs typeface="Times New Roman"/>
+                      </a:endParaRPr>
+                    </a:p>
+                  </a:txBody>
+                  <a:tcPr marL="0" marR="0" marT="0" marB="0" anchor="ctr">
+                    <a:lnL>
+                      <a:noFill/>
+                    </a:lnL>
+                    <a:lnR>
+                      <a:noFill/>
+                    </a:lnR>
+                    <a:lnT>
+                      <a:noFill/>
+                    </a:lnT>
+                    <a:lnB>
+                      <a:noFill/>
+                    </a:lnB>
+                  </a:tcPr>
+                </a:tc>
+                <a:tc>
+                  <a:txBody>
+                    <a:bodyPr/>
+                    <a:lstStyle/>
+                    <a:p>
+                      <a:pPr marL="0" marR="0" algn="ctr">
+                        <a:lnSpc>
+                          <a:spcPct val="115000"/>
+                        </a:lnSpc>
+                        <a:spcBef>
+                          <a:spcPts val="1000"/>
+                        </a:spcBef>
+                        <a:spcAft>
+                          <a:spcPts val="1000"/>
+                        </a:spcAft>
+                      </a:pPr>
+                      <a:r>
+                        <a:rPr lang="en-US" sz="1600">
+                          <a:solidFill>
+                            <a:srgbClr val="000000"/>
+                          </a:solidFill>
+                          <a:latin typeface="Calibri"/>
+                          <a:ea typeface="Calibri"/>
+                          <a:cs typeface="Calibri"/>
+                        </a:rPr>
+                        <a:t>32</a:t>
+                      </a:r>
+                      <a:endParaRPr lang="en-US" sz="1600">
+                        <a:latin typeface="Calibri"/>
+                        <a:ea typeface="Times New Roman"/>
+                        <a:cs typeface="Times New Roman"/>
+                      </a:endParaRPr>
+                    </a:p>
+                  </a:txBody>
+                  <a:tcPr marL="0" marR="0" marT="0" marB="0" anchor="ctr">
+                    <a:lnL>
+                      <a:noFill/>
+                    </a:lnL>
+                    <a:lnR>
+                      <a:noFill/>
+                    </a:lnR>
+                    <a:lnT>
+                      <a:noFill/>
+                    </a:lnT>
+                    <a:lnB>
+                      <a:noFill/>
+                    </a:lnB>
+                  </a:tcPr>
+                </a:tc>
+                <a:tc>
+                  <a:txBody>
+                    <a:bodyPr/>
+                    <a:lstStyle/>
+                    <a:p>
+                      <a:pPr marL="0" marR="0" algn="ctr">
+                        <a:lnSpc>
+                          <a:spcPct val="115000"/>
+                        </a:lnSpc>
+                        <a:spcBef>
+                          <a:spcPts val="1000"/>
+                        </a:spcBef>
+                        <a:spcAft>
+                          <a:spcPts val="1000"/>
+                        </a:spcAft>
+                      </a:pPr>
+                      <a:r>
+                        <a:rPr lang="en-US" sz="1600">
+                          <a:latin typeface="Calibri"/>
+                          <a:ea typeface="Times New Roman"/>
+                          <a:cs typeface="Times New Roman"/>
+                        </a:rPr>
+                        <a:t>3%</a:t>
+                      </a:r>
+                    </a:p>
+                  </a:txBody>
+                  <a:tcPr marL="0" marR="0" marT="0" marB="0" anchor="ctr">
+                    <a:lnL>
+                      <a:noFill/>
+                    </a:lnL>
+                    <a:lnR w="12700" cap="flat" cmpd="sng" algn="ctr">
+                      <a:solidFill>
+                        <a:srgbClr val="000000"/>
+                      </a:solidFill>
+                      <a:prstDash val="solid"/>
+                      <a:round/>
+                      <a:headEnd type="none" w="med" len="med"/>
+                      <a:tailEnd type="none" w="med" len="med"/>
+                    </a:lnR>
+                    <a:lnT>
+                      <a:noFill/>
+                    </a:lnT>
+                    <a:lnB>
+                      <a:noFill/>
+                    </a:lnB>
+                  </a:tcPr>
+                </a:tc>
+              </a:tr>
+              <a:tr h="306569">
+                <a:tc>
+                  <a:txBody>
+                    <a:bodyPr/>
+                    <a:lstStyle/>
+                    <a:p>
+                      <a:pPr marL="0" marR="0" algn="ctr">
+                        <a:lnSpc>
+                          <a:spcPct val="115000"/>
+                        </a:lnSpc>
+                        <a:spcBef>
+                          <a:spcPts val="1000"/>
+                        </a:spcBef>
+                        <a:spcAft>
+                          <a:spcPts val="1000"/>
+                        </a:spcAft>
+                      </a:pPr>
+                      <a:r>
+                        <a:rPr lang="en-US" sz="1600">
+                          <a:solidFill>
+                            <a:srgbClr val="000000"/>
+                          </a:solidFill>
+                          <a:latin typeface="Calibri"/>
+                          <a:ea typeface="Calibri"/>
+                          <a:cs typeface="Calibri"/>
+                        </a:rPr>
+                        <a:t>Number of bonded IOBs</a:t>
+                      </a:r>
+                      <a:endParaRPr lang="en-US" sz="1600">
+                        <a:latin typeface="Calibri"/>
+                        <a:ea typeface="Times New Roman"/>
+                        <a:cs typeface="Times New Roman"/>
+                      </a:endParaRPr>
+                    </a:p>
+                  </a:txBody>
+                  <a:tcPr marL="0" marR="0" marT="0" marB="0" anchor="ctr">
+                    <a:lnL w="12700" cap="flat" cmpd="sng" algn="ctr">
+                      <a:solidFill>
+                        <a:srgbClr val="000000"/>
+                      </a:solidFill>
+                      <a:prstDash val="solid"/>
+                      <a:round/>
+                      <a:headEnd type="none" w="med" len="med"/>
+                      <a:tailEnd type="none" w="med" len="med"/>
+                    </a:lnL>
+                    <a:lnR>
+                      <a:noFill/>
+                    </a:lnR>
+                    <a:lnT>
+                      <a:noFill/>
+                    </a:lnT>
+                    <a:lnB>
+                      <a:noFill/>
+                    </a:lnB>
+                  </a:tcPr>
+                </a:tc>
+                <a:tc>
+                  <a:txBody>
+                    <a:bodyPr/>
+                    <a:lstStyle/>
+                    <a:p>
+                      <a:pPr marL="0" marR="0" algn="ctr">
+                        <a:lnSpc>
+                          <a:spcPct val="115000"/>
+                        </a:lnSpc>
+                        <a:spcBef>
+                          <a:spcPts val="1000"/>
+                        </a:spcBef>
+                        <a:spcAft>
+                          <a:spcPts val="1000"/>
+                        </a:spcAft>
+                      </a:pPr>
+                      <a:r>
+                        <a:rPr lang="en-US" sz="1600">
+                          <a:solidFill>
+                            <a:srgbClr val="000000"/>
+                          </a:solidFill>
+                          <a:latin typeface="Calibri"/>
+                          <a:ea typeface="Calibri"/>
+                          <a:cs typeface="Calibri"/>
+                        </a:rPr>
+                        <a:t>10</a:t>
+                      </a:r>
+                      <a:endParaRPr lang="en-US" sz="1600">
+                        <a:latin typeface="Calibri"/>
+                        <a:ea typeface="Times New Roman"/>
+                        <a:cs typeface="Times New Roman"/>
+                      </a:endParaRPr>
+                    </a:p>
+                  </a:txBody>
+                  <a:tcPr marL="0" marR="0" marT="0" marB="0" anchor="ctr">
+                    <a:lnL>
+                      <a:noFill/>
+                    </a:lnL>
+                    <a:lnR>
+                      <a:noFill/>
+                    </a:lnR>
+                    <a:lnT>
+                      <a:noFill/>
+                    </a:lnT>
+                    <a:lnB>
+                      <a:noFill/>
+                    </a:lnB>
+                  </a:tcPr>
+                </a:tc>
+                <a:tc>
+                  <a:txBody>
+                    <a:bodyPr/>
+                    <a:lstStyle/>
+                    <a:p>
+                      <a:pPr marL="0" marR="0" algn="ctr">
+                        <a:lnSpc>
+                          <a:spcPct val="115000"/>
+                        </a:lnSpc>
+                        <a:spcBef>
+                          <a:spcPts val="1000"/>
+                        </a:spcBef>
+                        <a:spcAft>
+                          <a:spcPts val="1000"/>
+                        </a:spcAft>
+                      </a:pPr>
+                      <a:r>
+                        <a:rPr lang="en-US" sz="1600">
+                          <a:solidFill>
+                            <a:srgbClr val="000000"/>
+                          </a:solidFill>
+                          <a:latin typeface="Calibri"/>
+                          <a:ea typeface="Calibri"/>
+                          <a:cs typeface="Calibri"/>
+                        </a:rPr>
+                        <a:t>108</a:t>
+                      </a:r>
+                      <a:endParaRPr lang="en-US" sz="1600">
+                        <a:latin typeface="Calibri"/>
+                        <a:ea typeface="Times New Roman"/>
+                        <a:cs typeface="Times New Roman"/>
+                      </a:endParaRPr>
+                    </a:p>
+                  </a:txBody>
+                  <a:tcPr marL="0" marR="0" marT="0" marB="0" anchor="ctr">
+                    <a:lnL>
+                      <a:noFill/>
+                    </a:lnL>
+                    <a:lnR>
+                      <a:noFill/>
+                    </a:lnR>
+                    <a:lnT>
+                      <a:noFill/>
+                    </a:lnT>
+                    <a:lnB>
+                      <a:noFill/>
+                    </a:lnB>
+                  </a:tcPr>
+                </a:tc>
+                <a:tc>
+                  <a:txBody>
+                    <a:bodyPr/>
+                    <a:lstStyle/>
+                    <a:p>
+                      <a:pPr marL="0" marR="0" algn="ctr">
+                        <a:lnSpc>
+                          <a:spcPct val="115000"/>
+                        </a:lnSpc>
+                        <a:spcBef>
+                          <a:spcPts val="1000"/>
+                        </a:spcBef>
+                        <a:spcAft>
+                          <a:spcPts val="1000"/>
+                        </a:spcAft>
+                      </a:pPr>
+                      <a:r>
+                        <a:rPr lang="en-US" sz="1600">
+                          <a:solidFill>
+                            <a:srgbClr val="000000"/>
+                          </a:solidFill>
+                          <a:latin typeface="Calibri"/>
+                          <a:ea typeface="Calibri"/>
+                          <a:cs typeface="Calibri"/>
+                        </a:rPr>
+                        <a:t>9%</a:t>
+                      </a:r>
+                      <a:endParaRPr lang="en-US" sz="1600">
+                        <a:latin typeface="Calibri"/>
+                        <a:ea typeface="Times New Roman"/>
+                        <a:cs typeface="Times New Roman"/>
+                      </a:endParaRPr>
+                    </a:p>
+                  </a:txBody>
+                  <a:tcPr marL="0" marR="0" marT="0" marB="0" anchor="ctr">
+                    <a:lnL>
+                      <a:noFill/>
+                    </a:lnL>
+                    <a:lnR w="12700" cap="flat" cmpd="sng" algn="ctr">
+                      <a:solidFill>
+                        <a:srgbClr val="000000"/>
+                      </a:solidFill>
+                      <a:prstDash val="solid"/>
+                      <a:round/>
+                      <a:headEnd type="none" w="med" len="med"/>
+                      <a:tailEnd type="none" w="med" len="med"/>
+                    </a:lnR>
+                    <a:lnT>
+                      <a:noFill/>
+                    </a:lnT>
+                    <a:lnB>
+                      <a:noFill/>
+                    </a:lnB>
+                  </a:tcPr>
+                </a:tc>
+              </a:tr>
+              <a:tr h="306569">
+                <a:tc>
+                  <a:txBody>
+                    <a:bodyPr/>
+                    <a:lstStyle/>
+                    <a:p>
+                      <a:pPr marL="0" marR="0" algn="ctr">
+                        <a:lnSpc>
+                          <a:spcPct val="115000"/>
+                        </a:lnSpc>
+                        <a:spcBef>
+                          <a:spcPts val="1000"/>
+                        </a:spcBef>
+                        <a:spcAft>
+                          <a:spcPts val="1000"/>
+                        </a:spcAft>
+                      </a:pPr>
+                      <a:r>
+                        <a:rPr lang="en-US" sz="1600">
+                          <a:solidFill>
+                            <a:srgbClr val="000000"/>
+                          </a:solidFill>
+                          <a:latin typeface="Calibri"/>
+                          <a:ea typeface="Calibri"/>
+                          <a:cs typeface="Calibri"/>
+                        </a:rPr>
+                        <a:t>MULT18X18SIOs</a:t>
+                      </a:r>
+                      <a:endParaRPr lang="en-US" sz="1600">
+                        <a:latin typeface="Calibri"/>
+                        <a:ea typeface="Times New Roman"/>
+                        <a:cs typeface="Times New Roman"/>
+                      </a:endParaRPr>
+                    </a:p>
+                  </a:txBody>
+                  <a:tcPr marL="0" marR="0" marT="0" marB="0" anchor="ctr">
+                    <a:lnL w="12700" cap="flat" cmpd="sng" algn="ctr">
+                      <a:solidFill>
+                        <a:srgbClr val="000000"/>
+                      </a:solidFill>
+                      <a:prstDash val="solid"/>
+                      <a:round/>
+                      <a:headEnd type="none" w="med" len="med"/>
+                      <a:tailEnd type="none" w="med" len="med"/>
+                    </a:lnL>
+                    <a:lnR>
+                      <a:noFill/>
+                    </a:lnR>
+                    <a:lnT>
+                      <a:noFill/>
+                    </a:lnT>
+                    <a:lnB>
+                      <a:noFill/>
+                    </a:lnB>
+                  </a:tcPr>
+                </a:tc>
+                <a:tc>
+                  <a:txBody>
+                    <a:bodyPr/>
+                    <a:lstStyle/>
+                    <a:p>
+                      <a:pPr marL="0" marR="0" algn="ctr">
+                        <a:lnSpc>
+                          <a:spcPct val="115000"/>
+                        </a:lnSpc>
+                        <a:spcBef>
+                          <a:spcPts val="1000"/>
+                        </a:spcBef>
+                        <a:spcAft>
+                          <a:spcPts val="1000"/>
+                        </a:spcAft>
+                      </a:pPr>
+                      <a:r>
+                        <a:rPr lang="en-US" sz="1600">
+                          <a:solidFill>
+                            <a:srgbClr val="000000"/>
+                          </a:solidFill>
+                          <a:latin typeface="Calibri"/>
+                          <a:ea typeface="Calibri"/>
+                          <a:cs typeface="Calibri"/>
+                        </a:rPr>
+                        <a:t>4</a:t>
+                      </a:r>
+                      <a:endParaRPr lang="en-US" sz="1600">
+                        <a:latin typeface="Calibri"/>
+                        <a:ea typeface="Times New Roman"/>
+                        <a:cs typeface="Times New Roman"/>
+                      </a:endParaRPr>
+                    </a:p>
+                  </a:txBody>
+                  <a:tcPr marL="0" marR="0" marT="0" marB="0" anchor="ctr">
+                    <a:lnL>
+                      <a:noFill/>
+                    </a:lnL>
+                    <a:lnR>
+                      <a:noFill/>
+                    </a:lnR>
+                    <a:lnT>
+                      <a:noFill/>
+                    </a:lnT>
+                    <a:lnB>
+                      <a:noFill/>
+                    </a:lnB>
+                  </a:tcPr>
+                </a:tc>
+                <a:tc>
+                  <a:txBody>
+                    <a:bodyPr/>
+                    <a:lstStyle/>
+                    <a:p>
+                      <a:pPr marL="0" marR="0" algn="ctr">
+                        <a:lnSpc>
+                          <a:spcPct val="115000"/>
+                        </a:lnSpc>
+                        <a:spcBef>
+                          <a:spcPts val="1000"/>
+                        </a:spcBef>
+                        <a:spcAft>
+                          <a:spcPts val="1000"/>
+                        </a:spcAft>
+                      </a:pPr>
+                      <a:r>
+                        <a:rPr lang="en-US" sz="1600">
+                          <a:solidFill>
+                            <a:srgbClr val="000000"/>
+                          </a:solidFill>
+                          <a:latin typeface="Calibri"/>
+                          <a:ea typeface="Calibri"/>
+                          <a:cs typeface="Calibri"/>
+                        </a:rPr>
+                        <a:t>4</a:t>
+                      </a:r>
+                      <a:endParaRPr lang="en-US" sz="1600">
+                        <a:latin typeface="Calibri"/>
+                        <a:ea typeface="Times New Roman"/>
+                        <a:cs typeface="Times New Roman"/>
+                      </a:endParaRPr>
+                    </a:p>
+                  </a:txBody>
+                  <a:tcPr marL="0" marR="0" marT="0" marB="0" anchor="ctr">
+                    <a:lnL>
+                      <a:noFill/>
+                    </a:lnL>
+                    <a:lnR>
+                      <a:noFill/>
+                    </a:lnR>
+                    <a:lnT>
+                      <a:noFill/>
+                    </a:lnT>
+                    <a:lnB>
+                      <a:noFill/>
+                    </a:lnB>
+                  </a:tcPr>
+                </a:tc>
+                <a:tc>
+                  <a:txBody>
+                    <a:bodyPr/>
+                    <a:lstStyle/>
+                    <a:p>
+                      <a:pPr marL="0" marR="0" algn="ctr">
+                        <a:lnSpc>
+                          <a:spcPct val="115000"/>
+                        </a:lnSpc>
+                        <a:spcBef>
+                          <a:spcPts val="1000"/>
+                        </a:spcBef>
+                        <a:spcAft>
+                          <a:spcPts val="1000"/>
+                        </a:spcAft>
+                      </a:pPr>
+                      <a:r>
+                        <a:rPr lang="en-US" sz="1600">
+                          <a:solidFill>
+                            <a:srgbClr val="000000"/>
+                          </a:solidFill>
+                          <a:latin typeface="Calibri"/>
+                          <a:ea typeface="Calibri"/>
+                          <a:cs typeface="Calibri"/>
+                        </a:rPr>
+                        <a:t>100%</a:t>
+                      </a:r>
+                      <a:endParaRPr lang="en-US" sz="1600">
+                        <a:latin typeface="Calibri"/>
+                        <a:ea typeface="Times New Roman"/>
+                        <a:cs typeface="Times New Roman"/>
+                      </a:endParaRPr>
+                    </a:p>
+                  </a:txBody>
+                  <a:tcPr marL="0" marR="0" marT="0" marB="0" anchor="ctr">
+                    <a:lnL>
+                      <a:noFill/>
+                    </a:lnL>
+                    <a:lnR w="12700" cap="flat" cmpd="sng" algn="ctr">
+                      <a:solidFill>
+                        <a:srgbClr val="000000"/>
+                      </a:solidFill>
+                      <a:prstDash val="solid"/>
+                      <a:round/>
+                      <a:headEnd type="none" w="med" len="med"/>
+                      <a:tailEnd type="none" w="med" len="med"/>
+                    </a:lnR>
+                    <a:lnT>
+                      <a:noFill/>
+                    </a:lnT>
+                    <a:lnB>
+                      <a:noFill/>
+                    </a:lnB>
+                  </a:tcPr>
+                </a:tc>
+              </a:tr>
+              <a:tr h="306569">
+                <a:tc gridSpan="4">
+                  <a:txBody>
+                    <a:bodyPr/>
+                    <a:lstStyle/>
+                    <a:p>
+                      <a:pPr marL="0" marR="0" algn="ctr">
+                        <a:lnSpc>
+                          <a:spcPct val="115000"/>
+                        </a:lnSpc>
+                        <a:spcBef>
+                          <a:spcPts val="1000"/>
+                        </a:spcBef>
+                        <a:spcAft>
+                          <a:spcPts val="1000"/>
+                        </a:spcAft>
+                      </a:pPr>
+                      <a:r>
+                        <a:rPr lang="en-US" sz="1300" b="1" dirty="0">
+                          <a:solidFill>
+                            <a:srgbClr val="9D3511"/>
+                          </a:solidFill>
+                          <a:latin typeface="Calibri"/>
+                          <a:ea typeface="Times New Roman"/>
+                          <a:cs typeface="Times New Roman"/>
+                        </a:rPr>
+                        <a:t>Table 1: Device Utilization table for Spartan 3E-100</a:t>
+                      </a:r>
+                    </a:p>
+                  </a:txBody>
+                  <a:tcPr marL="0" marR="0" marT="0" marB="0" anchor="ctr">
+                    <a:lnL w="12700" cap="flat" cmpd="sng" algn="ctr">
+                      <a:solidFill>
+                        <a:srgbClr val="000000"/>
+                      </a:solidFill>
+                      <a:prstDash val="solid"/>
+                      <a:round/>
+                      <a:headEnd type="none" w="med" len="med"/>
+                      <a:tailEnd type="none" w="med" len="med"/>
+                    </a:lnL>
+                    <a:lnR w="12700" cap="flat" cmpd="sng" algn="ctr">
+                      <a:solidFill>
+                        <a:srgbClr val="000000"/>
+                      </a:solidFill>
+                      <a:prstDash val="solid"/>
+                      <a:round/>
+                      <a:headEnd type="none" w="med" len="med"/>
+                      <a:tailEnd type="none" w="med" len="med"/>
+                    </a:lnR>
+                    <a:lnT>
+                      <a:noFill/>
+                    </a:lnT>
+                    <a:lnB w="12700" cap="flat" cmpd="sng" algn="ctr">
+                      <a:solidFill>
+                        <a:srgbClr val="000000"/>
+                      </a:solidFill>
+                      <a:prstDash val="solid"/>
+                      <a:round/>
+                      <a:headEnd type="none" w="med" len="med"/>
+                      <a:tailEnd type="none" w="med" len="med"/>
+                    </a:lnB>
+                  </a:tcPr>
+                </a:tc>
+                <a:tc hMerge="1">
+                  <a:txBody>
+                    <a:bodyPr/>
+                    <a:lstStyle/>
+                    <a:p>
+                      <a:endParaRPr lang="en-US"/>
+                    </a:p>
+                  </a:txBody>
+                  <a:tcPr/>
+                </a:tc>
+                <a:tc hMerge="1">
+                  <a:txBody>
+                    <a:bodyPr/>
+                    <a:lstStyle/>
+                    <a:p>
+                      <a:endParaRPr lang="en-US"/>
+                    </a:p>
+                  </a:txBody>
+                  <a:tcPr/>
+                </a:tc>
+                <a:tc hMerge="1">
+                  <a:txBody>
+                    <a:bodyPr/>
+                    <a:lstStyle/>
+                    <a:p>
+                      <a:endParaRPr lang="en-US"/>
+                    </a:p>
+                  </a:txBody>
+                  <a:tcPr/>
+                </a:tc>
+              </a:tr>
+            </a:tbl>
+          </a:graphicData>
+        </a:graphic>
+      </p:graphicFrame>
     </p:spTree>
   </p:cSld>
   <p:clrMapOvr>
@@ -4196,28 +6662,16 @@
           <a:p>
             <a:r>
               <a:rPr lang="en-US" dirty="0" smtClean="0"/>
-              <a:t>Demonstrated </a:t>
-            </a:r>
+              <a:t>Demonstrated the feasibility of applying a theoretical understanding of neural networks to the design of a parallel asynchronous digital system</a:t>
+            </a:r>
+          </a:p>
+          <a:p>
+            <a:endParaRPr lang="en-US" dirty="0" smtClean="0"/>
+          </a:p>
+          <a:p>
             <a:r>
               <a:rPr lang="en-US" dirty="0" smtClean="0"/>
-              <a:t>the feasibility of applying a theoretical understanding of neural networks to the design of a parallel asynchronous digital </a:t>
-            </a:r>
-            <a:r>
-              <a:rPr lang="en-US" dirty="0" smtClean="0"/>
-              <a:t>system</a:t>
-            </a:r>
-          </a:p>
-          <a:p>
-            <a:endParaRPr lang="en-US" dirty="0" smtClean="0"/>
-          </a:p>
-          <a:p>
-            <a:r>
-              <a:rPr lang="en-US" dirty="0" smtClean="0"/>
-              <a:t>The prototype was limited by the computational resources </a:t>
-            </a:r>
-            <a:r>
-              <a:rPr lang="en-US" dirty="0" smtClean="0"/>
-              <a:t>available, but could be expanded with little effort</a:t>
+              <a:t>The prototype was limited by the computational resources available, but could be expanded with little effort</a:t>
             </a:r>
           </a:p>
           <a:p>
@@ -4297,48 +6751,16 @@
           <a:p>
             <a:r>
               <a:rPr lang="en-US" dirty="0" smtClean="0"/>
-              <a:t>The history of computer science is filled with attempts to mimic biological </a:t>
-            </a:r>
+              <a:t>The history of computer science is filled with attempts to mimic biological systems</a:t>
+            </a:r>
+          </a:p>
+          <a:p>
+            <a:endParaRPr lang="en-US" dirty="0" smtClean="0"/>
+          </a:p>
+          <a:p>
             <a:r>
               <a:rPr lang="en-US" dirty="0" smtClean="0"/>
-              <a:t>systems</a:t>
-            </a:r>
-          </a:p>
-          <a:p>
-            <a:endParaRPr lang="en-US" dirty="0" smtClean="0"/>
-          </a:p>
-          <a:p>
-            <a:r>
-              <a:rPr lang="en-US" dirty="0" smtClean="0"/>
-              <a:t>Neural </a:t>
-            </a:r>
-            <a:r>
-              <a:rPr lang="en-US" dirty="0" smtClean="0"/>
-              <a:t>networks are </a:t>
-            </a:r>
-            <a:r>
-              <a:rPr lang="en-US" dirty="0" smtClean="0"/>
-              <a:t>a kind </a:t>
-            </a:r>
-            <a:r>
-              <a:rPr lang="en-US" dirty="0" smtClean="0"/>
-              <a:t>of optimization function, modeled after </a:t>
-            </a:r>
-            <a:r>
-              <a:rPr lang="en-US" dirty="0" smtClean="0"/>
-              <a:t>a functional </a:t>
-            </a:r>
-            <a:r>
-              <a:rPr lang="en-US" dirty="0" smtClean="0"/>
-              <a:t>understanding of the </a:t>
-            </a:r>
-            <a:r>
-              <a:rPr lang="en-US" dirty="0" smtClean="0"/>
-              <a:t>cells that </a:t>
-            </a:r>
-            <a:r>
-              <a:rPr lang="en-US" dirty="0" smtClean="0"/>
-              <a:t>make up the animal nervous system</a:t>
+              <a:t>Neural networks are a kind of optimization function, modeled after a functional understanding of the cells that make up the animal nervous system</a:t>
             </a:r>
             <a:endParaRPr lang="en-US" dirty="0"/>
           </a:p>
@@ -4554,15 +6976,7 @@
           <a:p>
             <a:r>
               <a:rPr lang="en-US" dirty="0" smtClean="0"/>
-              <a:t>By adjusting the connection </a:t>
-            </a:r>
-            <a:r>
-              <a:rPr lang="en-US" dirty="0" smtClean="0"/>
-              <a:t>weights, </a:t>
-            </a:r>
-            <a:r>
-              <a:rPr lang="en-US" dirty="0" smtClean="0"/>
-              <a:t>the output neurons can describe </a:t>
+              <a:t>By adjusting the connection weights, the output neurons can describe </a:t>
             </a:r>
             <a:r>
               <a:rPr lang="en-US" i="1" dirty="0" smtClean="0"/>
@@ -4570,28 +6984,16 @@
             </a:r>
             <a:r>
               <a:rPr lang="en-US" dirty="0" smtClean="0"/>
-              <a:t> </a:t>
-            </a:r>
+              <a:t> function</a:t>
+            </a:r>
+          </a:p>
+          <a:p>
+            <a:endParaRPr lang="en-US" dirty="0" smtClean="0"/>
+          </a:p>
+          <a:p>
             <a:r>
               <a:rPr lang="en-US" dirty="0" smtClean="0"/>
-              <a:t>function</a:t>
-            </a:r>
-          </a:p>
-          <a:p>
-            <a:endParaRPr lang="en-US" dirty="0" smtClean="0"/>
-          </a:p>
-          <a:p>
-            <a:r>
-              <a:rPr lang="en-US" dirty="0" smtClean="0"/>
-              <a:t>Even functions </a:t>
-            </a:r>
-            <a:r>
-              <a:rPr lang="en-US" dirty="0" smtClean="0"/>
-              <a:t>specified only incompletely, or by </a:t>
-            </a:r>
-            <a:r>
-              <a:rPr lang="en-US" dirty="0" smtClean="0"/>
-              <a:t>example</a:t>
+              <a:t>Even functions specified only incompletely, or by example</a:t>
             </a:r>
           </a:p>
           <a:p>
@@ -4602,7 +7004,6 @@
               <a:rPr lang="en-US" dirty="0" smtClean="0"/>
               <a:t>Training a network is the same as minimizing the function with respect to the weights</a:t>
             </a:r>
-            <a:endParaRPr lang="en-US" dirty="0" smtClean="0"/>
           </a:p>
           <a:p>
             <a:pPr>
@@ -4724,11 +7125,7 @@
           <a:p>
             <a:r>
               <a:rPr lang="en-US" dirty="0" smtClean="0"/>
-              <a:t>F</a:t>
-            </a:r>
-            <a:r>
-              <a:rPr lang="en-US" dirty="0" smtClean="0"/>
-              <a:t>(x, y) </a:t>
+              <a:t>F(x, y) </a:t>
             </a:r>
             <a:r>
               <a:rPr lang="en-US" dirty="0" smtClean="0">
@@ -4752,7 +7149,6 @@
               <a:rPr lang="en-US" dirty="0" smtClean="0"/>
               <a:t> </a:t>
             </a:r>
-            <a:endParaRPr lang="en-US" dirty="0" smtClean="0"/>
           </a:p>
           <a:p>
             <a:endParaRPr lang="en-US" dirty="0" smtClean="0"/>
@@ -4771,7 +7167,6 @@
               <a:rPr lang="en-US" dirty="0" smtClean="0"/>
               <a:t>With enough neurons, any dimensionality and complexity can be learned</a:t>
             </a:r>
-            <a:endParaRPr lang="en-US" dirty="0" smtClean="0"/>
           </a:p>
         </p:txBody>
       </p:sp>
@@ -4877,49 +7272,25 @@
           <a:p>
             <a:r>
               <a:rPr lang="en-US" dirty="0" smtClean="0"/>
-              <a:t>We implemented a </a:t>
-            </a:r>
+              <a:t>We implemented a network capable of learning any two-input function, such as AND, OR, XOR, etc</a:t>
+            </a:r>
+          </a:p>
+          <a:p>
+            <a:endParaRPr lang="en-US" dirty="0" smtClean="0"/>
+          </a:p>
+          <a:p>
             <a:r>
               <a:rPr lang="en-US" dirty="0" smtClean="0"/>
-              <a:t>network capable of learning any two-input function, such as AND, OR, XOR, </a:t>
-            </a:r>
+              <a:t>This is the smallest network that is useful</a:t>
+            </a:r>
+          </a:p>
+          <a:p>
+            <a:endParaRPr lang="en-US" dirty="0" smtClean="0"/>
+          </a:p>
+          <a:p>
             <a:r>
               <a:rPr lang="en-US" dirty="0" smtClean="0"/>
-              <a:t>etc</a:t>
-            </a:r>
-          </a:p>
-          <a:p>
-            <a:endParaRPr lang="en-US" dirty="0" smtClean="0"/>
-          </a:p>
-          <a:p>
-            <a:r>
-              <a:rPr lang="en-US" dirty="0" smtClean="0"/>
-              <a:t>This is the smallest network that is </a:t>
-            </a:r>
-            <a:r>
-              <a:rPr lang="en-US" dirty="0" smtClean="0"/>
-              <a:t>useful</a:t>
-            </a:r>
-          </a:p>
-          <a:p>
-            <a:endParaRPr lang="en-US" dirty="0" smtClean="0"/>
-          </a:p>
-          <a:p>
-            <a:r>
-              <a:rPr lang="en-US" dirty="0" smtClean="0"/>
-              <a:t>It </a:t>
-            </a:r>
-            <a:r>
-              <a:rPr lang="en-US" dirty="0" smtClean="0"/>
-              <a:t>could be expanded to any </a:t>
-            </a:r>
-            <a:r>
-              <a:rPr lang="en-US" dirty="0" smtClean="0"/>
-              <a:t>size, simply by </a:t>
-            </a:r>
-            <a:r>
-              <a:rPr lang="en-US" dirty="0" smtClean="0"/>
-              <a:t>increasing the number of nodes</a:t>
+              <a:t>It could be expanded to any size, simply by increasing the number of nodes</a:t>
             </a:r>
             <a:endParaRPr lang="en-US" dirty="0"/>
           </a:p>
@@ -4988,7 +7359,45 @@
           <a:bodyPr/>
           <a:lstStyle/>
           <a:p>
-            <a:endParaRPr lang="en-US"/>
+            <a:r>
+              <a:rPr lang="en-US" dirty="0" smtClean="0"/>
+              <a:t>Neuron: sums up signals</a:t>
+            </a:r>
+          </a:p>
+          <a:p>
+            <a:r>
+              <a:rPr lang="en-US" dirty="0" smtClean="0"/>
+              <a:t>Connection: passes along weighted signals</a:t>
+            </a:r>
+          </a:p>
+          <a:p>
+            <a:r>
+              <a:rPr lang="en-US" dirty="0" smtClean="0"/>
+              <a:t>Sigmoid: clamps large unsigned values</a:t>
+            </a:r>
+          </a:p>
+          <a:p>
+            <a:endParaRPr lang="en-US" dirty="0" smtClean="0"/>
+          </a:p>
+          <a:p>
+            <a:r>
+              <a:rPr lang="en-US" dirty="0" smtClean="0"/>
+              <a:t>Network: sets up topology, uses above</a:t>
+            </a:r>
+          </a:p>
+          <a:p>
+            <a:endParaRPr lang="en-US" dirty="0" smtClean="0"/>
+          </a:p>
+          <a:p>
+            <a:r>
+              <a:rPr lang="en-US" dirty="0" smtClean="0"/>
+              <a:t>Interface/</a:t>
+            </a:r>
+            <a:r>
+              <a:rPr lang="en-US" dirty="0" err="1" smtClean="0"/>
+              <a:t>Testbench</a:t>
+            </a:r>
+            <a:endParaRPr lang="en-US" dirty="0"/>
           </a:p>
         </p:txBody>
       </p:sp>
@@ -5055,7 +7464,38 @@
           <a:bodyPr/>
           <a:lstStyle/>
           <a:p>
-            <a:endParaRPr lang="en-US"/>
+            <a:r>
+              <a:rPr lang="en-US" dirty="0" smtClean="0"/>
+              <a:t>FPGA has no floating point support</a:t>
+            </a:r>
+          </a:p>
+          <a:p>
+            <a:endParaRPr lang="en-US" dirty="0" smtClean="0"/>
+          </a:p>
+          <a:p>
+            <a:r>
+              <a:rPr lang="en-US" dirty="0" smtClean="0"/>
+              <a:t>Use fixed point signed &amp; unsigned numbers, converting where necessary</a:t>
+            </a:r>
+          </a:p>
+          <a:p>
+            <a:endParaRPr lang="en-US" dirty="0" smtClean="0"/>
+          </a:p>
+          <a:p>
+            <a:r>
+              <a:rPr lang="en-US" dirty="0" smtClean="0"/>
+              <a:t>Sigmoid requires a lot of dynamic range</a:t>
+            </a:r>
+          </a:p>
+          <a:p>
+            <a:endParaRPr lang="en-US" dirty="0" smtClean="0"/>
+          </a:p>
+          <a:p>
+            <a:r>
+              <a:rPr lang="en-US" dirty="0" smtClean="0"/>
+              <a:t>Taylor series is best, we settled for a piecewise linear approximation</a:t>
+            </a:r>
+            <a:endParaRPr lang="en-US" dirty="0"/>
           </a:p>
         </p:txBody>
       </p:sp>
@@ -5117,11 +7557,17 @@
             <p:ph type="body" idx="1"/>
           </p:nvPr>
         </p:nvSpPr>
-        <p:spPr/>
+        <p:spPr>
+          <a:xfrm>
+            <a:off x="381000" y="5029200"/>
+            <a:ext cx="4040188" cy="715355"/>
+          </a:xfrm>
+        </p:spPr>
         <p:txBody>
           <a:bodyPr/>
           <a:lstStyle/>
           <a:p>
+            <a:pPr algn="ctr"/>
             <a:r>
               <a:rPr lang="en-US" dirty="0" smtClean="0"/>
               <a:t>Continuous</a:t>
@@ -5132,38 +7578,25 @@
       </p:sp>
       <p:sp>
         <p:nvSpPr>
-          <p:cNvPr id="5" name="Content Placeholder 4"/>
-          <p:cNvSpPr>
-            <a:spLocks noGrp="1"/>
-          </p:cNvSpPr>
-          <p:nvPr>
-            <p:ph sz="half" idx="2"/>
-          </p:nvPr>
-        </p:nvSpPr>
-        <p:spPr/>
+          <p:cNvPr id="6" name="Text Placeholder 5"/>
+          <p:cNvSpPr>
+            <a:spLocks noGrp="1"/>
+          </p:cNvSpPr>
+          <p:nvPr>
+            <p:ph type="body" sz="quarter" idx="3"/>
+          </p:nvPr>
+        </p:nvSpPr>
+        <p:spPr>
+          <a:xfrm>
+            <a:off x="4568825" y="5029200"/>
+            <a:ext cx="4041775" cy="715355"/>
+          </a:xfrm>
+        </p:spPr>
         <p:txBody>
           <a:bodyPr/>
           <a:lstStyle/>
           <a:p>
-            <a:endParaRPr lang="en-US"/>
-          </a:p>
-        </p:txBody>
-      </p:sp>
-      <p:sp>
-        <p:nvSpPr>
-          <p:cNvPr id="6" name="Text Placeholder 5"/>
-          <p:cNvSpPr>
-            <a:spLocks noGrp="1"/>
-          </p:cNvSpPr>
-          <p:nvPr>
-            <p:ph type="body" sz="quarter" idx="3"/>
-          </p:nvPr>
-        </p:nvSpPr>
-        <p:spPr/>
-        <p:txBody>
-          <a:bodyPr/>
-          <a:lstStyle/>
-          <a:p>
+            <a:pPr algn="ctr"/>
             <a:r>
               <a:rPr lang="en-US" dirty="0" smtClean="0"/>
               <a:t>Piecewise</a:t>
@@ -5172,25 +7605,76 @@
           </a:p>
         </p:txBody>
       </p:sp>
-      <p:sp>
-        <p:nvSpPr>
-          <p:cNvPr id="7" name="Content Placeholder 6"/>
-          <p:cNvSpPr>
-            <a:spLocks noGrp="1"/>
-          </p:cNvSpPr>
+      <p:pic>
+        <p:nvPicPr>
+          <p:cNvPr id="1028" name="Picture 4"/>
+          <p:cNvPicPr>
+            <a:picLocks noGrp="1" noChangeAspect="1" noChangeArrowheads="1"/>
+          </p:cNvPicPr>
           <p:nvPr>
             <p:ph sz="quarter" idx="4"/>
           </p:nvPr>
-        </p:nvSpPr>
-        <p:spPr/>
-        <p:txBody>
-          <a:bodyPr/>
-          <a:lstStyle/>
-          <a:p>
-            <a:endParaRPr lang="en-US"/>
-          </a:p>
-        </p:txBody>
-      </p:sp>
+        </p:nvPicPr>
+        <p:blipFill>
+          <a:blip r:embed="rId2"/>
+          <a:srcRect/>
+          <a:stretch>
+            <a:fillRect/>
+          </a:stretch>
+        </p:blipFill>
+        <p:spPr bwMode="auto">
+          <a:xfrm>
+            <a:off x="4572000" y="2286000"/>
+            <a:ext cx="4128916" cy="2793900"/>
+          </a:xfrm>
+          <a:prstGeom prst="rect">
+            <a:avLst/>
+          </a:prstGeom>
+          <a:noFill/>
+          <a:ln w="9525">
+            <a:noFill/>
+            <a:miter lim="800000"/>
+            <a:headEnd/>
+            <a:tailEnd/>
+          </a:ln>
+          <a:effectLst/>
+        </p:spPr>
+      </p:pic>
+      <p:pic>
+        <p:nvPicPr>
+          <p:cNvPr id="1029" name="Picture 5"/>
+          <p:cNvPicPr>
+            <a:picLocks noGrp="1" noChangeAspect="1" noChangeArrowheads="1"/>
+          </p:cNvPicPr>
+          <p:nvPr>
+            <p:ph sz="half" idx="2"/>
+          </p:nvPr>
+        </p:nvPicPr>
+        <p:blipFill>
+          <a:blip r:embed="rId3"/>
+          <a:srcRect/>
+          <a:stretch>
+            <a:fillRect/>
+          </a:stretch>
+        </p:blipFill>
+        <p:spPr bwMode="auto">
+          <a:xfrm>
+            <a:off x="304800" y="2286000"/>
+            <a:ext cx="4096219" cy="2819400"/>
+          </a:xfrm>
+          <a:prstGeom prst="rect">
+            <a:avLst/>
+          </a:prstGeom>
+          <a:noFill/>
+          <a:ln w="9525">
+            <a:noFill/>
+            <a:miter lim="800000"/>
+            <a:headEnd/>
+            <a:tailEnd/>
+          </a:ln>
+          <a:effectLst/>
+        </p:spPr>
+      </p:pic>
     </p:spTree>
   </p:cSld>
   <p:clrMapOvr>

</xml_diff>

<commit_message>
added new slide for goals
</commit_message>
<xml_diff>
--- a/Docs/FPGA Neural Network.pptx
+++ b/Docs/FPGA Neural Network.pptx
@@ -1,6 +1,6 @@
 
 <file path=ppt/presentation.xml><?xml version="1.0" encoding="utf-8"?>
-<p:presentation xmlns:a="http://schemas.openxmlformats.org/drawingml/2006/main" xmlns:r="http://schemas.openxmlformats.org/officeDocument/2006/relationships" xmlns:p="http://schemas.openxmlformats.org/presentationml/2006/main" saveSubsetFonts="1">
+<p:presentation xmlns:a="http://schemas.openxmlformats.org/drawingml/2006/main" xmlns:r="http://schemas.openxmlformats.org/officeDocument/2006/relationships" xmlns:mc="http://schemas.openxmlformats.org/markup-compatibility/2006" xmlns:mv="urn:schemas-microsoft-com:mac:vml" xmlns:p="http://schemas.openxmlformats.org/presentationml/2006/main" mc:Ignorable="mv" mc:PreserveAttributes="mv:*" saveSubsetFonts="1">
   <p:sldMasterIdLst>
     <p:sldMasterId id="2147483744" r:id="rId1"/>
   </p:sldMasterIdLst>
@@ -10,15 +10,16 @@
     <p:sldId id="258" r:id="rId4"/>
     <p:sldId id="259" r:id="rId5"/>
     <p:sldId id="269" r:id="rId6"/>
-    <p:sldId id="260" r:id="rId7"/>
-    <p:sldId id="261" r:id="rId8"/>
-    <p:sldId id="262" r:id="rId9"/>
-    <p:sldId id="263" r:id="rId10"/>
-    <p:sldId id="264" r:id="rId11"/>
-    <p:sldId id="265" r:id="rId12"/>
-    <p:sldId id="266" r:id="rId13"/>
-    <p:sldId id="267" r:id="rId14"/>
-    <p:sldId id="268" r:id="rId15"/>
+    <p:sldId id="270" r:id="rId7"/>
+    <p:sldId id="260" r:id="rId8"/>
+    <p:sldId id="261" r:id="rId9"/>
+    <p:sldId id="262" r:id="rId10"/>
+    <p:sldId id="263" r:id="rId11"/>
+    <p:sldId id="264" r:id="rId12"/>
+    <p:sldId id="265" r:id="rId13"/>
+    <p:sldId id="266" r:id="rId14"/>
+    <p:sldId id="267" r:id="rId15"/>
+    <p:sldId id="268" r:id="rId16"/>
   </p:sldIdLst>
   <p:sldSz cx="9144000" cy="6858000" type="screen4x3"/>
   <p:notesSz cx="6858000" cy="9144000"/>
@@ -121,7 +122,7 @@
 </file>
 
 <file path=ppt/slideLayouts/slideLayout1.xml><?xml version="1.0" encoding="utf-8"?>
-<p:sldLayout xmlns:a="http://schemas.openxmlformats.org/drawingml/2006/main" xmlns:r="http://schemas.openxmlformats.org/officeDocument/2006/relationships" xmlns:p="http://schemas.openxmlformats.org/presentationml/2006/main" showMasterSp="0" type="title" preserve="1">
+<p:sldLayout xmlns:a="http://schemas.openxmlformats.org/drawingml/2006/main" xmlns:r="http://schemas.openxmlformats.org/officeDocument/2006/relationships" xmlns:mc="http://schemas.openxmlformats.org/markup-compatibility/2006" xmlns:mv="urn:schemas-microsoft-com:mac:vml" xmlns:p="http://schemas.openxmlformats.org/presentationml/2006/main" mc:Ignorable="mv" mc:PreserveAttributes="mv:*" showMasterSp="0" type="title" preserve="1">
   <p:cSld name="Title Slide">
     <p:bg>
       <p:bgRef idx="1002">
@@ -180,9 +181,7 @@
         </p:style>
         <p:txBody>
           <a:bodyPr rtlCol="0" anchor="ctr"/>
-          <a:lstStyle>
-            <a:extLst/>
-          </a:lstStyle>
+          <a:lstStyle/>
           <a:p>
             <a:pPr algn="ctr" eaLnBrk="1" latinLnBrk="0" hangingPunct="1"/>
             <a:endParaRPr kumimoji="0" lang="en-US" dirty="0"/>
@@ -222,7 +221,6 @@
             <a:lvl1pPr algn="l">
               <a:defRPr sz="4700" b="1"/>
             </a:lvl1pPr>
-            <a:extLst/>
           </a:lstStyle>
           <a:p>
             <a:r>
@@ -340,7 +338,6 @@
                 </a:solidFill>
               </a:defRPr>
             </a:lvl9pPr>
-            <a:extLst/>
           </a:lstStyle>
           <a:p>
             <a:r>
@@ -369,7 +366,7 @@
             <a:fld id="{A5B00B91-90A6-4B00-B790-8A3A89AE3D40}" type="datetimeFigureOut">
               <a:rPr lang="en-US" smtClean="0"/>
               <a:pPr/>
-              <a:t>11/8/2009</a:t>
+              <a:t>11/10/09</a:t>
             </a:fld>
             <a:endParaRPr lang="en-US" dirty="0"/>
           </a:p>
@@ -463,9 +460,7 @@
         </p:style>
         <p:txBody>
           <a:bodyPr rtlCol="0" anchor="ctr"/>
-          <a:lstStyle>
-            <a:extLst/>
-          </a:lstStyle>
+          <a:lstStyle/>
           <a:p>
             <a:pPr algn="ctr" eaLnBrk="1" latinLnBrk="0" hangingPunct="1"/>
             <a:endParaRPr kumimoji="0" lang="en-US" dirty="0"/>
@@ -481,7 +476,7 @@
 </file>
 
 <file path=ppt/slideLayouts/slideLayout10.xml><?xml version="1.0" encoding="utf-8"?>
-<p:sldLayout xmlns:a="http://schemas.openxmlformats.org/drawingml/2006/main" xmlns:r="http://schemas.openxmlformats.org/officeDocument/2006/relationships" xmlns:p="http://schemas.openxmlformats.org/presentationml/2006/main" type="vertTx" preserve="1">
+<p:sldLayout xmlns:a="http://schemas.openxmlformats.org/drawingml/2006/main" xmlns:r="http://schemas.openxmlformats.org/officeDocument/2006/relationships" xmlns:mc="http://schemas.openxmlformats.org/markup-compatibility/2006" xmlns:mv="urn:schemas-microsoft-com:mac:vml" xmlns:p="http://schemas.openxmlformats.org/presentationml/2006/main" mc:Ignorable="mv" mc:PreserveAttributes="mv:*" type="vertTx" preserve="1">
   <p:cSld name="Title and Vertical Text">
     <p:spTree>
       <p:nvGrpSpPr>
@@ -510,9 +505,7 @@
         <p:spPr/>
         <p:txBody>
           <a:bodyPr/>
-          <a:lstStyle>
-            <a:extLst/>
-          </a:lstStyle>
+          <a:lstStyle/>
           <a:p>
             <a:r>
               <a:rPr kumimoji="0" lang="en-US" smtClean="0"/>
@@ -535,9 +528,7 @@
         <p:spPr/>
         <p:txBody>
           <a:bodyPr vert="eaVert"/>
-          <a:lstStyle>
-            <a:extLst/>
-          </a:lstStyle>
+          <a:lstStyle/>
           <a:p>
             <a:pPr lvl="0" eaLnBrk="1" latinLnBrk="0" hangingPunct="1"/>
             <a:r>
@@ -594,7 +585,7 @@
             <a:fld id="{A5B00B91-90A6-4B00-B790-8A3A89AE3D40}" type="datetimeFigureOut">
               <a:rPr lang="en-US" smtClean="0"/>
               <a:pPr/>
-              <a:t>11/8/2009</a:t>
+              <a:t>11/10/09</a:t>
             </a:fld>
             <a:endParaRPr lang="en-US" dirty="0"/>
           </a:p>
@@ -652,7 +643,7 @@
 </file>
 
 <file path=ppt/slideLayouts/slideLayout11.xml><?xml version="1.0" encoding="utf-8"?>
-<p:sldLayout xmlns:a="http://schemas.openxmlformats.org/drawingml/2006/main" xmlns:r="http://schemas.openxmlformats.org/officeDocument/2006/relationships" xmlns:p="http://schemas.openxmlformats.org/presentationml/2006/main" showMasterSp="0" type="vertTitleAndTx" preserve="1">
+<p:sldLayout xmlns:a="http://schemas.openxmlformats.org/drawingml/2006/main" xmlns:r="http://schemas.openxmlformats.org/officeDocument/2006/relationships" xmlns:mc="http://schemas.openxmlformats.org/markup-compatibility/2006" xmlns:mv="urn:schemas-microsoft-com:mac:vml" xmlns:p="http://schemas.openxmlformats.org/presentationml/2006/main" mc:Ignorable="mv" mc:PreserveAttributes="mv:*" showMasterSp="0" type="vertTitleAndTx" preserve="1">
   <p:cSld name="Vertical Title and Text">
     <p:spTree>
       <p:nvGrpSpPr>
@@ -713,9 +704,7 @@
         </p:style>
         <p:txBody>
           <a:bodyPr rtlCol="0" anchor="ctr"/>
-          <a:lstStyle>
-            <a:extLst/>
-          </a:lstStyle>
+          <a:lstStyle/>
           <a:p>
             <a:pPr algn="ctr" eaLnBrk="1" latinLnBrk="0" hangingPunct="1"/>
             <a:endParaRPr kumimoji="0" lang="en-US" dirty="0"/>
@@ -760,9 +749,7 @@
         </p:style>
         <p:txBody>
           <a:bodyPr rtlCol="0" anchor="ctr"/>
-          <a:lstStyle>
-            <a:extLst/>
-          </a:lstStyle>
+          <a:lstStyle/>
           <a:p>
             <a:pPr algn="ctr" eaLnBrk="1" latinLnBrk="0" hangingPunct="1"/>
             <a:endParaRPr kumimoji="0" lang="en-US" dirty="0"/>
@@ -787,9 +774,7 @@
         </p:spPr>
         <p:txBody>
           <a:bodyPr vert="eaVert"/>
-          <a:lstStyle>
-            <a:extLst/>
-          </a:lstStyle>
+          <a:lstStyle/>
           <a:p>
             <a:r>
               <a:rPr kumimoji="0" lang="en-US" smtClean="0"/>
@@ -817,9 +802,7 @@
         </p:spPr>
         <p:txBody>
           <a:bodyPr vert="eaVert"/>
-          <a:lstStyle>
-            <a:extLst/>
-          </a:lstStyle>
+          <a:lstStyle/>
           <a:p>
             <a:pPr lvl="0" eaLnBrk="1" latinLnBrk="0" hangingPunct="1"/>
             <a:r>
@@ -876,7 +859,7 @@
             <a:fld id="{A5B00B91-90A6-4B00-B790-8A3A89AE3D40}" type="datetimeFigureOut">
               <a:rPr lang="en-US" smtClean="0"/>
               <a:pPr/>
-              <a:t>11/8/2009</a:t>
+              <a:t>11/10/09</a:t>
             </a:fld>
             <a:endParaRPr lang="en-US" dirty="0"/>
           </a:p>
@@ -939,7 +922,7 @@
 </file>
 
 <file path=ppt/slideLayouts/slideLayout2.xml><?xml version="1.0" encoding="utf-8"?>
-<p:sldLayout xmlns:a="http://schemas.openxmlformats.org/drawingml/2006/main" xmlns:r="http://schemas.openxmlformats.org/officeDocument/2006/relationships" xmlns:p="http://schemas.openxmlformats.org/presentationml/2006/main" type="obj" preserve="1">
+<p:sldLayout xmlns:a="http://schemas.openxmlformats.org/drawingml/2006/main" xmlns:r="http://schemas.openxmlformats.org/officeDocument/2006/relationships" xmlns:mc="http://schemas.openxmlformats.org/markup-compatibility/2006" xmlns:mv="urn:schemas-microsoft-com:mac:vml" xmlns:p="http://schemas.openxmlformats.org/presentationml/2006/main" mc:Ignorable="mv" mc:PreserveAttributes="mv:*" type="obj" preserve="1">
   <p:cSld name="Title and Content">
     <p:spTree>
       <p:nvGrpSpPr>
@@ -973,9 +956,7 @@
         </p:spPr>
         <p:txBody>
           <a:bodyPr/>
-          <a:lstStyle>
-            <a:extLst/>
-          </a:lstStyle>
+          <a:lstStyle/>
           <a:p>
             <a:r>
               <a:rPr kumimoji="0" lang="en-US" smtClean="0"/>
@@ -998,9 +979,7 @@
         <p:spPr/>
         <p:txBody>
           <a:bodyPr/>
-          <a:lstStyle>
-            <a:extLst/>
-          </a:lstStyle>
+          <a:lstStyle/>
           <a:p>
             <a:pPr lvl="0" eaLnBrk="1" latinLnBrk="0" hangingPunct="1"/>
             <a:r>
@@ -1057,7 +1036,7 @@
             <a:fld id="{A5B00B91-90A6-4B00-B790-8A3A89AE3D40}" type="datetimeFigureOut">
               <a:rPr lang="en-US" smtClean="0"/>
               <a:pPr/>
-              <a:t>11/8/2009</a:t>
+              <a:t>11/10/09</a:t>
             </a:fld>
             <a:endParaRPr lang="en-US" dirty="0"/>
           </a:p>
@@ -1115,7 +1094,7 @@
 </file>
 
 <file path=ppt/slideLayouts/slideLayout3.xml><?xml version="1.0" encoding="utf-8"?>
-<p:sldLayout xmlns:a="http://schemas.openxmlformats.org/drawingml/2006/main" xmlns:r="http://schemas.openxmlformats.org/officeDocument/2006/relationships" xmlns:p="http://schemas.openxmlformats.org/presentationml/2006/main" showMasterSp="0" type="secHead" preserve="1">
+<p:sldLayout xmlns:a="http://schemas.openxmlformats.org/drawingml/2006/main" xmlns:r="http://schemas.openxmlformats.org/officeDocument/2006/relationships" xmlns:mc="http://schemas.openxmlformats.org/markup-compatibility/2006" xmlns:mv="urn:schemas-microsoft-com:mac:vml" xmlns:p="http://schemas.openxmlformats.org/presentationml/2006/main" mc:Ignorable="mv" mc:PreserveAttributes="mv:*" showMasterSp="0" type="secHead" preserve="1">
   <p:cSld name="Section Header">
     <p:bg>
       <p:bgRef idx="1002">
@@ -1174,9 +1153,7 @@
         </p:style>
         <p:txBody>
           <a:bodyPr rtlCol="0" anchor="ctr"/>
-          <a:lstStyle>
-            <a:extLst/>
-          </a:lstStyle>
+          <a:lstStyle/>
           <a:p>
             <a:pPr algn="ctr" eaLnBrk="1" latinLnBrk="0" hangingPunct="1"/>
             <a:endParaRPr kumimoji="0" lang="en-US" dirty="0"/>
@@ -1228,9 +1205,7 @@
         </p:style>
         <p:txBody>
           <a:bodyPr rtlCol="0" anchor="ctr"/>
-          <a:lstStyle>
-            <a:extLst/>
-          </a:lstStyle>
+          <a:lstStyle/>
           <a:p>
             <a:pPr algn="ctr" eaLnBrk="1" latinLnBrk="0" hangingPunct="1"/>
             <a:endParaRPr kumimoji="0" lang="en-US" dirty="0"/>
@@ -1270,7 +1245,6 @@
             <a:lvl1pPr algn="l">
               <a:defRPr sz="4700" b="1" cap="none" baseline="0"/>
             </a:lvl1pPr>
-            <a:extLst/>
           </a:lstStyle>
           <a:p>
             <a:r>
@@ -1388,7 +1362,6 @@
                 </a:solidFill>
               </a:defRPr>
             </a:lvl9pPr>
-            <a:extLst/>
           </a:lstStyle>
           <a:p>
             <a:pPr lvl="0" eaLnBrk="1" latinLnBrk="0" hangingPunct="1"/>
@@ -1417,7 +1390,7 @@
             <a:fld id="{A5B00B91-90A6-4B00-B790-8A3A89AE3D40}" type="datetimeFigureOut">
               <a:rPr lang="en-US" smtClean="0"/>
               <a:pPr/>
-              <a:t>11/8/2009</a:t>
+              <a:t>11/10/09</a:t>
             </a:fld>
             <a:endParaRPr lang="en-US" dirty="0"/>
           </a:p>
@@ -1475,7 +1448,7 @@
 </file>
 
 <file path=ppt/slideLayouts/slideLayout4.xml><?xml version="1.0" encoding="utf-8"?>
-<p:sldLayout xmlns:a="http://schemas.openxmlformats.org/drawingml/2006/main" xmlns:r="http://schemas.openxmlformats.org/officeDocument/2006/relationships" xmlns:p="http://schemas.openxmlformats.org/presentationml/2006/main" type="twoObj" preserve="1">
+<p:sldLayout xmlns:a="http://schemas.openxmlformats.org/drawingml/2006/main" xmlns:r="http://schemas.openxmlformats.org/officeDocument/2006/relationships" xmlns:mc="http://schemas.openxmlformats.org/markup-compatibility/2006" xmlns:mv="urn:schemas-microsoft-com:mac:vml" xmlns:p="http://schemas.openxmlformats.org/presentationml/2006/main" mc:Ignorable="mv" mc:PreserveAttributes="mv:*" type="twoObj" preserve="1">
   <p:cSld name="Two Content">
     <p:spTree>
       <p:nvGrpSpPr>
@@ -1504,9 +1477,7 @@
         <p:spPr/>
         <p:txBody>
           <a:bodyPr/>
-          <a:lstStyle>
-            <a:extLst/>
-          </a:lstStyle>
+          <a:lstStyle/>
           <a:p>
             <a:r>
               <a:rPr kumimoji="0" lang="en-US" smtClean="0"/>
@@ -1562,7 +1533,6 @@
             <a:lvl9pPr>
               <a:defRPr sz="1800"/>
             </a:lvl9pPr>
-            <a:extLst/>
           </a:lstStyle>
           <a:p>
             <a:pPr lvl="0" eaLnBrk="1" latinLnBrk="0" hangingPunct="1"/>
@@ -1648,7 +1618,6 @@
             <a:lvl9pPr>
               <a:defRPr sz="1800"/>
             </a:lvl9pPr>
-            <a:extLst/>
           </a:lstStyle>
           <a:p>
             <a:pPr lvl="0" eaLnBrk="1" latinLnBrk="0" hangingPunct="1"/>
@@ -1706,7 +1675,7 @@
             <a:fld id="{A5B00B91-90A6-4B00-B790-8A3A89AE3D40}" type="datetimeFigureOut">
               <a:rPr lang="en-US" smtClean="0"/>
               <a:pPr/>
-              <a:t>11/8/2009</a:t>
+              <a:t>11/10/09</a:t>
             </a:fld>
             <a:endParaRPr lang="en-US" dirty="0"/>
           </a:p>
@@ -1764,7 +1733,7 @@
 </file>
 
 <file path=ppt/slideLayouts/slideLayout5.xml><?xml version="1.0" encoding="utf-8"?>
-<p:sldLayout xmlns:a="http://schemas.openxmlformats.org/drawingml/2006/main" xmlns:r="http://schemas.openxmlformats.org/officeDocument/2006/relationships" xmlns:p="http://schemas.openxmlformats.org/presentationml/2006/main" type="twoTxTwoObj" preserve="1">
+<p:sldLayout xmlns:a="http://schemas.openxmlformats.org/drawingml/2006/main" xmlns:r="http://schemas.openxmlformats.org/officeDocument/2006/relationships" xmlns:mc="http://schemas.openxmlformats.org/markup-compatibility/2006" xmlns:mv="urn:schemas-microsoft-com:mac:vml" xmlns:p="http://schemas.openxmlformats.org/presentationml/2006/main" mc:Ignorable="mv" mc:PreserveAttributes="mv:*" type="twoTxTwoObj" preserve="1">
   <p:cSld name="Comparison">
     <p:spTree>
       <p:nvGrpSpPr>
@@ -1797,7 +1766,6 @@
             <a:lvl1pPr>
               <a:defRPr/>
             </a:lvl1pPr>
-            <a:extLst/>
           </a:lstStyle>
           <a:p>
             <a:r>
@@ -1863,7 +1831,6 @@
               <a:buNone/>
               <a:defRPr sz="1600" b="1"/>
             </a:lvl9pPr>
-            <a:extLst/>
           </a:lstStyle>
           <a:p>
             <a:pPr lvl="0" eaLnBrk="1" latinLnBrk="0" hangingPunct="1"/>
@@ -1920,7 +1887,6 @@
             <a:lvl9pPr>
               <a:defRPr sz="1600"/>
             </a:lvl9pPr>
-            <a:extLst/>
           </a:lstStyle>
           <a:p>
             <a:pPr lvl="0" eaLnBrk="1" latinLnBrk="0" hangingPunct="1"/>
@@ -2015,7 +1981,6 @@
               <a:buNone/>
               <a:defRPr sz="1600" b="1"/>
             </a:lvl9pPr>
-            <a:extLst/>
           </a:lstStyle>
           <a:p>
             <a:pPr lvl="0" eaLnBrk="1" latinLnBrk="0" hangingPunct="1"/>
@@ -2072,7 +2037,6 @@
             <a:lvl9pPr>
               <a:defRPr sz="1600"/>
             </a:lvl9pPr>
-            <a:extLst/>
           </a:lstStyle>
           <a:p>
             <a:pPr lvl="0" eaLnBrk="1" latinLnBrk="0" hangingPunct="1"/>
@@ -2130,7 +2094,7 @@
             <a:fld id="{A5B00B91-90A6-4B00-B790-8A3A89AE3D40}" type="datetimeFigureOut">
               <a:rPr lang="en-US" smtClean="0"/>
               <a:pPr/>
-              <a:t>11/8/2009</a:t>
+              <a:t>11/10/09</a:t>
             </a:fld>
             <a:endParaRPr lang="en-US" dirty="0"/>
           </a:p>
@@ -2188,7 +2152,7 @@
 </file>
 
 <file path=ppt/slideLayouts/slideLayout6.xml><?xml version="1.0" encoding="utf-8"?>
-<p:sldLayout xmlns:a="http://schemas.openxmlformats.org/drawingml/2006/main" xmlns:r="http://schemas.openxmlformats.org/officeDocument/2006/relationships" xmlns:p="http://schemas.openxmlformats.org/presentationml/2006/main" type="titleOnly" preserve="1">
+<p:sldLayout xmlns:a="http://schemas.openxmlformats.org/drawingml/2006/main" xmlns:r="http://schemas.openxmlformats.org/officeDocument/2006/relationships" xmlns:mc="http://schemas.openxmlformats.org/markup-compatibility/2006" xmlns:mv="urn:schemas-microsoft-com:mac:vml" xmlns:p="http://schemas.openxmlformats.org/presentationml/2006/main" mc:Ignorable="mv" mc:PreserveAttributes="mv:*" type="titleOnly" preserve="1">
   <p:cSld name="Title Only">
     <p:spTree>
       <p:nvGrpSpPr>
@@ -2217,9 +2181,7 @@
         <p:spPr/>
         <p:txBody>
           <a:bodyPr/>
-          <a:lstStyle>
-            <a:extLst/>
-          </a:lstStyle>
+          <a:lstStyle/>
           <a:p>
             <a:r>
               <a:rPr kumimoji="0" lang="en-US" smtClean="0"/>
@@ -2247,7 +2209,7 @@
             <a:fld id="{A5B00B91-90A6-4B00-B790-8A3A89AE3D40}" type="datetimeFigureOut">
               <a:rPr lang="en-US" smtClean="0"/>
               <a:pPr/>
-              <a:t>11/8/2009</a:t>
+              <a:t>11/10/09</a:t>
             </a:fld>
             <a:endParaRPr lang="en-US" dirty="0"/>
           </a:p>
@@ -2305,7 +2267,7 @@
 </file>
 
 <file path=ppt/slideLayouts/slideLayout7.xml><?xml version="1.0" encoding="utf-8"?>
-<p:sldLayout xmlns:a="http://schemas.openxmlformats.org/drawingml/2006/main" xmlns:r="http://schemas.openxmlformats.org/officeDocument/2006/relationships" xmlns:p="http://schemas.openxmlformats.org/presentationml/2006/main" showMasterSp="0" type="blank" preserve="1">
+<p:sldLayout xmlns:a="http://schemas.openxmlformats.org/drawingml/2006/main" xmlns:r="http://schemas.openxmlformats.org/officeDocument/2006/relationships" xmlns:mc="http://schemas.openxmlformats.org/markup-compatibility/2006" xmlns:mv="urn:schemas-microsoft-com:mac:vml" xmlns:p="http://schemas.openxmlformats.org/presentationml/2006/main" mc:Ignorable="mv" mc:PreserveAttributes="mv:*" showMasterSp="0" type="blank" preserve="1">
   <p:cSld name="Blank">
     <p:spTree>
       <p:nvGrpSpPr>
@@ -2339,7 +2301,7 @@
             <a:fld id="{A5B00B91-90A6-4B00-B790-8A3A89AE3D40}" type="datetimeFigureOut">
               <a:rPr lang="en-US" smtClean="0"/>
               <a:pPr/>
-              <a:t>11/8/2009</a:t>
+              <a:t>11/10/09</a:t>
             </a:fld>
             <a:endParaRPr lang="en-US" dirty="0"/>
           </a:p>
@@ -2397,7 +2359,7 @@
 </file>
 
 <file path=ppt/slideLayouts/slideLayout8.xml><?xml version="1.0" encoding="utf-8"?>
-<p:sldLayout xmlns:a="http://schemas.openxmlformats.org/drawingml/2006/main" xmlns:r="http://schemas.openxmlformats.org/officeDocument/2006/relationships" xmlns:p="http://schemas.openxmlformats.org/presentationml/2006/main" type="objTx" preserve="1">
+<p:sldLayout xmlns:a="http://schemas.openxmlformats.org/drawingml/2006/main" xmlns:r="http://schemas.openxmlformats.org/officeDocument/2006/relationships" xmlns:mc="http://schemas.openxmlformats.org/markup-compatibility/2006" xmlns:mv="urn:schemas-microsoft-com:mac:vml" xmlns:p="http://schemas.openxmlformats.org/presentationml/2006/main" mc:Ignorable="mv" mc:PreserveAttributes="mv:*" type="objTx" preserve="1">
   <p:cSld name="Content with Caption">
     <p:spTree>
       <p:nvGrpSpPr>
@@ -2438,7 +2400,6 @@
             <a:lvl1pPr algn="l">
               <a:defRPr sz="2000" b="0"/>
             </a:lvl1pPr>
-            <a:extLst/>
           </a:lstStyle>
           <a:p>
             <a:r>
@@ -2495,7 +2456,6 @@
             <a:lvl9pPr>
               <a:defRPr sz="2000"/>
             </a:lvl9pPr>
-            <a:extLst/>
           </a:lstStyle>
           <a:p>
             <a:pPr lvl="0" eaLnBrk="1" latinLnBrk="0" hangingPunct="1"/>
@@ -2590,7 +2550,6 @@
               <a:buNone/>
               <a:defRPr sz="900"/>
             </a:lvl9pPr>
-            <a:extLst/>
           </a:lstStyle>
           <a:p>
             <a:pPr lvl="0" eaLnBrk="1" latinLnBrk="0" hangingPunct="1"/>
@@ -2619,7 +2578,7 @@
             <a:fld id="{A5B00B91-90A6-4B00-B790-8A3A89AE3D40}" type="datetimeFigureOut">
               <a:rPr lang="en-US" smtClean="0"/>
               <a:pPr/>
-              <a:t>11/8/2009</a:t>
+              <a:t>11/10/09</a:t>
             </a:fld>
             <a:endParaRPr lang="en-US" dirty="0"/>
           </a:p>
@@ -2706,9 +2665,7 @@
         </p:style>
         <p:txBody>
           <a:bodyPr rtlCol="0" anchor="ctr"/>
-          <a:lstStyle>
-            <a:extLst/>
-          </a:lstStyle>
+          <a:lstStyle/>
           <a:p>
             <a:pPr algn="ctr" eaLnBrk="1" latinLnBrk="0" hangingPunct="1"/>
             <a:endParaRPr kumimoji="0" lang="en-US" dirty="0"/>
@@ -2753,9 +2710,7 @@
         </p:style>
         <p:txBody>
           <a:bodyPr rtlCol="0" anchor="ctr"/>
-          <a:lstStyle>
-            <a:extLst/>
-          </a:lstStyle>
+          <a:lstStyle/>
           <a:p>
             <a:pPr algn="ctr" eaLnBrk="1" latinLnBrk="0" hangingPunct="1"/>
             <a:endParaRPr kumimoji="0" lang="en-US" dirty="0"/>
@@ -2771,7 +2726,7 @@
 </file>
 
 <file path=ppt/slideLayouts/slideLayout9.xml><?xml version="1.0" encoding="utf-8"?>
-<p:sldLayout xmlns:a="http://schemas.openxmlformats.org/drawingml/2006/main" xmlns:r="http://schemas.openxmlformats.org/officeDocument/2006/relationships" xmlns:p="http://schemas.openxmlformats.org/presentationml/2006/main" type="picTx" preserve="1">
+<p:sldLayout xmlns:a="http://schemas.openxmlformats.org/drawingml/2006/main" xmlns:r="http://schemas.openxmlformats.org/officeDocument/2006/relationships" xmlns:mc="http://schemas.openxmlformats.org/markup-compatibility/2006" xmlns:mv="urn:schemas-microsoft-com:mac:vml" xmlns:p="http://schemas.openxmlformats.org/presentationml/2006/main" mc:Ignorable="mv" mc:PreserveAttributes="mv:*" type="picTx" preserve="1">
   <p:cSld name="Picture with Caption">
     <p:bg>
       <p:bgRef idx="1001">
@@ -2816,7 +2771,6 @@
             <a:lvl1pPr algn="l">
               <a:defRPr sz="2000" b="0"/>
             </a:lvl1pPr>
-            <a:extLst/>
           </a:lstStyle>
           <a:p>
             <a:r>
@@ -2887,7 +2841,6 @@
               <a:buNone/>
               <a:defRPr sz="2000"/>
             </a:lvl9pPr>
-            <a:extLst/>
           </a:lstStyle>
           <a:p>
             <a:r>
@@ -2953,7 +2906,6 @@
               <a:buNone/>
               <a:defRPr sz="900"/>
             </a:lvl9pPr>
-            <a:extLst/>
           </a:lstStyle>
           <a:p>
             <a:pPr lvl="0" eaLnBrk="1" latinLnBrk="0" hangingPunct="1"/>
@@ -2987,7 +2939,7 @@
             <a:fld id="{A5B00B91-90A6-4B00-B790-8A3A89AE3D40}" type="datetimeFigureOut">
               <a:rPr lang="en-US" smtClean="0"/>
               <a:pPr/>
-              <a:t>11/8/2009</a:t>
+              <a:t>11/10/09</a:t>
             </a:fld>
             <a:endParaRPr lang="en-US" dirty="0"/>
           </a:p>
@@ -3031,9 +2983,7 @@
         </p:style>
         <p:txBody>
           <a:bodyPr rtlCol="0" anchor="ctr"/>
-          <a:lstStyle>
-            <a:extLst/>
-          </a:lstStyle>
+          <a:lstStyle/>
           <a:p>
             <a:pPr algn="ctr" eaLnBrk="1" latinLnBrk="0" hangingPunct="1"/>
             <a:endParaRPr kumimoji="0" lang="en-US" dirty="0"/>
@@ -3078,9 +3028,7 @@
         </p:style>
         <p:txBody>
           <a:bodyPr rtlCol="0" anchor="ctr"/>
-          <a:lstStyle>
-            <a:extLst/>
-          </a:lstStyle>
+          <a:lstStyle/>
           <a:p>
             <a:pPr algn="ctr" eaLnBrk="1" latinLnBrk="0" hangingPunct="1"/>
             <a:endParaRPr kumimoji="0" lang="en-US" dirty="0"/>
@@ -3159,7 +3107,7 @@
 </file>
 
 <file path=ppt/slideMasters/slideMaster1.xml><?xml version="1.0" encoding="utf-8"?>
-<p:sldMaster xmlns:a="http://schemas.openxmlformats.org/drawingml/2006/main" xmlns:r="http://schemas.openxmlformats.org/officeDocument/2006/relationships" xmlns:p="http://schemas.openxmlformats.org/presentationml/2006/main">
+<p:sldMaster xmlns:a="http://schemas.openxmlformats.org/drawingml/2006/main" xmlns:r="http://schemas.openxmlformats.org/officeDocument/2006/relationships" xmlns:mc="http://schemas.openxmlformats.org/markup-compatibility/2006" xmlns:mv="urn:schemas-microsoft-com:mac:vml" xmlns:p="http://schemas.openxmlformats.org/presentationml/2006/main" mc:Ignorable="mv" mc:PreserveAttributes="mv:*">
   <p:cSld>
     <p:bg>
       <p:bgRef idx="1001">
@@ -3225,9 +3173,7 @@
         </p:style>
         <p:txBody>
           <a:bodyPr rtlCol="0" anchor="ctr"/>
-          <a:lstStyle>
-            <a:extLst/>
-          </a:lstStyle>
+          <a:lstStyle/>
           <a:p>
             <a:pPr algn="ctr" eaLnBrk="1" latinLnBrk="0" hangingPunct="1"/>
             <a:endParaRPr kumimoji="0" lang="en-US" dirty="0"/>
@@ -3272,9 +3218,7 @@
         </p:style>
         <p:txBody>
           <a:bodyPr rtlCol="0" anchor="ctr"/>
-          <a:lstStyle>
-            <a:extLst/>
-          </a:lstStyle>
+          <a:lstStyle/>
           <a:p>
             <a:pPr algn="ctr" eaLnBrk="1" latinLnBrk="0" hangingPunct="1"/>
             <a:endParaRPr kumimoji="0" lang="en-US" dirty="0"/>
@@ -3313,9 +3257,7 @@
               <a:bevelT w="50800" h="10160"/>
             </a:sp3d>
           </a:bodyPr>
-          <a:lstStyle>
-            <a:extLst/>
-          </a:lstStyle>
+          <a:lstStyle/>
           <a:p>
             <a:r>
               <a:rPr kumimoji="0" lang="en-US" smtClean="0"/>
@@ -3348,9 +3290,7 @@
           <a:bodyPr vert="horz" lIns="54864" tIns="91440" rtlCol="0">
             <a:normAutofit/>
           </a:bodyPr>
-          <a:lstStyle>
-            <a:extLst/>
-          </a:lstStyle>
+          <a:lstStyle/>
           <a:p>
             <a:pPr lvl="0" eaLnBrk="1" latinLnBrk="0" hangingPunct="1"/>
             <a:r>
@@ -3420,13 +3360,12 @@
                 </a:solidFill>
               </a:defRPr>
             </a:lvl1pPr>
-            <a:extLst/>
           </a:lstStyle>
           <a:p>
             <a:fld id="{A5B00B91-90A6-4B00-B790-8A3A89AE3D40}" type="datetimeFigureOut">
               <a:rPr lang="en-US" smtClean="0"/>
               <a:pPr/>
-              <a:t>11/8/2009</a:t>
+              <a:t>11/10/09</a:t>
             </a:fld>
             <a:endParaRPr lang="en-US" dirty="0"/>
           </a:p>
@@ -3463,7 +3402,6 @@
                 </a:solidFill>
               </a:defRPr>
             </a:lvl1pPr>
-            <a:extLst/>
           </a:lstStyle>
           <a:p>
             <a:endParaRPr lang="en-US" dirty="0"/>
@@ -3501,7 +3439,6 @@
                 </a:solidFill>
               </a:defRPr>
             </a:lvl1pPr>
-            <a:extLst/>
           </a:lstStyle>
           <a:p>
             <a:fld id="{B5297D6C-88C0-4F2E-A6D0-AAF6CD514E45}" type="slidenum">
@@ -3548,7 +3485,6 @@
           <a:cs typeface="+mj-cs"/>
         </a:defRPr>
       </a:lvl1pPr>
-      <a:extLst/>
     </p:titleStyle>
     <p:bodyStyle>
       <a:lvl1pPr marL="438912" indent="-320040" algn="l" rtl="0" eaLnBrk="1" latinLnBrk="0" hangingPunct="1">
@@ -3717,7 +3653,6 @@
           <a:cs typeface="+mn-cs"/>
         </a:defRPr>
       </a:lvl9pPr>
-      <a:extLst/>
     </p:bodyStyle>
     <p:otherStyle>
       <a:lvl1pPr marL="0" algn="l" rtl="0" eaLnBrk="1" latinLnBrk="0" hangingPunct="1">
@@ -3810,14 +3745,13 @@
           <a:cs typeface="+mn-cs"/>
         </a:defRPr>
       </a:lvl9pPr>
-      <a:extLst/>
     </p:otherStyle>
   </p:txStyles>
 </p:sldMaster>
 </file>
 
 <file path=ppt/slides/slide1.xml><?xml version="1.0" encoding="utf-8"?>
-<p:sld xmlns:a="http://schemas.openxmlformats.org/drawingml/2006/main" xmlns:r="http://schemas.openxmlformats.org/officeDocument/2006/relationships" xmlns:p="http://schemas.openxmlformats.org/presentationml/2006/main">
+<p:sld xmlns:a="http://schemas.openxmlformats.org/drawingml/2006/main" xmlns:r="http://schemas.openxmlformats.org/officeDocument/2006/relationships" xmlns:mc="http://schemas.openxmlformats.org/markup-compatibility/2006" xmlns:mv="urn:schemas-microsoft-com:mac:vml" xmlns:p="http://schemas.openxmlformats.org/presentationml/2006/main" mc:Ignorable="mv" mc:PreserveAttributes="mv:*">
   <p:cSld>
     <p:spTree>
       <p:nvGrpSpPr>
@@ -3888,7 +3822,7 @@
 </file>
 
 <file path=ppt/slides/slide10.xml><?xml version="1.0" encoding="utf-8"?>
-<p:sld xmlns:a="http://schemas.openxmlformats.org/drawingml/2006/main" xmlns:r="http://schemas.openxmlformats.org/officeDocument/2006/relationships" xmlns:p="http://schemas.openxmlformats.org/presentationml/2006/main">
+<p:sld xmlns:a="http://schemas.openxmlformats.org/drawingml/2006/main" xmlns:r="http://schemas.openxmlformats.org/officeDocument/2006/relationships" xmlns:mc="http://schemas.openxmlformats.org/markup-compatibility/2006" xmlns:mv="urn:schemas-microsoft-com:mac:vml" xmlns:p="http://schemas.openxmlformats.org/presentationml/2006/main" mc:Ignorable="mv" mc:PreserveAttributes="mv:*">
   <p:cSld>
     <p:spTree>
       <p:nvGrpSpPr>
@@ -3906,7 +3840,7 @@
       </p:grpSpPr>
       <p:sp>
         <p:nvSpPr>
-          <p:cNvPr id="7" name="Title 6"/>
+          <p:cNvPr id="2" name="Title 1"/>
           <p:cNvSpPr>
             <a:spLocks noGrp="1"/>
           </p:cNvSpPr>
@@ -3921,7 +3855,7 @@
           <a:p>
             <a:r>
               <a:rPr lang="en-US" dirty="0" smtClean="0"/>
-              <a:t>User Interaction</a:t>
+              <a:t>The Sigmoid Function</a:t>
             </a:r>
             <a:endParaRPr lang="en-US" dirty="0"/>
           </a:p>
@@ -3929,23 +3863,132 @@
       </p:sp>
       <p:sp>
         <p:nvSpPr>
-          <p:cNvPr id="8" name="Content Placeholder 7"/>
-          <p:cNvSpPr>
-            <a:spLocks noGrp="1"/>
-          </p:cNvSpPr>
-          <p:nvPr>
-            <p:ph idx="1"/>
-          </p:nvPr>
-        </p:nvSpPr>
-        <p:spPr/>
+          <p:cNvPr id="4" name="Text Placeholder 3"/>
+          <p:cNvSpPr>
+            <a:spLocks noGrp="1"/>
+          </p:cNvSpPr>
+          <p:nvPr>
+            <p:ph type="body" idx="1"/>
+          </p:nvPr>
+        </p:nvSpPr>
+        <p:spPr>
+          <a:xfrm>
+            <a:off x="381000" y="5029200"/>
+            <a:ext cx="4040188" cy="715355"/>
+          </a:xfrm>
+        </p:spPr>
         <p:txBody>
           <a:bodyPr/>
           <a:lstStyle/>
           <a:p>
+            <a:pPr algn="ctr"/>
+            <a:r>
+              <a:rPr lang="en-US" dirty="0" smtClean="0"/>
+              <a:t>Continuous</a:t>
+            </a:r>
             <a:endParaRPr lang="en-US" dirty="0"/>
           </a:p>
         </p:txBody>
       </p:sp>
+      <p:sp>
+        <p:nvSpPr>
+          <p:cNvPr id="6" name="Text Placeholder 5"/>
+          <p:cNvSpPr>
+            <a:spLocks noGrp="1"/>
+          </p:cNvSpPr>
+          <p:nvPr>
+            <p:ph type="body" sz="quarter" idx="3"/>
+          </p:nvPr>
+        </p:nvSpPr>
+        <p:spPr>
+          <a:xfrm>
+            <a:off x="4568825" y="5029200"/>
+            <a:ext cx="4041775" cy="715355"/>
+          </a:xfrm>
+        </p:spPr>
+        <p:txBody>
+          <a:bodyPr/>
+          <a:lstStyle/>
+          <a:p>
+            <a:pPr algn="ctr"/>
+            <a:r>
+              <a:rPr lang="en-US" dirty="0" smtClean="0"/>
+              <a:t>Piecewise</a:t>
+            </a:r>
+            <a:endParaRPr lang="en-US" dirty="0"/>
+          </a:p>
+        </p:txBody>
+      </p:sp>
+      <p:pic>
+        <p:nvPicPr>
+          <p:cNvPr id="1028" name="Picture 4"/>
+          <p:cNvPicPr>
+            <a:picLocks noGrp="1" noChangeAspect="1" noChangeArrowheads="1"/>
+          </p:cNvPicPr>
+          <p:nvPr>
+            <p:ph sz="quarter" idx="4"/>
+          </p:nvPr>
+        </p:nvPicPr>
+        <p:blipFill>
+          <a:blip r:embed="rId2"/>
+          <a:srcRect/>
+          <a:stretch>
+            <a:fillRect/>
+          </a:stretch>
+        </p:blipFill>
+        <p:spPr bwMode="auto">
+          <a:xfrm>
+            <a:off x="4572000" y="2286000"/>
+            <a:ext cx="4128916" cy="2793900"/>
+          </a:xfrm>
+          <a:prstGeom prst="rect">
+            <a:avLst/>
+          </a:prstGeom>
+          <a:noFill/>
+          <a:ln w="9525">
+            <a:noFill/>
+            <a:miter lim="800000"/>
+            <a:headEnd/>
+            <a:tailEnd/>
+          </a:ln>
+          <a:effectLst/>
+        </p:spPr>
+      </p:pic>
+      <p:pic>
+        <p:nvPicPr>
+          <p:cNvPr id="1029" name="Picture 5"/>
+          <p:cNvPicPr>
+            <a:picLocks noGrp="1" noChangeAspect="1" noChangeArrowheads="1"/>
+          </p:cNvPicPr>
+          <p:nvPr>
+            <p:ph sz="half" idx="2"/>
+          </p:nvPr>
+        </p:nvPicPr>
+        <p:blipFill>
+          <a:blip r:embed="rId3"/>
+          <a:srcRect/>
+          <a:stretch>
+            <a:fillRect/>
+          </a:stretch>
+        </p:blipFill>
+        <p:spPr bwMode="auto">
+          <a:xfrm>
+            <a:off x="304800" y="2286000"/>
+            <a:ext cx="4096219" cy="2819400"/>
+          </a:xfrm>
+          <a:prstGeom prst="rect">
+            <a:avLst/>
+          </a:prstGeom>
+          <a:noFill/>
+          <a:ln w="9525">
+            <a:noFill/>
+            <a:miter lim="800000"/>
+            <a:headEnd/>
+            <a:tailEnd/>
+          </a:ln>
+          <a:effectLst/>
+        </p:spPr>
+      </p:pic>
     </p:spTree>
   </p:cSld>
   <p:clrMapOvr>
@@ -3955,7 +3998,7 @@
 </file>
 
 <file path=ppt/slides/slide11.xml><?xml version="1.0" encoding="utf-8"?>
-<p:sld xmlns:a="http://schemas.openxmlformats.org/drawingml/2006/main" xmlns:r="http://schemas.openxmlformats.org/officeDocument/2006/relationships" xmlns:p="http://schemas.openxmlformats.org/presentationml/2006/main">
+<p:sld xmlns:a="http://schemas.openxmlformats.org/drawingml/2006/main" xmlns:r="http://schemas.openxmlformats.org/officeDocument/2006/relationships" xmlns:mc="http://schemas.openxmlformats.org/markup-compatibility/2006" xmlns:mv="urn:schemas-microsoft-com:mac:vml" xmlns:p="http://schemas.openxmlformats.org/presentationml/2006/main" mc:Ignorable="mv" mc:PreserveAttributes="mv:*">
   <p:cSld>
     <p:spTree>
       <p:nvGrpSpPr>
@@ -3973,12 +4016,12 @@
       </p:grpSpPr>
       <p:sp>
         <p:nvSpPr>
-          <p:cNvPr id="11" name="Title 10"/>
-          <p:cNvSpPr>
-            <a:spLocks noGrp="1"/>
-          </p:cNvSpPr>
-          <p:nvPr>
-            <p:ph type="ctrTitle"/>
+          <p:cNvPr id="7" name="Title 6"/>
+          <p:cNvSpPr>
+            <a:spLocks noGrp="1"/>
+          </p:cNvSpPr>
+          <p:nvPr>
+            <p:ph type="title"/>
           </p:nvPr>
         </p:nvSpPr>
         <p:spPr/>
@@ -3988,7 +4031,7 @@
           <a:p>
             <a:r>
               <a:rPr lang="en-US" dirty="0" smtClean="0"/>
-              <a:t>Live Demo</a:t>
+              <a:t>User Interaction</a:t>
             </a:r>
             <a:endParaRPr lang="en-US" dirty="0"/>
           </a:p>
@@ -3996,12 +4039,12 @@
       </p:sp>
       <p:sp>
         <p:nvSpPr>
-          <p:cNvPr id="12" name="Subtitle 11"/>
-          <p:cNvSpPr>
-            <a:spLocks noGrp="1"/>
-          </p:cNvSpPr>
-          <p:nvPr>
-            <p:ph type="subTitle" idx="1"/>
+          <p:cNvPr id="8" name="Content Placeholder 7"/>
+          <p:cNvSpPr>
+            <a:spLocks noGrp="1"/>
+          </p:cNvSpPr>
+          <p:nvPr>
+            <p:ph idx="1"/>
           </p:nvPr>
         </p:nvSpPr>
         <p:spPr/>
@@ -4022,7 +4065,7 @@
 </file>
 
 <file path=ppt/slides/slide12.xml><?xml version="1.0" encoding="utf-8"?>
-<p:sld xmlns:a="http://schemas.openxmlformats.org/drawingml/2006/main" xmlns:r="http://schemas.openxmlformats.org/officeDocument/2006/relationships" xmlns:p="http://schemas.openxmlformats.org/presentationml/2006/main">
+<p:sld xmlns:a="http://schemas.openxmlformats.org/drawingml/2006/main" xmlns:r="http://schemas.openxmlformats.org/officeDocument/2006/relationships" xmlns:mc="http://schemas.openxmlformats.org/markup-compatibility/2006" xmlns:mv="urn:schemas-microsoft-com:mac:vml" xmlns:p="http://schemas.openxmlformats.org/presentationml/2006/main" mc:Ignorable="mv" mc:PreserveAttributes="mv:*">
   <p:cSld>
     <p:spTree>
       <p:nvGrpSpPr>
@@ -4040,12 +4083,12 @@
       </p:grpSpPr>
       <p:sp>
         <p:nvSpPr>
-          <p:cNvPr id="2" name="Title 1"/>
-          <p:cNvSpPr>
-            <a:spLocks noGrp="1"/>
-          </p:cNvSpPr>
-          <p:nvPr>
-            <p:ph type="title"/>
+          <p:cNvPr id="11" name="Title 10"/>
+          <p:cNvSpPr>
+            <a:spLocks noGrp="1"/>
+          </p:cNvSpPr>
+          <p:nvPr>
+            <p:ph type="ctrTitle"/>
           </p:nvPr>
         </p:nvSpPr>
         <p:spPr/>
@@ -4055,7 +4098,7 @@
           <a:p>
             <a:r>
               <a:rPr lang="en-US" dirty="0" smtClean="0"/>
-              <a:t>Results</a:t>
+              <a:t>Live Demo</a:t>
             </a:r>
             <a:endParaRPr lang="en-US" dirty="0"/>
           </a:p>
@@ -4063,12 +4106,12 @@
       </p:sp>
       <p:sp>
         <p:nvSpPr>
-          <p:cNvPr id="3" name="Content Placeholder 2"/>
-          <p:cNvSpPr>
-            <a:spLocks noGrp="1"/>
-          </p:cNvSpPr>
-          <p:nvPr>
-            <p:ph idx="1"/>
+          <p:cNvPr id="12" name="Subtitle 11"/>
+          <p:cNvSpPr>
+            <a:spLocks noGrp="1"/>
+          </p:cNvSpPr>
+          <p:nvPr>
+            <p:ph type="subTitle" idx="1"/>
           </p:nvPr>
         </p:nvSpPr>
         <p:spPr/>
@@ -4076,7 +4119,7 @@
           <a:bodyPr/>
           <a:lstStyle/>
           <a:p>
-            <a:endParaRPr lang="en-US"/>
+            <a:endParaRPr lang="en-US" dirty="0"/>
           </a:p>
         </p:txBody>
       </p:sp>
@@ -4089,7 +4132,7 @@
 </file>
 
 <file path=ppt/slides/slide13.xml><?xml version="1.0" encoding="utf-8"?>
-<p:sld xmlns:a="http://schemas.openxmlformats.org/drawingml/2006/main" xmlns:r="http://schemas.openxmlformats.org/officeDocument/2006/relationships" xmlns:p="http://schemas.openxmlformats.org/presentationml/2006/main">
+<p:sld xmlns:a="http://schemas.openxmlformats.org/drawingml/2006/main" xmlns:r="http://schemas.openxmlformats.org/officeDocument/2006/relationships" xmlns:mc="http://schemas.openxmlformats.org/markup-compatibility/2006" xmlns:mv="urn:schemas-microsoft-com:mac:vml" xmlns:p="http://schemas.openxmlformats.org/presentationml/2006/main" mc:Ignorable="mv" mc:PreserveAttributes="mv:*">
   <p:cSld>
     <p:spTree>
       <p:nvGrpSpPr>
@@ -4117,8 +4160,75 @@
         </p:nvSpPr>
         <p:spPr/>
         <p:txBody>
+          <a:bodyPr/>
+          <a:lstStyle/>
+          <a:p>
+            <a:r>
+              <a:rPr lang="en-US" dirty="0" smtClean="0"/>
+              <a:t>Results</a:t>
+            </a:r>
+            <a:endParaRPr lang="en-US" dirty="0"/>
+          </a:p>
+        </p:txBody>
+      </p:sp>
+      <p:sp>
+        <p:nvSpPr>
+          <p:cNvPr id="3" name="Content Placeholder 2"/>
+          <p:cNvSpPr>
+            <a:spLocks noGrp="1"/>
+          </p:cNvSpPr>
+          <p:nvPr>
+            <p:ph idx="1"/>
+          </p:nvPr>
+        </p:nvSpPr>
+        <p:spPr/>
+        <p:txBody>
+          <a:bodyPr/>
+          <a:lstStyle/>
+          <a:p>
+            <a:endParaRPr lang="en-US"/>
+          </a:p>
+        </p:txBody>
+      </p:sp>
+    </p:spTree>
+  </p:cSld>
+  <p:clrMapOvr>
+    <a:masterClrMapping/>
+  </p:clrMapOvr>
+</p:sld>
+</file>
+
+<file path=ppt/slides/slide14.xml><?xml version="1.0" encoding="utf-8"?>
+<p:sld xmlns:a="http://schemas.openxmlformats.org/drawingml/2006/main" xmlns:r="http://schemas.openxmlformats.org/officeDocument/2006/relationships" xmlns:mc="http://schemas.openxmlformats.org/markup-compatibility/2006" xmlns:mv="urn:schemas-microsoft-com:mac:vml" xmlns:p="http://schemas.openxmlformats.org/presentationml/2006/main" mc:Ignorable="mv" mc:PreserveAttributes="mv:*">
+  <p:cSld>
+    <p:spTree>
+      <p:nvGrpSpPr>
+        <p:cNvPr id="1" name=""/>
+        <p:cNvGrpSpPr/>
+        <p:nvPr/>
+      </p:nvGrpSpPr>
+      <p:grpSpPr>
+        <a:xfrm>
+          <a:off x="0" y="0"/>
+          <a:ext cx="0" cy="0"/>
+          <a:chOff x="0" y="0"/>
+          <a:chExt cx="0" cy="0"/>
+        </a:xfrm>
+      </p:grpSpPr>
+      <p:sp>
+        <p:nvSpPr>
+          <p:cNvPr id="2" name="Title 1"/>
+          <p:cNvSpPr>
+            <a:spLocks noGrp="1"/>
+          </p:cNvSpPr>
+          <p:nvPr>
+            <p:ph type="title"/>
+          </p:nvPr>
+        </p:nvSpPr>
+        <p:spPr/>
+        <p:txBody>
           <a:bodyPr>
-            <a:normAutofit/>
+            <a:normAutofit fontScale="90000"/>
           </a:bodyPr>
           <a:lstStyle/>
           <a:p>
@@ -4127,8 +4237,8 @@
               <a:t>Device Utilization &amp; </a:t>
             </a:r>
             <a:r>
-              <a:rPr lang="en-US" dirty="0" err="1" smtClean="0"/>
-              <a:t>Perf</a:t>
+              <a:rPr lang="en-US" dirty="0" smtClean="0"/>
+              <a:t>Performance</a:t>
             </a:r>
             <a:endParaRPr lang="en-US" dirty="0"/>
           </a:p>
@@ -6603,8 +6713,8 @@
 </p:sld>
 </file>
 
-<file path=ppt/slides/slide14.xml><?xml version="1.0" encoding="utf-8"?>
-<p:sld xmlns:a="http://schemas.openxmlformats.org/drawingml/2006/main" xmlns:r="http://schemas.openxmlformats.org/officeDocument/2006/relationships" xmlns:p="http://schemas.openxmlformats.org/presentationml/2006/main">
+<file path=ppt/slides/slide15.xml><?xml version="1.0" encoding="utf-8"?>
+<p:sld xmlns:a="http://schemas.openxmlformats.org/drawingml/2006/main" xmlns:r="http://schemas.openxmlformats.org/officeDocument/2006/relationships" xmlns:mc="http://schemas.openxmlformats.org/markup-compatibility/2006" xmlns:mv="urn:schemas-microsoft-com:mac:vml" xmlns:p="http://schemas.openxmlformats.org/presentationml/2006/main" mc:Ignorable="mv" mc:PreserveAttributes="mv:*">
   <p:cSld>
     <p:spTree>
       <p:nvGrpSpPr>
@@ -6695,7 +6805,7 @@
 </file>
 
 <file path=ppt/slides/slide2.xml><?xml version="1.0" encoding="utf-8"?>
-<p:sld xmlns:a="http://schemas.openxmlformats.org/drawingml/2006/main" xmlns:r="http://schemas.openxmlformats.org/officeDocument/2006/relationships" xmlns:p="http://schemas.openxmlformats.org/presentationml/2006/main">
+<p:sld xmlns:a="http://schemas.openxmlformats.org/drawingml/2006/main" xmlns:r="http://schemas.openxmlformats.org/officeDocument/2006/relationships" xmlns:mc="http://schemas.openxmlformats.org/markup-compatibility/2006" xmlns:mv="urn:schemas-microsoft-com:mac:vml" xmlns:p="http://schemas.openxmlformats.org/presentationml/2006/main" mc:Ignorable="mv" mc:PreserveAttributes="mv:*">
   <p:cSld>
     <p:spTree>
       <p:nvGrpSpPr>
@@ -6775,7 +6885,7 @@
 </file>
 
 <file path=ppt/slides/slide3.xml><?xml version="1.0" encoding="utf-8"?>
-<p:sld xmlns:a="http://schemas.openxmlformats.org/drawingml/2006/main" xmlns:r="http://schemas.openxmlformats.org/officeDocument/2006/relationships" xmlns:p="http://schemas.openxmlformats.org/presentationml/2006/main">
+<p:sld xmlns:a="http://schemas.openxmlformats.org/drawingml/2006/main" xmlns:r="http://schemas.openxmlformats.org/officeDocument/2006/relationships" xmlns:mc="http://schemas.openxmlformats.org/markup-compatibility/2006" xmlns:mv="urn:schemas-microsoft-com:mac:vml" xmlns:p="http://schemas.openxmlformats.org/presentationml/2006/main" mc:Ignorable="mv" mc:PreserveAttributes="mv:*">
   <p:cSld>
     <p:spTree>
       <p:nvGrpSpPr>
@@ -6909,7 +7019,7 @@
 </file>
 
 <file path=ppt/slides/slide4.xml><?xml version="1.0" encoding="utf-8"?>
-<p:sld xmlns:a="http://schemas.openxmlformats.org/drawingml/2006/main" xmlns:r="http://schemas.openxmlformats.org/officeDocument/2006/relationships" xmlns:p="http://schemas.openxmlformats.org/presentationml/2006/main">
+<p:sld xmlns:a="http://schemas.openxmlformats.org/drawingml/2006/main" xmlns:r="http://schemas.openxmlformats.org/officeDocument/2006/relationships" xmlns:mc="http://schemas.openxmlformats.org/markup-compatibility/2006" xmlns:mv="urn:schemas-microsoft-com:mac:vml" xmlns:p="http://schemas.openxmlformats.org/presentationml/2006/main" mc:Ignorable="mv" mc:PreserveAttributes="mv:*">
   <p:cSld>
     <p:spTree>
       <p:nvGrpSpPr>
@@ -7060,7 +7170,7 @@
 </file>
 
 <file path=ppt/slides/slide5.xml><?xml version="1.0" encoding="utf-8"?>
-<p:sld xmlns:a="http://schemas.openxmlformats.org/drawingml/2006/main" xmlns:r="http://schemas.openxmlformats.org/officeDocument/2006/relationships" xmlns:p="http://schemas.openxmlformats.org/presentationml/2006/main">
+<p:sld xmlns:a="http://schemas.openxmlformats.org/drawingml/2006/main" xmlns:r="http://schemas.openxmlformats.org/officeDocument/2006/relationships" xmlns:mc="http://schemas.openxmlformats.org/markup-compatibility/2006" xmlns:mv="urn:schemas-microsoft-com:mac:vml" xmlns:p="http://schemas.openxmlformats.org/presentationml/2006/main" mc:Ignorable="mv" mc:PreserveAttributes="mv:*">
   <p:cSld>
     <p:spTree>
       <p:nvGrpSpPr>
@@ -7089,7 +7199,7 @@
         <p:spPr/>
         <p:txBody>
           <a:bodyPr>
-            <a:normAutofit/>
+            <a:normAutofit fontScale="90000"/>
           </a:bodyPr>
           <a:lstStyle/>
           <a:p>
@@ -7214,7 +7324,7 @@
 </file>
 
 <file path=ppt/slides/slide6.xml><?xml version="1.0" encoding="utf-8"?>
-<p:sld xmlns:a="http://schemas.openxmlformats.org/drawingml/2006/main" xmlns:r="http://schemas.openxmlformats.org/officeDocument/2006/relationships" xmlns:p="http://schemas.openxmlformats.org/presentationml/2006/main">
+<p:sld xmlns:a="http://schemas.openxmlformats.org/drawingml/2006/main" xmlns:r="http://schemas.openxmlformats.org/officeDocument/2006/relationships" xmlns:mc="http://schemas.openxmlformats.org/markup-compatibility/2006" xmlns:mv="urn:schemas-microsoft-com:mac:vml" xmlns:p="http://schemas.openxmlformats.org/presentationml/2006/main" mc:Ignorable="mv" mc:PreserveAttributes="mv:*">
   <p:cSld>
     <p:spTree>
       <p:nvGrpSpPr>
@@ -7247,7 +7357,7 @@
           <a:p>
             <a:r>
               <a:rPr lang="en-US" dirty="0" smtClean="0"/>
-              <a:t>FPGA Implementation</a:t>
+              <a:t>Goals for this project</a:t>
             </a:r>
             <a:endParaRPr lang="en-US" dirty="0"/>
           </a:p>
@@ -7260,28 +7370,34 @@
             <a:spLocks noGrp="1"/>
           </p:cNvSpPr>
           <p:nvPr>
-            <p:ph idx="1"/>
+            <p:ph sz="half" idx="1"/>
           </p:nvPr>
         </p:nvSpPr>
         <p:spPr/>
         <p:txBody>
-          <a:bodyPr>
-            <a:normAutofit/>
-          </a:bodyPr>
+          <a:bodyPr/>
           <a:lstStyle/>
           <a:p>
             <a:r>
               <a:rPr lang="en-US" dirty="0" smtClean="0"/>
-              <a:t>We implemented a network capable of learning any two-input function, such as AND, OR, XOR, etc</a:t>
-            </a:r>
-          </a:p>
-          <a:p>
+              <a:t>Learn about </a:t>
+            </a:r>
+            <a:r>
+              <a:rPr lang="en-US" dirty="0" err="1" smtClean="0"/>
+              <a:t>FPGAs</a:t>
+            </a:r>
             <a:endParaRPr lang="en-US" dirty="0" smtClean="0"/>
           </a:p>
           <a:p>
+            <a:endParaRPr lang="en-US" dirty="0" smtClean="0"/>
+          </a:p>
+          <a:p>
+            <a:endParaRPr lang="en-US" dirty="0" smtClean="0"/>
+          </a:p>
+          <a:p>
             <a:r>
               <a:rPr lang="en-US" dirty="0" smtClean="0"/>
-              <a:t>This is the smallest network that is useful</a:t>
+              <a:t>Implement accurate algorithms</a:t>
             </a:r>
           </a:p>
           <a:p>
@@ -7290,7 +7406,51 @@
           <a:p>
             <a:r>
               <a:rPr lang="en-US" dirty="0" smtClean="0"/>
-              <a:t>It could be expanded to any size, simply by increasing the number of nodes</a:t>
+              <a:t>IEEE Floating Point</a:t>
+            </a:r>
+            <a:endParaRPr lang="en-US" dirty="0"/>
+          </a:p>
+        </p:txBody>
+      </p:sp>
+      <p:sp>
+        <p:nvSpPr>
+          <p:cNvPr id="4" name="Content Placeholder 3"/>
+          <p:cNvSpPr>
+            <a:spLocks noGrp="1"/>
+          </p:cNvSpPr>
+          <p:nvPr>
+            <p:ph sz="half" idx="2"/>
+          </p:nvPr>
+        </p:nvSpPr>
+        <p:spPr/>
+        <p:txBody>
+          <a:bodyPr/>
+          <a:lstStyle/>
+          <a:p>
+            <a:r>
+              <a:rPr lang="en-US" dirty="0" smtClean="0"/>
+              <a:t>Implement a Fast Neural Network</a:t>
+            </a:r>
+          </a:p>
+          <a:p>
+            <a:endParaRPr lang="en-US" dirty="0" smtClean="0"/>
+          </a:p>
+          <a:p>
+            <a:r>
+              <a:rPr lang="en-US" dirty="0" smtClean="0"/>
+              <a:t>4 bit text recognition</a:t>
+            </a:r>
+          </a:p>
+          <a:p>
+            <a:endParaRPr lang="en-US" dirty="0" smtClean="0"/>
+          </a:p>
+          <a:p>
+            <a:endParaRPr lang="en-US" dirty="0" smtClean="0"/>
+          </a:p>
+          <a:p>
+            <a:r>
+              <a:rPr lang="en-US" dirty="0" smtClean="0"/>
+              <a:t>Scalable Network</a:t>
             </a:r>
             <a:endParaRPr lang="en-US" dirty="0"/>
           </a:p>
@@ -7305,7 +7465,7 @@
 </file>
 
 <file path=ppt/slides/slide7.xml><?xml version="1.0" encoding="utf-8"?>
-<p:sld xmlns:a="http://schemas.openxmlformats.org/drawingml/2006/main" xmlns:r="http://schemas.openxmlformats.org/officeDocument/2006/relationships" xmlns:p="http://schemas.openxmlformats.org/presentationml/2006/main">
+<p:sld xmlns:a="http://schemas.openxmlformats.org/drawingml/2006/main" xmlns:r="http://schemas.openxmlformats.org/officeDocument/2006/relationships" xmlns:mc="http://schemas.openxmlformats.org/markup-compatibility/2006" xmlns:mv="urn:schemas-microsoft-com:mac:vml" xmlns:p="http://schemas.openxmlformats.org/presentationml/2006/main" mc:Ignorable="mv" mc:PreserveAttributes="mv:*">
   <p:cSld>
     <p:spTree>
       <p:nvGrpSpPr>
@@ -7338,7 +7498,7 @@
           <a:p>
             <a:r>
               <a:rPr lang="en-US" dirty="0" smtClean="0"/>
-              <a:t>Structural Overview</a:t>
+              <a:t>FPGA Implementation</a:t>
             </a:r>
             <a:endParaRPr lang="en-US" dirty="0"/>
           </a:p>
@@ -7356,46 +7516,32 @@
         </p:nvSpPr>
         <p:spPr/>
         <p:txBody>
-          <a:bodyPr/>
+          <a:bodyPr>
+            <a:normAutofit/>
+          </a:bodyPr>
           <a:lstStyle/>
           <a:p>
             <a:r>
               <a:rPr lang="en-US" dirty="0" smtClean="0"/>
-              <a:t>Neuron: sums up signals</a:t>
-            </a:r>
+              <a:t>We implemented a network capable of learning any two-input function, such as AND, OR, XOR, etc</a:t>
+            </a:r>
+          </a:p>
+          <a:p>
+            <a:endParaRPr lang="en-US" dirty="0" smtClean="0"/>
           </a:p>
           <a:p>
             <a:r>
               <a:rPr lang="en-US" dirty="0" smtClean="0"/>
-              <a:t>Connection: passes along weighted signals</a:t>
-            </a:r>
+              <a:t>This is the smallest network that is useful</a:t>
+            </a:r>
+          </a:p>
+          <a:p>
+            <a:endParaRPr lang="en-US" dirty="0" smtClean="0"/>
           </a:p>
           <a:p>
             <a:r>
               <a:rPr lang="en-US" dirty="0" smtClean="0"/>
-              <a:t>Sigmoid: clamps large unsigned values</a:t>
-            </a:r>
-          </a:p>
-          <a:p>
-            <a:endParaRPr lang="en-US" dirty="0" smtClean="0"/>
-          </a:p>
-          <a:p>
-            <a:r>
-              <a:rPr lang="en-US" dirty="0" smtClean="0"/>
-              <a:t>Network: sets up topology, uses above</a:t>
-            </a:r>
-          </a:p>
-          <a:p>
-            <a:endParaRPr lang="en-US" dirty="0" smtClean="0"/>
-          </a:p>
-          <a:p>
-            <a:r>
-              <a:rPr lang="en-US" dirty="0" smtClean="0"/>
-              <a:t>Interface/</a:t>
-            </a:r>
-            <a:r>
-              <a:rPr lang="en-US" dirty="0" err="1" smtClean="0"/>
-              <a:t>Testbench</a:t>
+              <a:t>It could be expanded to any size, simply by increasing the number of nodes</a:t>
             </a:r>
             <a:endParaRPr lang="en-US" dirty="0"/>
           </a:p>
@@ -7410,7 +7556,7 @@
 </file>
 
 <file path=ppt/slides/slide8.xml><?xml version="1.0" encoding="utf-8"?>
-<p:sld xmlns:a="http://schemas.openxmlformats.org/drawingml/2006/main" xmlns:r="http://schemas.openxmlformats.org/officeDocument/2006/relationships" xmlns:p="http://schemas.openxmlformats.org/presentationml/2006/main">
+<p:sld xmlns:a="http://schemas.openxmlformats.org/drawingml/2006/main" xmlns:r="http://schemas.openxmlformats.org/officeDocument/2006/relationships" xmlns:mc="http://schemas.openxmlformats.org/markup-compatibility/2006" xmlns:mv="urn:schemas-microsoft-com:mac:vml" xmlns:p="http://schemas.openxmlformats.org/presentationml/2006/main" mc:Ignorable="mv" mc:PreserveAttributes="mv:*">
   <p:cSld>
     <p:spTree>
       <p:nvGrpSpPr>
@@ -7443,7 +7589,7 @@
           <a:p>
             <a:r>
               <a:rPr lang="en-US" dirty="0" smtClean="0"/>
-              <a:t>Dealing with Numbers</a:t>
+              <a:t>Structural Overview</a:t>
             </a:r>
             <a:endParaRPr lang="en-US" dirty="0"/>
           </a:p>
@@ -7466,7 +7612,19 @@
           <a:p>
             <a:r>
               <a:rPr lang="en-US" dirty="0" smtClean="0"/>
-              <a:t>FPGA has no floating point support</a:t>
+              <a:t>Neuron: sums up signals</a:t>
+            </a:r>
+          </a:p>
+          <a:p>
+            <a:r>
+              <a:rPr lang="en-US" dirty="0" smtClean="0"/>
+              <a:t>Connection: passes along weighted signals</a:t>
+            </a:r>
+          </a:p>
+          <a:p>
+            <a:r>
+              <a:rPr lang="en-US" dirty="0" smtClean="0"/>
+              <a:t>Sigmoid: clamps large unsigned values</a:t>
             </a:r>
           </a:p>
           <a:p>
@@ -7475,7 +7633,7 @@
           <a:p>
             <a:r>
               <a:rPr lang="en-US" dirty="0" smtClean="0"/>
-              <a:t>Use fixed point signed &amp; unsigned numbers, converting where necessary</a:t>
+              <a:t>Network: sets up topology, uses above</a:t>
             </a:r>
           </a:p>
           <a:p>
@@ -7484,16 +7642,11 @@
           <a:p>
             <a:r>
               <a:rPr lang="en-US" dirty="0" smtClean="0"/>
-              <a:t>Sigmoid requires a lot of dynamic range</a:t>
-            </a:r>
-          </a:p>
-          <a:p>
-            <a:endParaRPr lang="en-US" dirty="0" smtClean="0"/>
-          </a:p>
-          <a:p>
-            <a:r>
-              <a:rPr lang="en-US" dirty="0" smtClean="0"/>
-              <a:t>Taylor series is best, we settled for a piecewise linear approximation</a:t>
+              <a:t>Interface/</a:t>
+            </a:r>
+            <a:r>
+              <a:rPr lang="en-US" dirty="0" err="1" smtClean="0"/>
+              <a:t>Testbench</a:t>
             </a:r>
             <a:endParaRPr lang="en-US" dirty="0"/>
           </a:p>
@@ -7508,7 +7661,7 @@
 </file>
 
 <file path=ppt/slides/slide9.xml><?xml version="1.0" encoding="utf-8"?>
-<p:sld xmlns:a="http://schemas.openxmlformats.org/drawingml/2006/main" xmlns:r="http://schemas.openxmlformats.org/officeDocument/2006/relationships" xmlns:p="http://schemas.openxmlformats.org/presentationml/2006/main">
+<p:sld xmlns:a="http://schemas.openxmlformats.org/drawingml/2006/main" xmlns:r="http://schemas.openxmlformats.org/officeDocument/2006/relationships" xmlns:mc="http://schemas.openxmlformats.org/markup-compatibility/2006" xmlns:mv="urn:schemas-microsoft-com:mac:vml" xmlns:p="http://schemas.openxmlformats.org/presentationml/2006/main" mc:Ignorable="mv" mc:PreserveAttributes="mv:*">
   <p:cSld>
     <p:spTree>
       <p:nvGrpSpPr>
@@ -7541,7 +7694,7 @@
           <a:p>
             <a:r>
               <a:rPr lang="en-US" dirty="0" smtClean="0"/>
-              <a:t>The Sigmoid Function</a:t>
+              <a:t>Dealing with Numbers</a:t>
             </a:r>
             <a:endParaRPr lang="en-US" dirty="0"/>
           </a:p>
@@ -7549,132 +7702,54 @@
       </p:sp>
       <p:sp>
         <p:nvSpPr>
-          <p:cNvPr id="4" name="Text Placeholder 3"/>
-          <p:cNvSpPr>
-            <a:spLocks noGrp="1"/>
-          </p:cNvSpPr>
-          <p:nvPr>
-            <p:ph type="body" idx="1"/>
-          </p:nvPr>
-        </p:nvSpPr>
-        <p:spPr>
-          <a:xfrm>
-            <a:off x="381000" y="5029200"/>
-            <a:ext cx="4040188" cy="715355"/>
-          </a:xfrm>
-        </p:spPr>
+          <p:cNvPr id="3" name="Content Placeholder 2"/>
+          <p:cNvSpPr>
+            <a:spLocks noGrp="1"/>
+          </p:cNvSpPr>
+          <p:nvPr>
+            <p:ph idx="1"/>
+          </p:nvPr>
+        </p:nvSpPr>
+        <p:spPr/>
         <p:txBody>
           <a:bodyPr/>
           <a:lstStyle/>
           <a:p>
-            <a:pPr algn="ctr"/>
             <a:r>
               <a:rPr lang="en-US" dirty="0" smtClean="0"/>
-              <a:t>Continuous</a:t>
+              <a:t>FPGA has no floating point support</a:t>
+            </a:r>
+          </a:p>
+          <a:p>
+            <a:endParaRPr lang="en-US" dirty="0" smtClean="0"/>
+          </a:p>
+          <a:p>
+            <a:r>
+              <a:rPr lang="en-US" dirty="0" smtClean="0"/>
+              <a:t>Use fixed point signed &amp; unsigned numbers, converting where necessary</a:t>
+            </a:r>
+          </a:p>
+          <a:p>
+            <a:endParaRPr lang="en-US" dirty="0" smtClean="0"/>
+          </a:p>
+          <a:p>
+            <a:r>
+              <a:rPr lang="en-US" dirty="0" smtClean="0"/>
+              <a:t>Sigmoid requires a lot of dynamic range</a:t>
+            </a:r>
+          </a:p>
+          <a:p>
+            <a:endParaRPr lang="en-US" dirty="0" smtClean="0"/>
+          </a:p>
+          <a:p>
+            <a:r>
+              <a:rPr lang="en-US" dirty="0" smtClean="0"/>
+              <a:t>Taylor series is best, we settled for a piecewise linear approximation</a:t>
             </a:r>
             <a:endParaRPr lang="en-US" dirty="0"/>
           </a:p>
         </p:txBody>
       </p:sp>
-      <p:sp>
-        <p:nvSpPr>
-          <p:cNvPr id="6" name="Text Placeholder 5"/>
-          <p:cNvSpPr>
-            <a:spLocks noGrp="1"/>
-          </p:cNvSpPr>
-          <p:nvPr>
-            <p:ph type="body" sz="quarter" idx="3"/>
-          </p:nvPr>
-        </p:nvSpPr>
-        <p:spPr>
-          <a:xfrm>
-            <a:off x="4568825" y="5029200"/>
-            <a:ext cx="4041775" cy="715355"/>
-          </a:xfrm>
-        </p:spPr>
-        <p:txBody>
-          <a:bodyPr/>
-          <a:lstStyle/>
-          <a:p>
-            <a:pPr algn="ctr"/>
-            <a:r>
-              <a:rPr lang="en-US" dirty="0" smtClean="0"/>
-              <a:t>Piecewise</a:t>
-            </a:r>
-            <a:endParaRPr lang="en-US" dirty="0"/>
-          </a:p>
-        </p:txBody>
-      </p:sp>
-      <p:pic>
-        <p:nvPicPr>
-          <p:cNvPr id="1028" name="Picture 4"/>
-          <p:cNvPicPr>
-            <a:picLocks noGrp="1" noChangeAspect="1" noChangeArrowheads="1"/>
-          </p:cNvPicPr>
-          <p:nvPr>
-            <p:ph sz="quarter" idx="4"/>
-          </p:nvPr>
-        </p:nvPicPr>
-        <p:blipFill>
-          <a:blip r:embed="rId2"/>
-          <a:srcRect/>
-          <a:stretch>
-            <a:fillRect/>
-          </a:stretch>
-        </p:blipFill>
-        <p:spPr bwMode="auto">
-          <a:xfrm>
-            <a:off x="4572000" y="2286000"/>
-            <a:ext cx="4128916" cy="2793900"/>
-          </a:xfrm>
-          <a:prstGeom prst="rect">
-            <a:avLst/>
-          </a:prstGeom>
-          <a:noFill/>
-          <a:ln w="9525">
-            <a:noFill/>
-            <a:miter lim="800000"/>
-            <a:headEnd/>
-            <a:tailEnd/>
-          </a:ln>
-          <a:effectLst/>
-        </p:spPr>
-      </p:pic>
-      <p:pic>
-        <p:nvPicPr>
-          <p:cNvPr id="1029" name="Picture 5"/>
-          <p:cNvPicPr>
-            <a:picLocks noGrp="1" noChangeAspect="1" noChangeArrowheads="1"/>
-          </p:cNvPicPr>
-          <p:nvPr>
-            <p:ph sz="half" idx="2"/>
-          </p:nvPr>
-        </p:nvPicPr>
-        <p:blipFill>
-          <a:blip r:embed="rId3"/>
-          <a:srcRect/>
-          <a:stretch>
-            <a:fillRect/>
-          </a:stretch>
-        </p:blipFill>
-        <p:spPr bwMode="auto">
-          <a:xfrm>
-            <a:off x="304800" y="2286000"/>
-            <a:ext cx="4096219" cy="2819400"/>
-          </a:xfrm>
-          <a:prstGeom prst="rect">
-            <a:avLst/>
-          </a:prstGeom>
-          <a:noFill/>
-          <a:ln w="9525">
-            <a:noFill/>
-            <a:miter lim="800000"/>
-            <a:headEnd/>
-            <a:tailEnd/>
-          </a:ln>
-          <a:effectLst/>
-        </p:spPr>
-      </p:pic>
     </p:spTree>
   </p:cSld>
   <p:clrMapOvr>

</xml_diff>

<commit_message>
going to lunch, no more work ON THIS!!!
</commit_message>
<xml_diff>
--- a/Docs/FPGA Neural Network.pptx
+++ b/Docs/FPGA Neural Network.pptx
@@ -17,9 +17,9 @@
     <p:sldId id="263" r:id="rId11"/>
     <p:sldId id="264" r:id="rId12"/>
     <p:sldId id="265" r:id="rId13"/>
-    <p:sldId id="266" r:id="rId14"/>
-    <p:sldId id="267" r:id="rId15"/>
-    <p:sldId id="268" r:id="rId16"/>
+    <p:sldId id="267" r:id="rId14"/>
+    <p:sldId id="268" r:id="rId15"/>
+    <p:sldId id="275" r:id="rId16"/>
     <p:sldId id="271" r:id="rId17"/>
     <p:sldId id="272" r:id="rId18"/>
     <p:sldId id="273" r:id="rId19"/>
@@ -3822,6 +3822,13 @@
   <p:clrMapOvr>
     <a:masterClrMapping/>
   </p:clrMapOvr>
+  <p:timing>
+    <p:tnLst>
+      <p:par>
+        <p:cTn id="1" dur="indefinite" restart="never" nodeType="tmRoot"/>
+      </p:par>
+    </p:tnLst>
+  </p:timing>
 </p:sld>
 </file>
 
@@ -3998,6 +4005,13 @@
   <p:clrMapOvr>
     <a:masterClrMapping/>
   </p:clrMapOvr>
+  <p:timing>
+    <p:tnLst>
+      <p:par>
+        <p:cTn id="1" dur="indefinite" restart="never" nodeType="tmRoot"/>
+      </p:par>
+    </p:tnLst>
+  </p:timing>
 </p:sld>
 </file>
 
@@ -4018,6 +4032,32 @@
           <a:chExt cx="0" cy="0"/>
         </a:xfrm>
       </p:grpSpPr>
+      <p:pic>
+        <p:nvPicPr>
+          <p:cNvPr id="5122" name="Picture 2" descr="C:\Documents and Settings\sxs5464\Desktop\DSD\Diagrams\Hardware.jpg"/>
+          <p:cNvPicPr>
+            <a:picLocks noChangeAspect="1" noChangeArrowheads="1"/>
+          </p:cNvPicPr>
+          <p:nvPr/>
+        </p:nvPicPr>
+        <p:blipFill>
+          <a:blip r:embed="rId2" cstate="print"/>
+          <a:srcRect/>
+          <a:stretch>
+            <a:fillRect/>
+          </a:stretch>
+        </p:blipFill>
+        <p:spPr bwMode="auto">
+          <a:xfrm>
+            <a:off x="2895600" y="2057400"/>
+            <a:ext cx="5915025" cy="4152900"/>
+          </a:xfrm>
+          <a:prstGeom prst="rect">
+            <a:avLst/>
+          </a:prstGeom>
+          <a:noFill/>
+        </p:spPr>
+      </p:pic>
       <p:sp>
         <p:nvSpPr>
           <p:cNvPr id="7" name="Title 6"/>
@@ -4056,6 +4096,49 @@
           <a:bodyPr/>
           <a:lstStyle/>
           <a:p>
+            <a:r>
+              <a:rPr lang="en-US" dirty="0" smtClean="0"/>
+              <a:t>Inputs</a:t>
+            </a:r>
+          </a:p>
+          <a:p>
+            <a:pPr lvl="1"/>
+            <a:r>
+              <a:rPr lang="en-US" dirty="0" smtClean="0"/>
+              <a:t>Output type</a:t>
+            </a:r>
+            <a:endParaRPr lang="en-US" dirty="0" smtClean="0"/>
+          </a:p>
+          <a:p>
+            <a:pPr lvl="1"/>
+            <a:r>
+              <a:rPr lang="en-US" dirty="0" smtClean="0"/>
+              <a:t>Function</a:t>
+            </a:r>
+            <a:endParaRPr lang="en-US" dirty="0" smtClean="0"/>
+          </a:p>
+          <a:p>
+            <a:pPr lvl="1"/>
+            <a:r>
+              <a:rPr lang="en-US" dirty="0" smtClean="0"/>
+              <a:t>Input values</a:t>
+            </a:r>
+          </a:p>
+          <a:p>
+            <a:endParaRPr lang="en-US" dirty="0" smtClean="0"/>
+          </a:p>
+          <a:p>
+            <a:r>
+              <a:rPr lang="en-US" dirty="0" smtClean="0"/>
+              <a:t>Output</a:t>
+            </a:r>
+          </a:p>
+          <a:p>
+            <a:pPr lvl="1"/>
+            <a:r>
+              <a:rPr lang="en-US" dirty="0" smtClean="0"/>
+              <a:t>8 LEDs</a:t>
+            </a:r>
             <a:endParaRPr lang="en-US" dirty="0"/>
           </a:p>
         </p:txBody>
@@ -4065,6 +4148,13 @@
   <p:clrMapOvr>
     <a:masterClrMapping/>
   </p:clrMapOvr>
+  <p:timing>
+    <p:tnLst>
+      <p:par>
+        <p:cTn id="1" dur="indefinite" restart="never" nodeType="tmRoot"/>
+      </p:par>
+    </p:tnLst>
+  </p:timing>
 </p:sld>
 </file>
 
@@ -4132,77 +4222,17 @@
   <p:clrMapOvr>
     <a:masterClrMapping/>
   </p:clrMapOvr>
+  <p:timing>
+    <p:tnLst>
+      <p:par>
+        <p:cTn id="1" dur="indefinite" restart="never" nodeType="tmRoot"/>
+      </p:par>
+    </p:tnLst>
+  </p:timing>
 </p:sld>
 </file>
 
 <file path=ppt/slides/slide13.xml><?xml version="1.0" encoding="utf-8"?>
-<p:sld xmlns:a="http://schemas.openxmlformats.org/drawingml/2006/main" xmlns:r="http://schemas.openxmlformats.org/officeDocument/2006/relationships" xmlns:p="http://schemas.openxmlformats.org/presentationml/2006/main">
-  <p:cSld>
-    <p:spTree>
-      <p:nvGrpSpPr>
-        <p:cNvPr id="1" name=""/>
-        <p:cNvGrpSpPr/>
-        <p:nvPr/>
-      </p:nvGrpSpPr>
-      <p:grpSpPr>
-        <a:xfrm>
-          <a:off x="0" y="0"/>
-          <a:ext cx="0" cy="0"/>
-          <a:chOff x="0" y="0"/>
-          <a:chExt cx="0" cy="0"/>
-        </a:xfrm>
-      </p:grpSpPr>
-      <p:sp>
-        <p:nvSpPr>
-          <p:cNvPr id="2" name="Title 1"/>
-          <p:cNvSpPr>
-            <a:spLocks noGrp="1"/>
-          </p:cNvSpPr>
-          <p:nvPr>
-            <p:ph type="title"/>
-          </p:nvPr>
-        </p:nvSpPr>
-        <p:spPr/>
-        <p:txBody>
-          <a:bodyPr/>
-          <a:lstStyle/>
-          <a:p>
-            <a:r>
-              <a:rPr lang="en-US" dirty="0" smtClean="0"/>
-              <a:t>Results</a:t>
-            </a:r>
-            <a:endParaRPr lang="en-US" dirty="0"/>
-          </a:p>
-        </p:txBody>
-      </p:sp>
-      <p:sp>
-        <p:nvSpPr>
-          <p:cNvPr id="3" name="Content Placeholder 2"/>
-          <p:cNvSpPr>
-            <a:spLocks noGrp="1"/>
-          </p:cNvSpPr>
-          <p:nvPr>
-            <p:ph idx="1"/>
-          </p:nvPr>
-        </p:nvSpPr>
-        <p:spPr/>
-        <p:txBody>
-          <a:bodyPr/>
-          <a:lstStyle/>
-          <a:p>
-            <a:endParaRPr lang="en-US"/>
-          </a:p>
-        </p:txBody>
-      </p:sp>
-    </p:spTree>
-  </p:cSld>
-  <p:clrMapOvr>
-    <a:masterClrMapping/>
-  </p:clrMapOvr>
-</p:sld>
-</file>
-
-<file path=ppt/slides/slide14.xml><?xml version="1.0" encoding="utf-8"?>
 <p:sld xmlns:a="http://schemas.openxmlformats.org/drawingml/2006/main" xmlns:r="http://schemas.openxmlformats.org/officeDocument/2006/relationships" xmlns:p="http://schemas.openxmlformats.org/presentationml/2006/main">
   <p:cSld>
     <p:spTree>
@@ -6713,6 +6743,97 @@
 </p:sld>
 </file>
 
+<file path=ppt/slides/slide14.xml><?xml version="1.0" encoding="utf-8"?>
+<p:sld xmlns:a="http://schemas.openxmlformats.org/drawingml/2006/main" xmlns:r="http://schemas.openxmlformats.org/officeDocument/2006/relationships" xmlns:p="http://schemas.openxmlformats.org/presentationml/2006/main">
+  <p:cSld>
+    <p:spTree>
+      <p:nvGrpSpPr>
+        <p:cNvPr id="1" name=""/>
+        <p:cNvGrpSpPr/>
+        <p:nvPr/>
+      </p:nvGrpSpPr>
+      <p:grpSpPr>
+        <a:xfrm>
+          <a:off x="0" y="0"/>
+          <a:ext cx="0" cy="0"/>
+          <a:chOff x="0" y="0"/>
+          <a:chExt cx="0" cy="0"/>
+        </a:xfrm>
+      </p:grpSpPr>
+      <p:sp>
+        <p:nvSpPr>
+          <p:cNvPr id="2" name="Title 1"/>
+          <p:cNvSpPr>
+            <a:spLocks noGrp="1"/>
+          </p:cNvSpPr>
+          <p:nvPr>
+            <p:ph type="title"/>
+          </p:nvPr>
+        </p:nvSpPr>
+        <p:spPr/>
+        <p:txBody>
+          <a:bodyPr/>
+          <a:lstStyle/>
+          <a:p>
+            <a:r>
+              <a:rPr lang="en-US" dirty="0" smtClean="0"/>
+              <a:t>Conclusion</a:t>
+            </a:r>
+            <a:endParaRPr lang="en-US" dirty="0"/>
+          </a:p>
+        </p:txBody>
+      </p:sp>
+      <p:sp>
+        <p:nvSpPr>
+          <p:cNvPr id="3" name="Content Placeholder 2"/>
+          <p:cNvSpPr>
+            <a:spLocks noGrp="1"/>
+          </p:cNvSpPr>
+          <p:nvPr>
+            <p:ph idx="1"/>
+          </p:nvPr>
+        </p:nvSpPr>
+        <p:spPr/>
+        <p:txBody>
+          <a:bodyPr>
+            <a:normAutofit fontScale="92500" lnSpcReduction="20000"/>
+          </a:bodyPr>
+          <a:lstStyle/>
+          <a:p>
+            <a:r>
+              <a:rPr lang="en-US" dirty="0" smtClean="0"/>
+              <a:t>Demonstrated the feasibility of applying a theoretical understanding of neural networks to the design of a parallel asynchronous digital system</a:t>
+            </a:r>
+          </a:p>
+          <a:p>
+            <a:endParaRPr lang="en-US" dirty="0" smtClean="0"/>
+          </a:p>
+          <a:p>
+            <a:r>
+              <a:rPr lang="en-US" dirty="0" smtClean="0"/>
+              <a:t>The prototype was limited by the computational resources available, but could be expanded with little effort</a:t>
+            </a:r>
+          </a:p>
+          <a:p>
+            <a:endParaRPr lang="en-US" dirty="0" smtClean="0"/>
+          </a:p>
+          <a:p>
+            <a:r>
+              <a:rPr lang="en-US" dirty="0" smtClean="0"/>
+              <a:t>Biologically-inspired algorithms can be useful to solve difficult problems, and hardware can implement them effectively</a:t>
+            </a:r>
+            <a:endParaRPr lang="en-US" dirty="0"/>
+          </a:p>
+        </p:txBody>
+      </p:sp>
+    </p:spTree>
+  </p:cSld>
+  <p:clrMapOvr>
+    <a:masterClrMapping/>
+  </p:clrMapOvr>
+</p:sld>
+</file>
+
 <file path=ppt/slides/slide15.xml><?xml version="1.0" encoding="utf-8"?>
 <p:sld xmlns:a="http://schemas.openxmlformats.org/drawingml/2006/main" xmlns:r="http://schemas.openxmlformats.org/officeDocument/2006/relationships" xmlns:p="http://schemas.openxmlformats.org/presentationml/2006/main">
   <p:cSld>
@@ -6732,67 +6853,44 @@
       </p:grpSpPr>
       <p:sp>
         <p:nvSpPr>
-          <p:cNvPr id="2" name="Title 1"/>
-          <p:cNvSpPr>
-            <a:spLocks noGrp="1"/>
-          </p:cNvSpPr>
-          <p:nvPr>
-            <p:ph type="title"/>
-          </p:nvPr>
-        </p:nvSpPr>
-        <p:spPr/>
-        <p:txBody>
-          <a:bodyPr/>
-          <a:lstStyle/>
-          <a:p>
-            <a:r>
-              <a:rPr lang="en-US" dirty="0" smtClean="0"/>
-              <a:t>Conclusion</a:t>
-            </a:r>
-            <a:endParaRPr lang="en-US" dirty="0"/>
-          </a:p>
-        </p:txBody>
-      </p:sp>
-      <p:sp>
-        <p:nvSpPr>
-          <p:cNvPr id="3" name="Content Placeholder 2"/>
-          <p:cNvSpPr>
-            <a:spLocks noGrp="1"/>
-          </p:cNvSpPr>
-          <p:nvPr>
-            <p:ph idx="1"/>
-          </p:nvPr>
-        </p:nvSpPr>
-        <p:spPr/>
-        <p:txBody>
-          <a:bodyPr>
-            <a:normAutofit fontScale="92500" lnSpcReduction="20000"/>
-          </a:bodyPr>
-          <a:lstStyle/>
-          <a:p>
-            <a:r>
-              <a:rPr lang="en-US" dirty="0" smtClean="0"/>
-              <a:t>Demonstrated the feasibility of applying a theoretical understanding of neural networks to the design of a parallel asynchronous digital system</a:t>
-            </a:r>
-          </a:p>
-          <a:p>
-            <a:endParaRPr lang="en-US" dirty="0" smtClean="0"/>
-          </a:p>
-          <a:p>
-            <a:r>
-              <a:rPr lang="en-US" dirty="0" smtClean="0"/>
-              <a:t>The prototype was limited by the computational resources available, but could be expanded with little effort</a:t>
-            </a:r>
-          </a:p>
-          <a:p>
-            <a:endParaRPr lang="en-US" dirty="0" smtClean="0"/>
-          </a:p>
-          <a:p>
-            <a:r>
-              <a:rPr lang="en-US" dirty="0" smtClean="0"/>
-              <a:t>Biologically-inspired algorithms can be useful to solve difficult problems, and hardware can implement them effectively</a:t>
-            </a:r>
-            <a:endParaRPr lang="en-US" dirty="0"/>
+          <p:cNvPr id="6" name="Rectangle 5"/>
+          <p:cNvSpPr/>
+          <p:nvPr/>
+        </p:nvSpPr>
+        <p:spPr>
+          <a:xfrm>
+            <a:off x="0" y="0"/>
+            <a:ext cx="9144000" cy="6858000"/>
+          </a:xfrm>
+          <a:prstGeom prst="rect">
+            <a:avLst/>
+          </a:prstGeom>
+          <a:solidFill>
+            <a:schemeClr val="tx1"/>
+          </a:solidFill>
+        </p:spPr>
+        <p:style>
+          <a:lnRef idx="2">
+            <a:schemeClr val="accent1">
+              <a:shade val="50000"/>
+            </a:schemeClr>
+          </a:lnRef>
+          <a:fillRef idx="1">
+            <a:schemeClr val="accent1"/>
+          </a:fillRef>
+          <a:effectRef idx="0">
+            <a:schemeClr val="accent1"/>
+          </a:effectRef>
+          <a:fontRef idx="minor">
+            <a:schemeClr val="lt1"/>
+          </a:fontRef>
+        </p:style>
+        <p:txBody>
+          <a:bodyPr rtlCol="0" anchor="ctr"/>
+          <a:lstStyle/>
+          <a:p>
+            <a:pPr algn="ctr"/>
+            <a:endParaRPr lang="en-US"/>
           </a:p>
         </p:txBody>
       </p:sp>
@@ -6949,6 +7047,13 @@
   <p:clrMapOvr>
     <a:masterClrMapping/>
   </p:clrMapOvr>
+  <p:timing>
+    <p:tnLst>
+      <p:par>
+        <p:cTn id="1" dur="indefinite" restart="never" nodeType="tmRoot"/>
+      </p:par>
+    </p:tnLst>
+  </p:timing>
 </p:sld>
 </file>
 
@@ -7049,6 +7154,13 @@
   <p:clrMapOvr>
     <a:masterClrMapping/>
   </p:clrMapOvr>
+  <p:timing>
+    <p:tnLst>
+      <p:par>
+        <p:cTn id="1" dur="indefinite" restart="never" nodeType="tmRoot"/>
+      </p:par>
+    </p:tnLst>
+  </p:timing>
 </p:sld>
 </file>
 
@@ -7229,6 +7341,13 @@
   <p:clrMapOvr>
     <a:masterClrMapping/>
   </p:clrMapOvr>
+  <p:timing>
+    <p:tnLst>
+      <p:par>
+        <p:cTn id="1" dur="indefinite" restart="never" nodeType="tmRoot"/>
+      </p:par>
+    </p:tnLst>
+  </p:timing>
 </p:sld>
 </file>
 
@@ -7363,6 +7482,13 @@
   <p:clrMapOvr>
     <a:masterClrMapping/>
   </p:clrMapOvr>
+  <p:timing>
+    <p:tnLst>
+      <p:par>
+        <p:cTn id="1" dur="indefinite" restart="never" nodeType="tmRoot"/>
+      </p:par>
+    </p:tnLst>
+  </p:timing>
 </p:sld>
 </file>
 
@@ -7514,6 +7640,13 @@
   <p:clrMapOvr>
     <a:masterClrMapping/>
   </p:clrMapOvr>
+  <p:timing>
+    <p:tnLst>
+      <p:par>
+        <p:cTn id="1" dur="indefinite" restart="never" nodeType="tmRoot"/>
+      </p:par>
+    </p:tnLst>
+  </p:timing>
 </p:sld>
 </file>
 
@@ -7668,6 +7801,13 @@
   <p:clrMapOvr>
     <a:masterClrMapping/>
   </p:clrMapOvr>
+  <p:timing>
+    <p:tnLst>
+      <p:par>
+        <p:cTn id="1" dur="indefinite" restart="never" nodeType="tmRoot"/>
+      </p:par>
+    </p:tnLst>
+  </p:timing>
 </p:sld>
 </file>
 
@@ -7809,6 +7949,13 @@
   <p:clrMapOvr>
     <a:masterClrMapping/>
   </p:clrMapOvr>
+  <p:timing>
+    <p:tnLst>
+      <p:par>
+        <p:cTn id="1" dur="indefinite" restart="never" nodeType="tmRoot"/>
+      </p:par>
+    </p:tnLst>
+  </p:timing>
 </p:sld>
 </file>
 
@@ -7900,6 +8047,13 @@
   <p:clrMapOvr>
     <a:masterClrMapping/>
   </p:clrMapOvr>
+  <p:timing>
+    <p:tnLst>
+      <p:par>
+        <p:cTn id="1" dur="indefinite" restart="never" nodeType="tmRoot"/>
+      </p:par>
+    </p:tnLst>
+  </p:timing>
 </p:sld>
 </file>
 
@@ -8005,6 +8159,13 @@
   <p:clrMapOvr>
     <a:masterClrMapping/>
   </p:clrMapOvr>
+  <p:timing>
+    <p:tnLst>
+      <p:par>
+        <p:cTn id="1" dur="indefinite" restart="never" nodeType="tmRoot"/>
+      </p:par>
+    </p:tnLst>
+  </p:timing>
 </p:sld>
 </file>
 
@@ -8103,6 +8264,13 @@
   <p:clrMapOvr>
     <a:masterClrMapping/>
   </p:clrMapOvr>
+  <p:timing>
+    <p:tnLst>
+      <p:par>
+        <p:cTn id="1" dur="indefinite" restart="never" nodeType="tmRoot"/>
+      </p:par>
+    </p:tnLst>
+  </p:timing>
 </p:sld>
 </file>
 

</xml_diff>

<commit_message>
moved demo to end
</commit_message>
<xml_diff>
--- a/Docs/FPGA Neural Network.pptx
+++ b/Docs/FPGA Neural Network.pptx
@@ -1,6 +1,6 @@
 
 <file path=ppt/presentation.xml><?xml version="1.0" encoding="utf-8"?>
-<p:presentation xmlns:a="http://schemas.openxmlformats.org/drawingml/2006/main" xmlns:r="http://schemas.openxmlformats.org/officeDocument/2006/relationships" xmlns:p="http://schemas.openxmlformats.org/presentationml/2006/main" saveSubsetFonts="1">
+<p:presentation xmlns:a="http://schemas.openxmlformats.org/drawingml/2006/main" xmlns:r="http://schemas.openxmlformats.org/officeDocument/2006/relationships" xmlns:mc="http://schemas.openxmlformats.org/markup-compatibility/2006" xmlns:mv="urn:schemas-microsoft-com:mac:vml" xmlns:p="http://schemas.openxmlformats.org/presentationml/2006/main" mc:Ignorable="mv" mc:PreserveAttributes="mv:*" saveSubsetFonts="1">
   <p:sldMasterIdLst>
     <p:sldMasterId id="2147483744" r:id="rId1"/>
   </p:sldMasterIdLst>
@@ -16,9 +16,9 @@
     <p:sldId id="262" r:id="rId10"/>
     <p:sldId id="263" r:id="rId11"/>
     <p:sldId id="264" r:id="rId12"/>
-    <p:sldId id="265" r:id="rId13"/>
-    <p:sldId id="267" r:id="rId14"/>
-    <p:sldId id="268" r:id="rId15"/>
+    <p:sldId id="267" r:id="rId13"/>
+    <p:sldId id="268" r:id="rId14"/>
+    <p:sldId id="265" r:id="rId15"/>
     <p:sldId id="275" r:id="rId16"/>
     <p:sldId id="271" r:id="rId17"/>
     <p:sldId id="272" r:id="rId18"/>
@@ -126,7 +126,7 @@
 </file>
 
 <file path=ppt/slideLayouts/slideLayout1.xml><?xml version="1.0" encoding="utf-8"?>
-<p:sldLayout xmlns:a="http://schemas.openxmlformats.org/drawingml/2006/main" xmlns:r="http://schemas.openxmlformats.org/officeDocument/2006/relationships" xmlns:p="http://schemas.openxmlformats.org/presentationml/2006/main" showMasterSp="0" type="title" preserve="1">
+<p:sldLayout xmlns:a="http://schemas.openxmlformats.org/drawingml/2006/main" xmlns:r="http://schemas.openxmlformats.org/officeDocument/2006/relationships" xmlns:mc="http://schemas.openxmlformats.org/markup-compatibility/2006" xmlns:mv="urn:schemas-microsoft-com:mac:vml" xmlns:p="http://schemas.openxmlformats.org/presentationml/2006/main" mc:Ignorable="mv" mc:PreserveAttributes="mv:*" showMasterSp="0" type="title" preserve="1">
   <p:cSld name="Title Slide">
     <p:bg>
       <p:bgRef idx="1002">
@@ -370,7 +370,7 @@
             <a:fld id="{A5B00B91-90A6-4B00-B790-8A3A89AE3D40}" type="datetimeFigureOut">
               <a:rPr lang="en-US" smtClean="0"/>
               <a:pPr/>
-              <a:t>11/12/2009</a:t>
+              <a:t>11/12/09</a:t>
             </a:fld>
             <a:endParaRPr lang="en-US" dirty="0"/>
           </a:p>
@@ -480,7 +480,7 @@
 </file>
 
 <file path=ppt/slideLayouts/slideLayout10.xml><?xml version="1.0" encoding="utf-8"?>
-<p:sldLayout xmlns:a="http://schemas.openxmlformats.org/drawingml/2006/main" xmlns:r="http://schemas.openxmlformats.org/officeDocument/2006/relationships" xmlns:p="http://schemas.openxmlformats.org/presentationml/2006/main" type="vertTx" preserve="1">
+<p:sldLayout xmlns:a="http://schemas.openxmlformats.org/drawingml/2006/main" xmlns:r="http://schemas.openxmlformats.org/officeDocument/2006/relationships" xmlns:mc="http://schemas.openxmlformats.org/markup-compatibility/2006" xmlns:mv="urn:schemas-microsoft-com:mac:vml" xmlns:p="http://schemas.openxmlformats.org/presentationml/2006/main" mc:Ignorable="mv" mc:PreserveAttributes="mv:*" type="vertTx" preserve="1">
   <p:cSld name="Title and Vertical Text">
     <p:spTree>
       <p:nvGrpSpPr>
@@ -589,7 +589,7 @@
             <a:fld id="{A5B00B91-90A6-4B00-B790-8A3A89AE3D40}" type="datetimeFigureOut">
               <a:rPr lang="en-US" smtClean="0"/>
               <a:pPr/>
-              <a:t>11/12/2009</a:t>
+              <a:t>11/12/09</a:t>
             </a:fld>
             <a:endParaRPr lang="en-US" dirty="0"/>
           </a:p>
@@ -647,7 +647,7 @@
 </file>
 
 <file path=ppt/slideLayouts/slideLayout11.xml><?xml version="1.0" encoding="utf-8"?>
-<p:sldLayout xmlns:a="http://schemas.openxmlformats.org/drawingml/2006/main" xmlns:r="http://schemas.openxmlformats.org/officeDocument/2006/relationships" xmlns:p="http://schemas.openxmlformats.org/presentationml/2006/main" showMasterSp="0" type="vertTitleAndTx" preserve="1">
+<p:sldLayout xmlns:a="http://schemas.openxmlformats.org/drawingml/2006/main" xmlns:r="http://schemas.openxmlformats.org/officeDocument/2006/relationships" xmlns:mc="http://schemas.openxmlformats.org/markup-compatibility/2006" xmlns:mv="urn:schemas-microsoft-com:mac:vml" xmlns:p="http://schemas.openxmlformats.org/presentationml/2006/main" mc:Ignorable="mv" mc:PreserveAttributes="mv:*" showMasterSp="0" type="vertTitleAndTx" preserve="1">
   <p:cSld name="Vertical Title and Text">
     <p:spTree>
       <p:nvGrpSpPr>
@@ -863,7 +863,7 @@
             <a:fld id="{A5B00B91-90A6-4B00-B790-8A3A89AE3D40}" type="datetimeFigureOut">
               <a:rPr lang="en-US" smtClean="0"/>
               <a:pPr/>
-              <a:t>11/12/2009</a:t>
+              <a:t>11/12/09</a:t>
             </a:fld>
             <a:endParaRPr lang="en-US" dirty="0"/>
           </a:p>
@@ -926,7 +926,7 @@
 </file>
 
 <file path=ppt/slideLayouts/slideLayout2.xml><?xml version="1.0" encoding="utf-8"?>
-<p:sldLayout xmlns:a="http://schemas.openxmlformats.org/drawingml/2006/main" xmlns:r="http://schemas.openxmlformats.org/officeDocument/2006/relationships" xmlns:p="http://schemas.openxmlformats.org/presentationml/2006/main" type="obj" preserve="1">
+<p:sldLayout xmlns:a="http://schemas.openxmlformats.org/drawingml/2006/main" xmlns:r="http://schemas.openxmlformats.org/officeDocument/2006/relationships" xmlns:mc="http://schemas.openxmlformats.org/markup-compatibility/2006" xmlns:mv="urn:schemas-microsoft-com:mac:vml" xmlns:p="http://schemas.openxmlformats.org/presentationml/2006/main" mc:Ignorable="mv" mc:PreserveAttributes="mv:*" type="obj" preserve="1">
   <p:cSld name="Title and Content">
     <p:spTree>
       <p:nvGrpSpPr>
@@ -1040,7 +1040,7 @@
             <a:fld id="{A5B00B91-90A6-4B00-B790-8A3A89AE3D40}" type="datetimeFigureOut">
               <a:rPr lang="en-US" smtClean="0"/>
               <a:pPr/>
-              <a:t>11/12/2009</a:t>
+              <a:t>11/12/09</a:t>
             </a:fld>
             <a:endParaRPr lang="en-US" dirty="0"/>
           </a:p>
@@ -1098,7 +1098,7 @@
 </file>
 
 <file path=ppt/slideLayouts/slideLayout3.xml><?xml version="1.0" encoding="utf-8"?>
-<p:sldLayout xmlns:a="http://schemas.openxmlformats.org/drawingml/2006/main" xmlns:r="http://schemas.openxmlformats.org/officeDocument/2006/relationships" xmlns:p="http://schemas.openxmlformats.org/presentationml/2006/main" showMasterSp="0" type="secHead" preserve="1">
+<p:sldLayout xmlns:a="http://schemas.openxmlformats.org/drawingml/2006/main" xmlns:r="http://schemas.openxmlformats.org/officeDocument/2006/relationships" xmlns:mc="http://schemas.openxmlformats.org/markup-compatibility/2006" xmlns:mv="urn:schemas-microsoft-com:mac:vml" xmlns:p="http://schemas.openxmlformats.org/presentationml/2006/main" mc:Ignorable="mv" mc:PreserveAttributes="mv:*" showMasterSp="0" type="secHead" preserve="1">
   <p:cSld name="Section Header">
     <p:bg>
       <p:bgRef idx="1002">
@@ -1394,7 +1394,7 @@
             <a:fld id="{A5B00B91-90A6-4B00-B790-8A3A89AE3D40}" type="datetimeFigureOut">
               <a:rPr lang="en-US" smtClean="0"/>
               <a:pPr/>
-              <a:t>11/12/2009</a:t>
+              <a:t>11/12/09</a:t>
             </a:fld>
             <a:endParaRPr lang="en-US" dirty="0"/>
           </a:p>
@@ -1452,7 +1452,7 @@
 </file>
 
 <file path=ppt/slideLayouts/slideLayout4.xml><?xml version="1.0" encoding="utf-8"?>
-<p:sldLayout xmlns:a="http://schemas.openxmlformats.org/drawingml/2006/main" xmlns:r="http://schemas.openxmlformats.org/officeDocument/2006/relationships" xmlns:p="http://schemas.openxmlformats.org/presentationml/2006/main" type="twoObj" preserve="1">
+<p:sldLayout xmlns:a="http://schemas.openxmlformats.org/drawingml/2006/main" xmlns:r="http://schemas.openxmlformats.org/officeDocument/2006/relationships" xmlns:mc="http://schemas.openxmlformats.org/markup-compatibility/2006" xmlns:mv="urn:schemas-microsoft-com:mac:vml" xmlns:p="http://schemas.openxmlformats.org/presentationml/2006/main" mc:Ignorable="mv" mc:PreserveAttributes="mv:*" type="twoObj" preserve="1">
   <p:cSld name="Two Content">
     <p:spTree>
       <p:nvGrpSpPr>
@@ -1679,7 +1679,7 @@
             <a:fld id="{A5B00B91-90A6-4B00-B790-8A3A89AE3D40}" type="datetimeFigureOut">
               <a:rPr lang="en-US" smtClean="0"/>
               <a:pPr/>
-              <a:t>11/12/2009</a:t>
+              <a:t>11/12/09</a:t>
             </a:fld>
             <a:endParaRPr lang="en-US" dirty="0"/>
           </a:p>
@@ -1737,7 +1737,7 @@
 </file>
 
 <file path=ppt/slideLayouts/slideLayout5.xml><?xml version="1.0" encoding="utf-8"?>
-<p:sldLayout xmlns:a="http://schemas.openxmlformats.org/drawingml/2006/main" xmlns:r="http://schemas.openxmlformats.org/officeDocument/2006/relationships" xmlns:p="http://schemas.openxmlformats.org/presentationml/2006/main" type="twoTxTwoObj" preserve="1">
+<p:sldLayout xmlns:a="http://schemas.openxmlformats.org/drawingml/2006/main" xmlns:r="http://schemas.openxmlformats.org/officeDocument/2006/relationships" xmlns:mc="http://schemas.openxmlformats.org/markup-compatibility/2006" xmlns:mv="urn:schemas-microsoft-com:mac:vml" xmlns:p="http://schemas.openxmlformats.org/presentationml/2006/main" mc:Ignorable="mv" mc:PreserveAttributes="mv:*" type="twoTxTwoObj" preserve="1">
   <p:cSld name="Comparison">
     <p:spTree>
       <p:nvGrpSpPr>
@@ -2098,7 +2098,7 @@
             <a:fld id="{A5B00B91-90A6-4B00-B790-8A3A89AE3D40}" type="datetimeFigureOut">
               <a:rPr lang="en-US" smtClean="0"/>
               <a:pPr/>
-              <a:t>11/12/2009</a:t>
+              <a:t>11/12/09</a:t>
             </a:fld>
             <a:endParaRPr lang="en-US" dirty="0"/>
           </a:p>
@@ -2156,7 +2156,7 @@
 </file>
 
 <file path=ppt/slideLayouts/slideLayout6.xml><?xml version="1.0" encoding="utf-8"?>
-<p:sldLayout xmlns:a="http://schemas.openxmlformats.org/drawingml/2006/main" xmlns:r="http://schemas.openxmlformats.org/officeDocument/2006/relationships" xmlns:p="http://schemas.openxmlformats.org/presentationml/2006/main" type="titleOnly" preserve="1">
+<p:sldLayout xmlns:a="http://schemas.openxmlformats.org/drawingml/2006/main" xmlns:r="http://schemas.openxmlformats.org/officeDocument/2006/relationships" xmlns:mc="http://schemas.openxmlformats.org/markup-compatibility/2006" xmlns:mv="urn:schemas-microsoft-com:mac:vml" xmlns:p="http://schemas.openxmlformats.org/presentationml/2006/main" mc:Ignorable="mv" mc:PreserveAttributes="mv:*" type="titleOnly" preserve="1">
   <p:cSld name="Title Only">
     <p:spTree>
       <p:nvGrpSpPr>
@@ -2213,7 +2213,7 @@
             <a:fld id="{A5B00B91-90A6-4B00-B790-8A3A89AE3D40}" type="datetimeFigureOut">
               <a:rPr lang="en-US" smtClean="0"/>
               <a:pPr/>
-              <a:t>11/12/2009</a:t>
+              <a:t>11/12/09</a:t>
             </a:fld>
             <a:endParaRPr lang="en-US" dirty="0"/>
           </a:p>
@@ -2271,7 +2271,7 @@
 </file>
 
 <file path=ppt/slideLayouts/slideLayout7.xml><?xml version="1.0" encoding="utf-8"?>
-<p:sldLayout xmlns:a="http://schemas.openxmlformats.org/drawingml/2006/main" xmlns:r="http://schemas.openxmlformats.org/officeDocument/2006/relationships" xmlns:p="http://schemas.openxmlformats.org/presentationml/2006/main" showMasterSp="0" type="blank" preserve="1">
+<p:sldLayout xmlns:a="http://schemas.openxmlformats.org/drawingml/2006/main" xmlns:r="http://schemas.openxmlformats.org/officeDocument/2006/relationships" xmlns:mc="http://schemas.openxmlformats.org/markup-compatibility/2006" xmlns:mv="urn:schemas-microsoft-com:mac:vml" xmlns:p="http://schemas.openxmlformats.org/presentationml/2006/main" mc:Ignorable="mv" mc:PreserveAttributes="mv:*" showMasterSp="0" type="blank" preserve="1">
   <p:cSld name="Blank">
     <p:spTree>
       <p:nvGrpSpPr>
@@ -2305,7 +2305,7 @@
             <a:fld id="{A5B00B91-90A6-4B00-B790-8A3A89AE3D40}" type="datetimeFigureOut">
               <a:rPr lang="en-US" smtClean="0"/>
               <a:pPr/>
-              <a:t>11/12/2009</a:t>
+              <a:t>11/12/09</a:t>
             </a:fld>
             <a:endParaRPr lang="en-US" dirty="0"/>
           </a:p>
@@ -2363,7 +2363,7 @@
 </file>
 
 <file path=ppt/slideLayouts/slideLayout8.xml><?xml version="1.0" encoding="utf-8"?>
-<p:sldLayout xmlns:a="http://schemas.openxmlformats.org/drawingml/2006/main" xmlns:r="http://schemas.openxmlformats.org/officeDocument/2006/relationships" xmlns:p="http://schemas.openxmlformats.org/presentationml/2006/main" type="objTx" preserve="1">
+<p:sldLayout xmlns:a="http://schemas.openxmlformats.org/drawingml/2006/main" xmlns:r="http://schemas.openxmlformats.org/officeDocument/2006/relationships" xmlns:mc="http://schemas.openxmlformats.org/markup-compatibility/2006" xmlns:mv="urn:schemas-microsoft-com:mac:vml" xmlns:p="http://schemas.openxmlformats.org/presentationml/2006/main" mc:Ignorable="mv" mc:PreserveAttributes="mv:*" type="objTx" preserve="1">
   <p:cSld name="Content with Caption">
     <p:spTree>
       <p:nvGrpSpPr>
@@ -2582,7 +2582,7 @@
             <a:fld id="{A5B00B91-90A6-4B00-B790-8A3A89AE3D40}" type="datetimeFigureOut">
               <a:rPr lang="en-US" smtClean="0"/>
               <a:pPr/>
-              <a:t>11/12/2009</a:t>
+              <a:t>11/12/09</a:t>
             </a:fld>
             <a:endParaRPr lang="en-US" dirty="0"/>
           </a:p>
@@ -2730,7 +2730,7 @@
 </file>
 
 <file path=ppt/slideLayouts/slideLayout9.xml><?xml version="1.0" encoding="utf-8"?>
-<p:sldLayout xmlns:a="http://schemas.openxmlformats.org/drawingml/2006/main" xmlns:r="http://schemas.openxmlformats.org/officeDocument/2006/relationships" xmlns:p="http://schemas.openxmlformats.org/presentationml/2006/main" type="picTx" preserve="1">
+<p:sldLayout xmlns:a="http://schemas.openxmlformats.org/drawingml/2006/main" xmlns:r="http://schemas.openxmlformats.org/officeDocument/2006/relationships" xmlns:mc="http://schemas.openxmlformats.org/markup-compatibility/2006" xmlns:mv="urn:schemas-microsoft-com:mac:vml" xmlns:p="http://schemas.openxmlformats.org/presentationml/2006/main" mc:Ignorable="mv" mc:PreserveAttributes="mv:*" type="picTx" preserve="1">
   <p:cSld name="Picture with Caption">
     <p:bg>
       <p:bgRef idx="1001">
@@ -2943,7 +2943,7 @@
             <a:fld id="{A5B00B91-90A6-4B00-B790-8A3A89AE3D40}" type="datetimeFigureOut">
               <a:rPr lang="en-US" smtClean="0"/>
               <a:pPr/>
-              <a:t>11/12/2009</a:t>
+              <a:t>11/12/09</a:t>
             </a:fld>
             <a:endParaRPr lang="en-US" dirty="0"/>
           </a:p>
@@ -3111,7 +3111,7 @@
 </file>
 
 <file path=ppt/slideMasters/slideMaster1.xml><?xml version="1.0" encoding="utf-8"?>
-<p:sldMaster xmlns:a="http://schemas.openxmlformats.org/drawingml/2006/main" xmlns:r="http://schemas.openxmlformats.org/officeDocument/2006/relationships" xmlns:p="http://schemas.openxmlformats.org/presentationml/2006/main">
+<p:sldMaster xmlns:a="http://schemas.openxmlformats.org/drawingml/2006/main" xmlns:r="http://schemas.openxmlformats.org/officeDocument/2006/relationships" xmlns:mc="http://schemas.openxmlformats.org/markup-compatibility/2006" xmlns:mv="urn:schemas-microsoft-com:mac:vml" xmlns:p="http://schemas.openxmlformats.org/presentationml/2006/main" mc:Ignorable="mv" mc:PreserveAttributes="mv:*">
   <p:cSld>
     <p:bg>
       <p:bgRef idx="1001">
@@ -3369,7 +3369,7 @@
             <a:fld id="{A5B00B91-90A6-4B00-B790-8A3A89AE3D40}" type="datetimeFigureOut">
               <a:rPr lang="en-US" smtClean="0"/>
               <a:pPr/>
-              <a:t>11/12/2009</a:t>
+              <a:t>11/12/09</a:t>
             </a:fld>
             <a:endParaRPr lang="en-US" dirty="0"/>
           </a:p>
@@ -3755,7 +3755,7 @@
 </file>
 
 <file path=ppt/slides/slide1.xml><?xml version="1.0" encoding="utf-8"?>
-<p:sld xmlns:a="http://schemas.openxmlformats.org/drawingml/2006/main" xmlns:r="http://schemas.openxmlformats.org/officeDocument/2006/relationships" xmlns:p="http://schemas.openxmlformats.org/presentationml/2006/main">
+<p:sld xmlns:a="http://schemas.openxmlformats.org/drawingml/2006/main" xmlns:r="http://schemas.openxmlformats.org/officeDocument/2006/relationships" xmlns:mc="http://schemas.openxmlformats.org/markup-compatibility/2006" xmlns:mv="urn:schemas-microsoft-com:mac:vml" xmlns:p="http://schemas.openxmlformats.org/presentationml/2006/main" mc:Ignorable="mv" mc:PreserveAttributes="mv:*">
   <p:cSld>
     <p:spTree>
       <p:nvGrpSpPr>
@@ -3833,7 +3833,7 @@
 </file>
 
 <file path=ppt/slides/slide10.xml><?xml version="1.0" encoding="utf-8"?>
-<p:sld xmlns:a="http://schemas.openxmlformats.org/drawingml/2006/main" xmlns:r="http://schemas.openxmlformats.org/officeDocument/2006/relationships" xmlns:p="http://schemas.openxmlformats.org/presentationml/2006/main">
+<p:sld xmlns:a="http://schemas.openxmlformats.org/drawingml/2006/main" xmlns:r="http://schemas.openxmlformats.org/officeDocument/2006/relationships" xmlns:mc="http://schemas.openxmlformats.org/markup-compatibility/2006" xmlns:mv="urn:schemas-microsoft-com:mac:vml" xmlns:p="http://schemas.openxmlformats.org/presentationml/2006/main" mc:Ignorable="mv" mc:PreserveAttributes="mv:*">
   <p:cSld>
     <p:spTree>
       <p:nvGrpSpPr>
@@ -4016,7 +4016,7 @@
 </file>
 
 <file path=ppt/slides/slide11.xml><?xml version="1.0" encoding="utf-8"?>
-<p:sld xmlns:a="http://schemas.openxmlformats.org/drawingml/2006/main" xmlns:r="http://schemas.openxmlformats.org/officeDocument/2006/relationships" xmlns:p="http://schemas.openxmlformats.org/presentationml/2006/main">
+<p:sld xmlns:a="http://schemas.openxmlformats.org/drawingml/2006/main" xmlns:r="http://schemas.openxmlformats.org/officeDocument/2006/relationships" xmlns:mc="http://schemas.openxmlformats.org/markup-compatibility/2006" xmlns:mv="urn:schemas-microsoft-com:mac:vml" xmlns:p="http://schemas.openxmlformats.org/presentationml/2006/main" mc:Ignorable="mv" mc:PreserveAttributes="mv:*">
   <p:cSld>
     <p:spTree>
       <p:nvGrpSpPr>
@@ -4107,7 +4107,6 @@
               <a:rPr lang="en-US" dirty="0" smtClean="0"/>
               <a:t>Output type</a:t>
             </a:r>
-            <a:endParaRPr lang="en-US" dirty="0" smtClean="0"/>
           </a:p>
           <a:p>
             <a:pPr lvl="1"/>
@@ -4115,7 +4114,6 @@
               <a:rPr lang="en-US" dirty="0" smtClean="0"/>
               <a:t>Function</a:t>
             </a:r>
-            <a:endParaRPr lang="en-US" dirty="0" smtClean="0"/>
           </a:p>
           <a:p>
             <a:pPr lvl="1"/>
@@ -4159,81 +4157,7 @@
 </file>
 
 <file path=ppt/slides/slide12.xml><?xml version="1.0" encoding="utf-8"?>
-<p:sld xmlns:a="http://schemas.openxmlformats.org/drawingml/2006/main" xmlns:r="http://schemas.openxmlformats.org/officeDocument/2006/relationships" xmlns:p="http://schemas.openxmlformats.org/presentationml/2006/main">
-  <p:cSld>
-    <p:spTree>
-      <p:nvGrpSpPr>
-        <p:cNvPr id="1" name=""/>
-        <p:cNvGrpSpPr/>
-        <p:nvPr/>
-      </p:nvGrpSpPr>
-      <p:grpSpPr>
-        <a:xfrm>
-          <a:off x="0" y="0"/>
-          <a:ext cx="0" cy="0"/>
-          <a:chOff x="0" y="0"/>
-          <a:chExt cx="0" cy="0"/>
-        </a:xfrm>
-      </p:grpSpPr>
-      <p:sp>
-        <p:nvSpPr>
-          <p:cNvPr id="11" name="Title 10"/>
-          <p:cNvSpPr>
-            <a:spLocks noGrp="1"/>
-          </p:cNvSpPr>
-          <p:nvPr>
-            <p:ph type="ctrTitle"/>
-          </p:nvPr>
-        </p:nvSpPr>
-        <p:spPr/>
-        <p:txBody>
-          <a:bodyPr/>
-          <a:lstStyle/>
-          <a:p>
-            <a:r>
-              <a:rPr lang="en-US" dirty="0" smtClean="0"/>
-              <a:t>Live Demo</a:t>
-            </a:r>
-            <a:endParaRPr lang="en-US" dirty="0"/>
-          </a:p>
-        </p:txBody>
-      </p:sp>
-      <p:sp>
-        <p:nvSpPr>
-          <p:cNvPr id="12" name="Subtitle 11"/>
-          <p:cNvSpPr>
-            <a:spLocks noGrp="1"/>
-          </p:cNvSpPr>
-          <p:nvPr>
-            <p:ph type="subTitle" idx="1"/>
-          </p:nvPr>
-        </p:nvSpPr>
-        <p:spPr/>
-        <p:txBody>
-          <a:bodyPr/>
-          <a:lstStyle/>
-          <a:p>
-            <a:endParaRPr lang="en-US" dirty="0"/>
-          </a:p>
-        </p:txBody>
-      </p:sp>
-    </p:spTree>
-  </p:cSld>
-  <p:clrMapOvr>
-    <a:masterClrMapping/>
-  </p:clrMapOvr>
-  <p:timing>
-    <p:tnLst>
-      <p:par>
-        <p:cTn id="1" dur="indefinite" restart="never" nodeType="tmRoot"/>
-      </p:par>
-    </p:tnLst>
-  </p:timing>
-</p:sld>
-</file>
-
-<file path=ppt/slides/slide13.xml><?xml version="1.0" encoding="utf-8"?>
-<p:sld xmlns:a="http://schemas.openxmlformats.org/drawingml/2006/main" xmlns:r="http://schemas.openxmlformats.org/officeDocument/2006/relationships" xmlns:p="http://schemas.openxmlformats.org/presentationml/2006/main">
+<p:sld xmlns:a="http://schemas.openxmlformats.org/drawingml/2006/main" xmlns:r="http://schemas.openxmlformats.org/officeDocument/2006/relationships" xmlns:mc="http://schemas.openxmlformats.org/markup-compatibility/2006" xmlns:mv="urn:schemas-microsoft-com:mac:vml" xmlns:p="http://schemas.openxmlformats.org/presentationml/2006/main" mc:Ignorable="mv" mc:PreserveAttributes="mv:*">
   <p:cSld>
     <p:spTree>
       <p:nvGrpSpPr>
@@ -6743,8 +6667,8 @@
 </p:sld>
 </file>
 
-<file path=ppt/slides/slide14.xml><?xml version="1.0" encoding="utf-8"?>
-<p:sld xmlns:a="http://schemas.openxmlformats.org/drawingml/2006/main" xmlns:r="http://schemas.openxmlformats.org/officeDocument/2006/relationships" xmlns:p="http://schemas.openxmlformats.org/presentationml/2006/main">
+<file path=ppt/slides/slide13.xml><?xml version="1.0" encoding="utf-8"?>
+<p:sld xmlns:a="http://schemas.openxmlformats.org/drawingml/2006/main" xmlns:r="http://schemas.openxmlformats.org/officeDocument/2006/relationships" xmlns:mc="http://schemas.openxmlformats.org/markup-compatibility/2006" xmlns:mv="urn:schemas-microsoft-com:mac:vml" xmlns:p="http://schemas.openxmlformats.org/presentationml/2006/main" mc:Ignorable="mv" mc:PreserveAttributes="mv:*">
   <p:cSld>
     <p:spTree>
       <p:nvGrpSpPr>
@@ -6834,8 +6758,82 @@
 </p:sld>
 </file>
 
+<file path=ppt/slides/slide14.xml><?xml version="1.0" encoding="utf-8"?>
+<p:sld xmlns:a="http://schemas.openxmlformats.org/drawingml/2006/main" xmlns:r="http://schemas.openxmlformats.org/officeDocument/2006/relationships" xmlns:mc="http://schemas.openxmlformats.org/markup-compatibility/2006" xmlns:mv="urn:schemas-microsoft-com:mac:vml" xmlns:p="http://schemas.openxmlformats.org/presentationml/2006/main" mc:Ignorable="mv" mc:PreserveAttributes="mv:*">
+  <p:cSld>
+    <p:spTree>
+      <p:nvGrpSpPr>
+        <p:cNvPr id="1" name=""/>
+        <p:cNvGrpSpPr/>
+        <p:nvPr/>
+      </p:nvGrpSpPr>
+      <p:grpSpPr>
+        <a:xfrm>
+          <a:off x="0" y="0"/>
+          <a:ext cx="0" cy="0"/>
+          <a:chOff x="0" y="0"/>
+          <a:chExt cx="0" cy="0"/>
+        </a:xfrm>
+      </p:grpSpPr>
+      <p:sp>
+        <p:nvSpPr>
+          <p:cNvPr id="11" name="Title 10"/>
+          <p:cNvSpPr>
+            <a:spLocks noGrp="1"/>
+          </p:cNvSpPr>
+          <p:nvPr>
+            <p:ph type="ctrTitle"/>
+          </p:nvPr>
+        </p:nvSpPr>
+        <p:spPr/>
+        <p:txBody>
+          <a:bodyPr/>
+          <a:lstStyle/>
+          <a:p>
+            <a:r>
+              <a:rPr lang="en-US" dirty="0" smtClean="0"/>
+              <a:t>Live Demo</a:t>
+            </a:r>
+            <a:endParaRPr lang="en-US" dirty="0"/>
+          </a:p>
+        </p:txBody>
+      </p:sp>
+      <p:sp>
+        <p:nvSpPr>
+          <p:cNvPr id="12" name="Subtitle 11"/>
+          <p:cNvSpPr>
+            <a:spLocks noGrp="1"/>
+          </p:cNvSpPr>
+          <p:nvPr>
+            <p:ph type="subTitle" idx="1"/>
+          </p:nvPr>
+        </p:nvSpPr>
+        <p:spPr/>
+        <p:txBody>
+          <a:bodyPr/>
+          <a:lstStyle/>
+          <a:p>
+            <a:endParaRPr lang="en-US" dirty="0"/>
+          </a:p>
+        </p:txBody>
+      </p:sp>
+    </p:spTree>
+  </p:cSld>
+  <p:clrMapOvr>
+    <a:masterClrMapping/>
+  </p:clrMapOvr>
+  <p:timing>
+    <p:tnLst>
+      <p:par>
+        <p:cTn id="1" dur="indefinite" restart="never" nodeType="tmRoot"/>
+      </p:par>
+    </p:tnLst>
+  </p:timing>
+</p:sld>
+</file>
+
 <file path=ppt/slides/slide15.xml><?xml version="1.0" encoding="utf-8"?>
-<p:sld xmlns:a="http://schemas.openxmlformats.org/drawingml/2006/main" xmlns:r="http://schemas.openxmlformats.org/officeDocument/2006/relationships" xmlns:p="http://schemas.openxmlformats.org/presentationml/2006/main">
+<p:sld xmlns:a="http://schemas.openxmlformats.org/drawingml/2006/main" xmlns:r="http://schemas.openxmlformats.org/officeDocument/2006/relationships" xmlns:mc="http://schemas.openxmlformats.org/markup-compatibility/2006" xmlns:mv="urn:schemas-microsoft-com:mac:vml" xmlns:p="http://schemas.openxmlformats.org/presentationml/2006/main" mc:Ignorable="mv" mc:PreserveAttributes="mv:*">
   <p:cSld>
     <p:spTree>
       <p:nvGrpSpPr>
@@ -6903,7 +6901,7 @@
 </file>
 
 <file path=ppt/slides/slide16.xml><?xml version="1.0" encoding="utf-8"?>
-<p:sld xmlns:a="http://schemas.openxmlformats.org/drawingml/2006/main" xmlns:r="http://schemas.openxmlformats.org/officeDocument/2006/relationships" xmlns:p="http://schemas.openxmlformats.org/presentationml/2006/main">
+<p:sld xmlns:a="http://schemas.openxmlformats.org/drawingml/2006/main" xmlns:r="http://schemas.openxmlformats.org/officeDocument/2006/relationships" xmlns:mc="http://schemas.openxmlformats.org/markup-compatibility/2006" xmlns:mv="urn:schemas-microsoft-com:mac:vml" xmlns:p="http://schemas.openxmlformats.org/presentationml/2006/main" mc:Ignorable="mv" mc:PreserveAttributes="mv:*">
   <p:cSld>
     <p:spTree>
       <p:nvGrpSpPr>
@@ -6977,7 +6975,7 @@
 </file>
 
 <file path=ppt/slides/slide17.xml><?xml version="1.0" encoding="utf-8"?>
-<p:sld xmlns:a="http://schemas.openxmlformats.org/drawingml/2006/main" xmlns:r="http://schemas.openxmlformats.org/officeDocument/2006/relationships" xmlns:p="http://schemas.openxmlformats.org/presentationml/2006/main">
+<p:sld xmlns:a="http://schemas.openxmlformats.org/drawingml/2006/main" xmlns:r="http://schemas.openxmlformats.org/officeDocument/2006/relationships" xmlns:mc="http://schemas.openxmlformats.org/markup-compatibility/2006" xmlns:mv="urn:schemas-microsoft-com:mac:vml" xmlns:p="http://schemas.openxmlformats.org/presentationml/2006/main" mc:Ignorable="mv" mc:PreserveAttributes="mv:*">
   <p:cSld>
     <p:spTree>
       <p:nvGrpSpPr>
@@ -7058,7 +7056,7 @@
 </file>
 
 <file path=ppt/slides/slide18.xml><?xml version="1.0" encoding="utf-8"?>
-<p:sld xmlns:a="http://schemas.openxmlformats.org/drawingml/2006/main" xmlns:r="http://schemas.openxmlformats.org/officeDocument/2006/relationships" xmlns:p="http://schemas.openxmlformats.org/presentationml/2006/main">
+<p:sld xmlns:a="http://schemas.openxmlformats.org/drawingml/2006/main" xmlns:r="http://schemas.openxmlformats.org/officeDocument/2006/relationships" xmlns:mc="http://schemas.openxmlformats.org/markup-compatibility/2006" xmlns:mv="urn:schemas-microsoft-com:mac:vml" xmlns:p="http://schemas.openxmlformats.org/presentationml/2006/main" mc:Ignorable="mv" mc:PreserveAttributes="mv:*">
   <p:cSld>
     <p:spTree>
       <p:nvGrpSpPr>
@@ -7165,7 +7163,7 @@
 </file>
 
 <file path=ppt/slides/slide19.xml><?xml version="1.0" encoding="utf-8"?>
-<p:sld xmlns:a="http://schemas.openxmlformats.org/drawingml/2006/main" xmlns:r="http://schemas.openxmlformats.org/officeDocument/2006/relationships" xmlns:p="http://schemas.openxmlformats.org/presentationml/2006/main">
+<p:sld xmlns:a="http://schemas.openxmlformats.org/drawingml/2006/main" xmlns:r="http://schemas.openxmlformats.org/officeDocument/2006/relationships" xmlns:mc="http://schemas.openxmlformats.org/markup-compatibility/2006" xmlns:mv="urn:schemas-microsoft-com:mac:vml" xmlns:p="http://schemas.openxmlformats.org/presentationml/2006/main" mc:Ignorable="mv" mc:PreserveAttributes="mv:*">
   <p:cSld>
     <p:spTree>
       <p:nvGrpSpPr>
@@ -7265,7 +7263,7 @@
 </file>
 
 <file path=ppt/slides/slide2.xml><?xml version="1.0" encoding="utf-8"?>
-<p:sld xmlns:a="http://schemas.openxmlformats.org/drawingml/2006/main" xmlns:r="http://schemas.openxmlformats.org/officeDocument/2006/relationships" xmlns:p="http://schemas.openxmlformats.org/presentationml/2006/main">
+<p:sld xmlns:a="http://schemas.openxmlformats.org/drawingml/2006/main" xmlns:r="http://schemas.openxmlformats.org/officeDocument/2006/relationships" xmlns:mc="http://schemas.openxmlformats.org/markup-compatibility/2006" xmlns:mv="urn:schemas-microsoft-com:mac:vml" xmlns:p="http://schemas.openxmlformats.org/presentationml/2006/main" mc:Ignorable="mv" mc:PreserveAttributes="mv:*">
   <p:cSld>
     <p:spTree>
       <p:nvGrpSpPr>
@@ -7352,7 +7350,7 @@
 </file>
 
 <file path=ppt/slides/slide3.xml><?xml version="1.0" encoding="utf-8"?>
-<p:sld xmlns:a="http://schemas.openxmlformats.org/drawingml/2006/main" xmlns:r="http://schemas.openxmlformats.org/officeDocument/2006/relationships" xmlns:p="http://schemas.openxmlformats.org/presentationml/2006/main">
+<p:sld xmlns:a="http://schemas.openxmlformats.org/drawingml/2006/main" xmlns:r="http://schemas.openxmlformats.org/officeDocument/2006/relationships" xmlns:mc="http://schemas.openxmlformats.org/markup-compatibility/2006" xmlns:mv="urn:schemas-microsoft-com:mac:vml" xmlns:p="http://schemas.openxmlformats.org/presentationml/2006/main" mc:Ignorable="mv" mc:PreserveAttributes="mv:*">
   <p:cSld>
     <p:spTree>
       <p:nvGrpSpPr>
@@ -7493,7 +7491,7 @@
 </file>
 
 <file path=ppt/slides/slide4.xml><?xml version="1.0" encoding="utf-8"?>
-<p:sld xmlns:a="http://schemas.openxmlformats.org/drawingml/2006/main" xmlns:r="http://schemas.openxmlformats.org/officeDocument/2006/relationships" xmlns:p="http://schemas.openxmlformats.org/presentationml/2006/main">
+<p:sld xmlns:a="http://schemas.openxmlformats.org/drawingml/2006/main" xmlns:r="http://schemas.openxmlformats.org/officeDocument/2006/relationships" xmlns:mc="http://schemas.openxmlformats.org/markup-compatibility/2006" xmlns:mv="urn:schemas-microsoft-com:mac:vml" xmlns:p="http://schemas.openxmlformats.org/presentationml/2006/main" mc:Ignorable="mv" mc:PreserveAttributes="mv:*">
   <p:cSld>
     <p:spTree>
       <p:nvGrpSpPr>
@@ -7651,7 +7649,7 @@
 </file>
 
 <file path=ppt/slides/slide5.xml><?xml version="1.0" encoding="utf-8"?>
-<p:sld xmlns:a="http://schemas.openxmlformats.org/drawingml/2006/main" xmlns:r="http://schemas.openxmlformats.org/officeDocument/2006/relationships" xmlns:p="http://schemas.openxmlformats.org/presentationml/2006/main">
+<p:sld xmlns:a="http://schemas.openxmlformats.org/drawingml/2006/main" xmlns:r="http://schemas.openxmlformats.org/officeDocument/2006/relationships" xmlns:mc="http://schemas.openxmlformats.org/markup-compatibility/2006" xmlns:mv="urn:schemas-microsoft-com:mac:vml" xmlns:p="http://schemas.openxmlformats.org/presentationml/2006/main" mc:Ignorable="mv" mc:PreserveAttributes="mv:*">
   <p:cSld>
     <p:spTree>
       <p:nvGrpSpPr>
@@ -7680,7 +7678,7 @@
         <p:spPr/>
         <p:txBody>
           <a:bodyPr>
-            <a:normAutofit/>
+            <a:normAutofit fontScale="90000"/>
           </a:bodyPr>
           <a:lstStyle/>
           <a:p>
@@ -7812,7 +7810,7 @@
 </file>
 
 <file path=ppt/slides/slide6.xml><?xml version="1.0" encoding="utf-8"?>
-<p:sld xmlns:a="http://schemas.openxmlformats.org/drawingml/2006/main" xmlns:r="http://schemas.openxmlformats.org/officeDocument/2006/relationships" xmlns:p="http://schemas.openxmlformats.org/presentationml/2006/main">
+<p:sld xmlns:a="http://schemas.openxmlformats.org/drawingml/2006/main" xmlns:r="http://schemas.openxmlformats.org/officeDocument/2006/relationships" xmlns:mc="http://schemas.openxmlformats.org/markup-compatibility/2006" xmlns:mv="urn:schemas-microsoft-com:mac:vml" xmlns:p="http://schemas.openxmlformats.org/presentationml/2006/main" mc:Ignorable="mv" mc:PreserveAttributes="mv:*">
   <p:cSld>
     <p:spTree>
       <p:nvGrpSpPr>
@@ -7960,7 +7958,7 @@
 </file>
 
 <file path=ppt/slides/slide7.xml><?xml version="1.0" encoding="utf-8"?>
-<p:sld xmlns:a="http://schemas.openxmlformats.org/drawingml/2006/main" xmlns:r="http://schemas.openxmlformats.org/officeDocument/2006/relationships" xmlns:p="http://schemas.openxmlformats.org/presentationml/2006/main">
+<p:sld xmlns:a="http://schemas.openxmlformats.org/drawingml/2006/main" xmlns:r="http://schemas.openxmlformats.org/officeDocument/2006/relationships" xmlns:mc="http://schemas.openxmlformats.org/markup-compatibility/2006" xmlns:mv="urn:schemas-microsoft-com:mac:vml" xmlns:p="http://schemas.openxmlformats.org/presentationml/2006/main" mc:Ignorable="mv" mc:PreserveAttributes="mv:*">
   <p:cSld>
     <p:spTree>
       <p:nvGrpSpPr>
@@ -8058,7 +8056,7 @@
 </file>
 
 <file path=ppt/slides/slide8.xml><?xml version="1.0" encoding="utf-8"?>
-<p:sld xmlns:a="http://schemas.openxmlformats.org/drawingml/2006/main" xmlns:r="http://schemas.openxmlformats.org/officeDocument/2006/relationships" xmlns:p="http://schemas.openxmlformats.org/presentationml/2006/main">
+<p:sld xmlns:a="http://schemas.openxmlformats.org/drawingml/2006/main" xmlns:r="http://schemas.openxmlformats.org/officeDocument/2006/relationships" xmlns:mc="http://schemas.openxmlformats.org/markup-compatibility/2006" xmlns:mv="urn:schemas-microsoft-com:mac:vml" xmlns:p="http://schemas.openxmlformats.org/presentationml/2006/main" mc:Ignorable="mv" mc:PreserveAttributes="mv:*">
   <p:cSld>
     <p:spTree>
       <p:nvGrpSpPr>
@@ -8170,7 +8168,7 @@
 </file>
 
 <file path=ppt/slides/slide9.xml><?xml version="1.0" encoding="utf-8"?>
-<p:sld xmlns:a="http://schemas.openxmlformats.org/drawingml/2006/main" xmlns:r="http://schemas.openxmlformats.org/officeDocument/2006/relationships" xmlns:p="http://schemas.openxmlformats.org/presentationml/2006/main">
+<p:sld xmlns:a="http://schemas.openxmlformats.org/drawingml/2006/main" xmlns:r="http://schemas.openxmlformats.org/officeDocument/2006/relationships" xmlns:mc="http://schemas.openxmlformats.org/markup-compatibility/2006" xmlns:mv="urn:schemas-microsoft-com:mac:vml" xmlns:p="http://schemas.openxmlformats.org/presentationml/2006/main" mc:Ignorable="mv" mc:PreserveAttributes="mv:*">
   <p:cSld>
     <p:spTree>
       <p:nvGrpSpPr>

</xml_diff>